<commit_message>
Updated Assignment 03 output
</commit_message>
<xml_diff>
--- a/Assignments/Assignment03/Results/Townes_SOC6100_Assignment03_PathAnalysisModel_Diagram_v00.pptx
+++ b/Assignments/Assignment03/Results/Townes_SOC6100_Assignment03_PathAnalysisModel_Diagram_v00.pptx
@@ -198,7 +198,7 @@
           <a:p>
             <a:fld id="{F9983AA4-ADB7-4D78-BC0B-61D53AF05290}" type="datetimeFigureOut">
               <a:rPr lang="en-US" smtClean="0"/>
-              <a:t>10/28/2018</a:t>
+              <a:t>10/29/2018</a:t>
             </a:fld>
             <a:endParaRPr lang="en-US"/>
           </a:p>
@@ -1087,7 +1087,7 @@
           <a:p>
             <a:fld id="{BF30DF70-5848-4672-8949-A08F2F452BE1}" type="datetimeFigureOut">
               <a:rPr lang="en-US" smtClean="0"/>
-              <a:t>10/28/2018</a:t>
+              <a:t>10/29/2018</a:t>
             </a:fld>
             <a:endParaRPr lang="en-US"/>
           </a:p>
@@ -1257,7 +1257,7 @@
           <a:p>
             <a:fld id="{BF30DF70-5848-4672-8949-A08F2F452BE1}" type="datetimeFigureOut">
               <a:rPr lang="en-US" smtClean="0"/>
-              <a:t>10/28/2018</a:t>
+              <a:t>10/29/2018</a:t>
             </a:fld>
             <a:endParaRPr lang="en-US"/>
           </a:p>
@@ -1437,7 +1437,7 @@
           <a:p>
             <a:fld id="{BF30DF70-5848-4672-8949-A08F2F452BE1}" type="datetimeFigureOut">
               <a:rPr lang="en-US" smtClean="0"/>
-              <a:t>10/28/2018</a:t>
+              <a:t>10/29/2018</a:t>
             </a:fld>
             <a:endParaRPr lang="en-US"/>
           </a:p>
@@ -1607,7 +1607,7 @@
           <a:p>
             <a:fld id="{BF30DF70-5848-4672-8949-A08F2F452BE1}" type="datetimeFigureOut">
               <a:rPr lang="en-US" smtClean="0"/>
-              <a:t>10/28/2018</a:t>
+              <a:t>10/29/2018</a:t>
             </a:fld>
             <a:endParaRPr lang="en-US"/>
           </a:p>
@@ -1853,7 +1853,7 @@
           <a:p>
             <a:fld id="{BF30DF70-5848-4672-8949-A08F2F452BE1}" type="datetimeFigureOut">
               <a:rPr lang="en-US" smtClean="0"/>
-              <a:t>10/28/2018</a:t>
+              <a:t>10/29/2018</a:t>
             </a:fld>
             <a:endParaRPr lang="en-US"/>
           </a:p>
@@ -2141,7 +2141,7 @@
           <a:p>
             <a:fld id="{BF30DF70-5848-4672-8949-A08F2F452BE1}" type="datetimeFigureOut">
               <a:rPr lang="en-US" smtClean="0"/>
-              <a:t>10/28/2018</a:t>
+              <a:t>10/29/2018</a:t>
             </a:fld>
             <a:endParaRPr lang="en-US"/>
           </a:p>
@@ -2568,7 +2568,7 @@
           <a:p>
             <a:fld id="{BF30DF70-5848-4672-8949-A08F2F452BE1}" type="datetimeFigureOut">
               <a:rPr lang="en-US" smtClean="0"/>
-              <a:t>10/28/2018</a:t>
+              <a:t>10/29/2018</a:t>
             </a:fld>
             <a:endParaRPr lang="en-US"/>
           </a:p>
@@ -2686,7 +2686,7 @@
           <a:p>
             <a:fld id="{BF30DF70-5848-4672-8949-A08F2F452BE1}" type="datetimeFigureOut">
               <a:rPr lang="en-US" smtClean="0"/>
-              <a:t>10/28/2018</a:t>
+              <a:t>10/29/2018</a:t>
             </a:fld>
             <a:endParaRPr lang="en-US"/>
           </a:p>
@@ -2781,7 +2781,7 @@
           <a:p>
             <a:fld id="{BF30DF70-5848-4672-8949-A08F2F452BE1}" type="datetimeFigureOut">
               <a:rPr lang="en-US" smtClean="0"/>
-              <a:t>10/28/2018</a:t>
+              <a:t>10/29/2018</a:t>
             </a:fld>
             <a:endParaRPr lang="en-US"/>
           </a:p>
@@ -3058,7 +3058,7 @@
           <a:p>
             <a:fld id="{BF30DF70-5848-4672-8949-A08F2F452BE1}" type="datetimeFigureOut">
               <a:rPr lang="en-US" smtClean="0"/>
-              <a:t>10/28/2018</a:t>
+              <a:t>10/29/2018</a:t>
             </a:fld>
             <a:endParaRPr lang="en-US"/>
           </a:p>
@@ -3311,7 +3311,7 @@
           <a:p>
             <a:fld id="{BF30DF70-5848-4672-8949-A08F2F452BE1}" type="datetimeFigureOut">
               <a:rPr lang="en-US" smtClean="0"/>
-              <a:t>10/28/2018</a:t>
+              <a:t>10/29/2018</a:t>
             </a:fld>
             <a:endParaRPr lang="en-US"/>
           </a:p>
@@ -3524,7 +3524,7 @@
           <a:p>
             <a:fld id="{BF30DF70-5848-4672-8949-A08F2F452BE1}" type="datetimeFigureOut">
               <a:rPr lang="en-US" smtClean="0"/>
-              <a:t>10/28/2018</a:t>
+              <a:t>10/29/2018</a:t>
             </a:fld>
             <a:endParaRPr lang="en-US"/>
           </a:p>
@@ -8983,13 +8983,8 @@
           <a:p>
             <a:r>
               <a:rPr lang="en-US" dirty="0" smtClean="0"/>
-              <a:t>0.569</a:t>
-            </a:r>
-            <a:r>
-              <a:rPr lang="en-US" dirty="0" smtClean="0"/>
-              <a:t>***</a:t>
-            </a:r>
-            <a:endParaRPr lang="en-US" dirty="0" smtClean="0"/>
+              <a:t>0.569***</a:t>
+            </a:r>
           </a:p>
         </p:txBody>
       </p:sp>
@@ -9167,11 +9162,7 @@
           <a:p>
             <a:r>
               <a:rPr lang="en-US" dirty="0" smtClean="0"/>
-              <a:t>-0.213</a:t>
-            </a:r>
-            <a:r>
-              <a:rPr lang="en-US" dirty="0" smtClean="0"/>
-              <a:t>***</a:t>
+              <a:t>-0.213***</a:t>
             </a:r>
             <a:endParaRPr lang="en-US" dirty="0"/>
           </a:p>
@@ -9201,11 +9192,7 @@
           <a:p>
             <a:r>
               <a:rPr lang="en-US" dirty="0" smtClean="0"/>
-              <a:t>0.092</a:t>
-            </a:r>
-            <a:r>
-              <a:rPr lang="en-US" dirty="0" smtClean="0"/>
-              <a:t>***</a:t>
+              <a:t>0.092***</a:t>
             </a:r>
           </a:p>
         </p:txBody>
@@ -9236,7 +9223,6 @@
               <a:rPr lang="en-US" dirty="0" smtClean="0"/>
               <a:t>-0.085***</a:t>
             </a:r>
-            <a:endParaRPr lang="en-US" dirty="0" smtClean="0"/>
           </a:p>
         </p:txBody>
       </p:sp>
@@ -9268,13 +9254,8 @@
             </a:r>
             <a:r>
               <a:rPr lang="en-US" sz="1100" dirty="0" smtClean="0"/>
-              <a:t> = </a:t>
-            </a:r>
-            <a:r>
-              <a:rPr lang="en-US" sz="1100" dirty="0" smtClean="0"/>
-              <a:t>0.049</a:t>
-            </a:r>
-            <a:endParaRPr lang="en-US" sz="1100" dirty="0" smtClean="0"/>
+              <a:t> = 0.049</a:t>
+            </a:r>
           </a:p>
         </p:txBody>
       </p:sp>
@@ -9306,13 +9287,8 @@
             </a:r>
             <a:r>
               <a:rPr lang="en-US" sz="1100" dirty="0" smtClean="0"/>
-              <a:t> = </a:t>
-            </a:r>
-            <a:r>
-              <a:rPr lang="en-US" sz="1100" dirty="0" smtClean="0"/>
-              <a:t>0.055</a:t>
-            </a:r>
-            <a:endParaRPr lang="en-US" sz="1100" dirty="0" smtClean="0"/>
+              <a:t> = 0.055</a:t>
+            </a:r>
           </a:p>
         </p:txBody>
       </p:sp>
@@ -9348,15 +9324,7 @@
             </a:r>
             <a:r>
               <a:rPr lang="en-US" dirty="0" smtClean="0"/>
-              <a:t>, </a:t>
-            </a:r>
-            <a:r>
-              <a:rPr lang="en-US" dirty="0" smtClean="0"/>
-              <a:t>ORIGINAL) = </a:t>
-            </a:r>
-            <a:r>
-              <a:rPr lang="en-US" dirty="0" smtClean="0"/>
-              <a:t>0.019</a:t>
+              <a:t>, ORIGINAL) = 0.019</a:t>
             </a:r>
             <a:endParaRPr lang="en-US" dirty="0"/>
           </a:p>
@@ -9390,11 +9358,96 @@
             </a:r>
             <a:r>
               <a:rPr lang="en-US" sz="1100" dirty="0" smtClean="0"/>
-              <a:t> = </a:t>
-            </a:r>
+              <a:t> = 0.032</a:t>
+            </a:r>
+          </a:p>
+        </p:txBody>
+      </p:sp>
+      <p:sp>
+        <p:nvSpPr>
+          <p:cNvPr id="40" name="TextBox 39"/>
+          <p:cNvSpPr txBox="1"/>
+          <p:nvPr/>
+        </p:nvSpPr>
+        <p:spPr>
+          <a:xfrm>
+            <a:off x="2057400" y="1409700"/>
+            <a:ext cx="914400" cy="261610"/>
+          </a:xfrm>
+          <a:prstGeom prst="rect">
+            <a:avLst/>
+          </a:prstGeom>
+          <a:noFill/>
+        </p:spPr>
+        <p:txBody>
+          <a:bodyPr wrap="square" rtlCol="0">
+            <a:spAutoFit/>
+          </a:bodyPr>
+          <a:lstStyle/>
+          <a:p>
             <a:r>
               <a:rPr lang="en-US" sz="1100" dirty="0" smtClean="0"/>
-              <a:t>0.032</a:t>
+              <a:t>e = 0.985</a:t>
+            </a:r>
+            <a:endParaRPr lang="en-US" sz="1100" dirty="0" smtClean="0"/>
+          </a:p>
+        </p:txBody>
+      </p:sp>
+      <p:sp>
+        <p:nvSpPr>
+          <p:cNvPr id="42" name="TextBox 41"/>
+          <p:cNvSpPr txBox="1"/>
+          <p:nvPr/>
+        </p:nvSpPr>
+        <p:spPr>
+          <a:xfrm>
+            <a:off x="4267200" y="3086100"/>
+            <a:ext cx="914400" cy="261610"/>
+          </a:xfrm>
+          <a:prstGeom prst="rect">
+            <a:avLst/>
+          </a:prstGeom>
+          <a:noFill/>
+        </p:spPr>
+        <p:txBody>
+          <a:bodyPr wrap="square" rtlCol="0">
+            <a:spAutoFit/>
+          </a:bodyPr>
+          <a:lstStyle/>
+          <a:p>
+            <a:r>
+              <a:rPr lang="en-US" sz="1100" dirty="0" smtClean="0"/>
+              <a:t>e = 0.992</a:t>
+            </a:r>
+            <a:endParaRPr lang="en-US" sz="1100" dirty="0" smtClean="0"/>
+          </a:p>
+        </p:txBody>
+      </p:sp>
+      <p:sp>
+        <p:nvSpPr>
+          <p:cNvPr id="43" name="TextBox 42"/>
+          <p:cNvSpPr txBox="1"/>
+          <p:nvPr/>
+        </p:nvSpPr>
+        <p:spPr>
+          <a:xfrm>
+            <a:off x="7543800" y="3086100"/>
+            <a:ext cx="914400" cy="261610"/>
+          </a:xfrm>
+          <a:prstGeom prst="rect">
+            <a:avLst/>
+          </a:prstGeom>
+          <a:noFill/>
+        </p:spPr>
+        <p:txBody>
+          <a:bodyPr wrap="square" rtlCol="0">
+            <a:spAutoFit/>
+          </a:bodyPr>
+          <a:lstStyle/>
+          <a:p>
+            <a:r>
+              <a:rPr lang="en-US" sz="1100" dirty="0" smtClean="0"/>
+              <a:t>e = 0.753</a:t>
             </a:r>
             <a:endParaRPr lang="en-US" sz="1100" dirty="0" smtClean="0"/>
           </a:p>
@@ -9534,11 +9587,7 @@
                       <a:pPr algn="ctr"/>
                       <a:r>
                         <a:rPr lang="en-US" sz="1400" dirty="0" smtClean="0"/>
-                        <a:t>Total </a:t>
-                      </a:r>
-                      <a:r>
-                        <a:rPr lang="en-US" sz="1400" dirty="0" smtClean="0"/>
-                        <a:t>Effects</a:t>
+                        <a:t>Total Effects</a:t>
                       </a:r>
                       <a:endParaRPr lang="en-US" sz="1400" dirty="0"/>
                     </a:p>
@@ -9644,7 +9693,6 @@
                         <a:rPr lang="en-US" sz="1400" dirty="0" smtClean="0"/>
                         <a:t>-0.085</a:t>
                       </a:r>
-                      <a:endParaRPr lang="en-US" sz="1400" dirty="0" smtClean="0"/>
                     </a:p>
                     <a:p>
                       <a:pPr algn="r"/>
@@ -9663,7 +9711,6 @@
                         <a:rPr lang="en-US" sz="1400" dirty="0" smtClean="0"/>
                         <a:t>-0.213</a:t>
                       </a:r>
-                      <a:endParaRPr lang="en-US" sz="1400" dirty="0" smtClean="0"/>
                     </a:p>
                     <a:p>
                       <a:pPr algn="r"/>
@@ -9693,7 +9740,6 @@
                         <a:rPr lang="en-US" sz="1400" dirty="0" smtClean="0"/>
                         <a:t>Total = -0.206</a:t>
                       </a:r>
-                      <a:endParaRPr lang="en-US" sz="1400" dirty="0" smtClean="0"/>
                     </a:p>
                   </a:txBody>
                   <a:tcPr/>
@@ -9713,21 +9759,8 @@
                       <a:pPr algn="r"/>
                       <a:r>
                         <a:rPr lang="it-IT" sz="1400" dirty="0" smtClean="0"/>
-                        <a:t>(0.169</a:t>
+                        <a:t>(0.169)(0.569) = 0.096  </a:t>
                       </a:r>
-                      <a:r>
-                        <a:rPr lang="it-IT" sz="1400" dirty="0" smtClean="0"/>
-                        <a:t>)(0.569) </a:t>
-                      </a:r>
-                      <a:r>
-                        <a:rPr lang="it-IT" sz="1400" dirty="0" smtClean="0"/>
-                        <a:t>= </a:t>
-                      </a:r>
-                      <a:r>
-                        <a:rPr lang="it-IT" sz="1400" dirty="0" smtClean="0"/>
-                        <a:t>0.096  </a:t>
-                      </a:r>
-                      <a:endParaRPr lang="it-IT" sz="1400" dirty="0" smtClean="0"/>
                     </a:p>
                     <a:p>
                       <a:pPr algn="r"/>
@@ -9752,65 +9785,29 @@
                       </a:r>
                       <a:r>
                         <a:rPr lang="it-IT" sz="1400" dirty="0" smtClean="0"/>
-                        <a:t>(0.090)(0.063) </a:t>
+                        <a:t>(0.090)(0.063) = 0.006 </a:t>
                       </a:r>
-                      <a:r>
-                        <a:rPr lang="it-IT" sz="1400" dirty="0" smtClean="0"/>
-                        <a:t>= </a:t>
-                      </a:r>
-                      <a:r>
-                        <a:rPr lang="it-IT" sz="1400" dirty="0" smtClean="0"/>
-                        <a:t>0.006 </a:t>
-                      </a:r>
-                      <a:endParaRPr lang="it-IT" sz="1400" dirty="0" smtClean="0"/>
                     </a:p>
                     <a:p>
                       <a:pPr algn="r"/>
                       <a:r>
                         <a:rPr lang="it-IT" sz="1400" dirty="0" smtClean="0"/>
-                        <a:t>GENERAL (0.050)(0.063) </a:t>
+                        <a:t>GENERAL (0.050)(0.063) = 0.003 </a:t>
                       </a:r>
-                      <a:r>
-                        <a:rPr lang="it-IT" sz="1400" dirty="0" smtClean="0"/>
-                        <a:t>= </a:t>
-                      </a:r>
-                      <a:r>
-                        <a:rPr lang="it-IT" sz="1400" dirty="0" smtClean="0"/>
-                        <a:t>0.003 </a:t>
-                      </a:r>
-                      <a:endParaRPr lang="it-IT" sz="1400" dirty="0" smtClean="0"/>
                     </a:p>
                     <a:p>
                       <a:pPr algn="r"/>
                       <a:r>
                         <a:rPr lang="it-IT" sz="1400" dirty="0" smtClean="0"/>
-                        <a:t>GYEAR (0.046)(0.063) </a:t>
+                        <a:t>GYEAR (0.046)(0.063) = 0.003 </a:t>
                       </a:r>
-                      <a:r>
-                        <a:rPr lang="it-IT" sz="1400" dirty="0" smtClean="0"/>
-                        <a:t>= </a:t>
-                      </a:r>
-                      <a:r>
-                        <a:rPr lang="it-IT" sz="1400" dirty="0" smtClean="0"/>
-                        <a:t>0.003 </a:t>
-                      </a:r>
-                      <a:endParaRPr lang="it-IT" sz="1400" dirty="0" smtClean="0"/>
                     </a:p>
                     <a:p>
                       <a:pPr algn="r"/>
                       <a:r>
                         <a:rPr lang="it-IT" sz="1400" dirty="0" smtClean="0"/>
-                        <a:t>RATIOCIT (0.043)(0.063) </a:t>
+                        <a:t>RATIOCIT (0.043)(0.063) = 0.003</a:t>
                       </a:r>
-                      <a:r>
-                        <a:rPr lang="it-IT" sz="1400" dirty="0" smtClean="0"/>
-                        <a:t>= </a:t>
-                      </a:r>
-                      <a:r>
-                        <a:rPr lang="it-IT" sz="1400" dirty="0" smtClean="0"/>
-                        <a:t>0.003</a:t>
-                      </a:r>
-                      <a:endParaRPr lang="it-IT" sz="1400" dirty="0" smtClean="0"/>
                     </a:p>
                     <a:p>
                       <a:pPr algn="r"/>
@@ -9847,7 +9844,6 @@
                         <a:rPr lang="en-US" sz="1400" dirty="0" smtClean="0"/>
                         <a:t>-0.095 </a:t>
                       </a:r>
-                      <a:endParaRPr lang="en-US" sz="1400" dirty="0" smtClean="0"/>
                     </a:p>
                     <a:p>
                       <a:pPr algn="r"/>
@@ -9864,11 +9860,7 @@
                       <a:pPr algn="r"/>
                       <a:r>
                         <a:rPr lang="en-US" sz="1400" dirty="0" smtClean="0"/>
-                        <a:t>0.019-(-0.095) </a:t>
-                      </a:r>
-                      <a:r>
-                        <a:rPr lang="en-US" sz="1400" dirty="0" smtClean="0"/>
-                        <a:t>= </a:t>
+                        <a:t>0.019-(-0.095) = </a:t>
                       </a:r>
                       <a:br>
                         <a:rPr lang="en-US" sz="1400" dirty="0" smtClean="0"/>
@@ -9877,7 +9869,6 @@
                         <a:rPr lang="en-US" sz="1400" dirty="0" smtClean="0"/>
                         <a:t>0.114</a:t>
                       </a:r>
-                      <a:endParaRPr lang="en-US" sz="1400" dirty="0" smtClean="0"/>
                     </a:p>
                     <a:p>
                       <a:pPr algn="r"/>

</xml_diff>

<commit_message>
Began paper for Assignment 03
</commit_message>
<xml_diff>
--- a/Assignments/Assignment03/Results/Townes_SOC6100_Assignment03_PathAnalysisModel_Diagram_v00.pptx
+++ b/Assignments/Assignment03/Results/Townes_SOC6100_Assignment03_PathAnalysisModel_Diagram_v00.pptx
@@ -5,7 +5,7 @@
     <p:sldMasterId id="2147483648" r:id="rId1"/>
   </p:sldMasterIdLst>
   <p:notesMasterIdLst>
-    <p:notesMasterId r:id="rId9"/>
+    <p:notesMasterId r:id="rId12"/>
   </p:notesMasterIdLst>
   <p:sldIdLst>
     <p:sldId id="256" r:id="rId2"/>
@@ -14,7 +14,10 @@
     <p:sldId id="260" r:id="rId5"/>
     <p:sldId id="261" r:id="rId6"/>
     <p:sldId id="262" r:id="rId7"/>
-    <p:sldId id="263" r:id="rId8"/>
+    <p:sldId id="264" r:id="rId8"/>
+    <p:sldId id="263" r:id="rId9"/>
+    <p:sldId id="265" r:id="rId10"/>
+    <p:sldId id="266" r:id="rId11"/>
   </p:sldIdLst>
   <p:sldSz cx="9144000" cy="5715000" type="screen16x10"/>
   <p:notesSz cx="7010400" cy="9296400"/>
@@ -198,7 +201,7 @@
           <a:p>
             <a:fld id="{F9983AA4-ADB7-4D78-BC0B-61D53AF05290}" type="datetimeFigureOut">
               <a:rPr lang="en-US" smtClean="0"/>
-              <a:t>10/29/2018</a:t>
+              <a:t>10/30/2018</a:t>
             </a:fld>
             <a:endParaRPr lang="en-US"/>
           </a:p>
@@ -860,11 +863,7 @@
           <a:p>
             <a:r>
               <a:rPr lang="en-US" dirty="0" smtClean="0"/>
-              <a:t>Select</a:t>
-            </a:r>
-            <a:r>
-              <a:rPr lang="en-US" baseline="0" dirty="0" smtClean="0"/>
-              <a:t> outliers removed (case 202, 230, and 1630)</a:t>
+              <a:t>42 outliers removed</a:t>
             </a:r>
             <a:endParaRPr lang="en-US" dirty="0"/>
           </a:p>
@@ -897,6 +896,366 @@
     <p:extLst>
       <p:ext uri="{BB962C8B-B14F-4D97-AF65-F5344CB8AC3E}">
         <p14:creationId xmlns:p14="http://schemas.microsoft.com/office/powerpoint/2010/main" val="1178951907"/>
+      </p:ext>
+    </p:extLst>
+  </p:cSld>
+  <p:clrMapOvr>
+    <a:masterClrMapping/>
+  </p:clrMapOvr>
+</p:notes>
+</file>
+
+<file path=ppt/notesSlides/notesSlide6.xml><?xml version="1.0" encoding="utf-8"?>
+<p:notes xmlns:a="http://schemas.openxmlformats.org/drawingml/2006/main" xmlns:r="http://schemas.openxmlformats.org/officeDocument/2006/relationships" xmlns:p="http://schemas.openxmlformats.org/presentationml/2006/main">
+  <p:cSld>
+    <p:spTree>
+      <p:nvGrpSpPr>
+        <p:cNvPr id="1" name=""/>
+        <p:cNvGrpSpPr/>
+        <p:nvPr/>
+      </p:nvGrpSpPr>
+      <p:grpSpPr>
+        <a:xfrm>
+          <a:off x="0" y="0"/>
+          <a:ext cx="0" cy="0"/>
+          <a:chOff x="0" y="0"/>
+          <a:chExt cx="0" cy="0"/>
+        </a:xfrm>
+      </p:grpSpPr>
+      <p:sp>
+        <p:nvSpPr>
+          <p:cNvPr id="2" name="Slide Image Placeholder 1"/>
+          <p:cNvSpPr>
+            <a:spLocks noGrp="1" noRot="1" noChangeAspect="1"/>
+          </p:cNvSpPr>
+          <p:nvPr>
+            <p:ph type="sldImg"/>
+          </p:nvPr>
+        </p:nvSpPr>
+        <p:spPr/>
+      </p:sp>
+      <p:sp>
+        <p:nvSpPr>
+          <p:cNvPr id="3" name="Notes Placeholder 2"/>
+          <p:cNvSpPr>
+            <a:spLocks noGrp="1"/>
+          </p:cNvSpPr>
+          <p:nvPr>
+            <p:ph type="body" idx="1"/>
+          </p:nvPr>
+        </p:nvSpPr>
+        <p:spPr/>
+        <p:txBody>
+          <a:bodyPr/>
+          <a:lstStyle/>
+          <a:p>
+            <a:r>
+              <a:rPr lang="en-US" baseline="0" dirty="0" smtClean="0"/>
+              <a:t>42 outliers removed</a:t>
+            </a:r>
+            <a:endParaRPr lang="en-US" dirty="0"/>
+          </a:p>
+        </p:txBody>
+      </p:sp>
+      <p:sp>
+        <p:nvSpPr>
+          <p:cNvPr id="4" name="Slide Number Placeholder 3"/>
+          <p:cNvSpPr>
+            <a:spLocks noGrp="1"/>
+          </p:cNvSpPr>
+          <p:nvPr>
+            <p:ph type="sldNum" sz="quarter" idx="10"/>
+          </p:nvPr>
+        </p:nvSpPr>
+        <p:spPr/>
+        <p:txBody>
+          <a:bodyPr/>
+          <a:lstStyle/>
+          <a:p>
+            <a:fld id="{0AC83BEF-6787-481E-AFCA-033D79C6C037}" type="slidenum">
+              <a:rPr lang="en-US" smtClean="0"/>
+              <a:t>7</a:t>
+            </a:fld>
+            <a:endParaRPr lang="en-US"/>
+          </a:p>
+        </p:txBody>
+      </p:sp>
+    </p:spTree>
+    <p:extLst>
+      <p:ext uri="{BB962C8B-B14F-4D97-AF65-F5344CB8AC3E}">
+        <p14:creationId xmlns:p14="http://schemas.microsoft.com/office/powerpoint/2010/main" val="1178951907"/>
+      </p:ext>
+    </p:extLst>
+  </p:cSld>
+  <p:clrMapOvr>
+    <a:masterClrMapping/>
+  </p:clrMapOvr>
+</p:notes>
+</file>
+
+<file path=ppt/notesSlides/notesSlide7.xml><?xml version="1.0" encoding="utf-8"?>
+<p:notes xmlns:a="http://schemas.openxmlformats.org/drawingml/2006/main" xmlns:r="http://schemas.openxmlformats.org/officeDocument/2006/relationships" xmlns:p="http://schemas.openxmlformats.org/presentationml/2006/main">
+  <p:cSld>
+    <p:spTree>
+      <p:nvGrpSpPr>
+        <p:cNvPr id="1" name=""/>
+        <p:cNvGrpSpPr/>
+        <p:nvPr/>
+      </p:nvGrpSpPr>
+      <p:grpSpPr>
+        <a:xfrm>
+          <a:off x="0" y="0"/>
+          <a:ext cx="0" cy="0"/>
+          <a:chOff x="0" y="0"/>
+          <a:chExt cx="0" cy="0"/>
+        </a:xfrm>
+      </p:grpSpPr>
+      <p:sp>
+        <p:nvSpPr>
+          <p:cNvPr id="2" name="Slide Image Placeholder 1"/>
+          <p:cNvSpPr>
+            <a:spLocks noGrp="1" noRot="1" noChangeAspect="1"/>
+          </p:cNvSpPr>
+          <p:nvPr>
+            <p:ph type="sldImg"/>
+          </p:nvPr>
+        </p:nvSpPr>
+        <p:spPr/>
+      </p:sp>
+      <p:sp>
+        <p:nvSpPr>
+          <p:cNvPr id="3" name="Notes Placeholder 2"/>
+          <p:cNvSpPr>
+            <a:spLocks noGrp="1"/>
+          </p:cNvSpPr>
+          <p:nvPr>
+            <p:ph type="body" idx="1"/>
+          </p:nvPr>
+        </p:nvSpPr>
+        <p:spPr/>
+        <p:txBody>
+          <a:bodyPr/>
+          <a:lstStyle/>
+          <a:p>
+            <a:r>
+              <a:rPr lang="en-US" dirty="0" smtClean="0"/>
+              <a:t>42 outliers removed</a:t>
+            </a:r>
+            <a:endParaRPr lang="en-US" dirty="0"/>
+          </a:p>
+        </p:txBody>
+      </p:sp>
+      <p:sp>
+        <p:nvSpPr>
+          <p:cNvPr id="4" name="Slide Number Placeholder 3"/>
+          <p:cNvSpPr>
+            <a:spLocks noGrp="1"/>
+          </p:cNvSpPr>
+          <p:nvPr>
+            <p:ph type="sldNum" sz="quarter" idx="10"/>
+          </p:nvPr>
+        </p:nvSpPr>
+        <p:spPr/>
+        <p:txBody>
+          <a:bodyPr/>
+          <a:lstStyle/>
+          <a:p>
+            <a:fld id="{0AC83BEF-6787-481E-AFCA-033D79C6C037}" type="slidenum">
+              <a:rPr lang="en-US" smtClean="0"/>
+              <a:t>8</a:t>
+            </a:fld>
+            <a:endParaRPr lang="en-US"/>
+          </a:p>
+        </p:txBody>
+      </p:sp>
+    </p:spTree>
+    <p:extLst>
+      <p:ext uri="{BB962C8B-B14F-4D97-AF65-F5344CB8AC3E}">
+        <p14:creationId xmlns:p14="http://schemas.microsoft.com/office/powerpoint/2010/main" val="2852839965"/>
+      </p:ext>
+    </p:extLst>
+  </p:cSld>
+  <p:clrMapOvr>
+    <a:masterClrMapping/>
+  </p:clrMapOvr>
+</p:notes>
+</file>
+
+<file path=ppt/notesSlides/notesSlide8.xml><?xml version="1.0" encoding="utf-8"?>
+<p:notes xmlns:a="http://schemas.openxmlformats.org/drawingml/2006/main" xmlns:r="http://schemas.openxmlformats.org/officeDocument/2006/relationships" xmlns:p="http://schemas.openxmlformats.org/presentationml/2006/main">
+  <p:cSld>
+    <p:spTree>
+      <p:nvGrpSpPr>
+        <p:cNvPr id="1" name=""/>
+        <p:cNvGrpSpPr/>
+        <p:nvPr/>
+      </p:nvGrpSpPr>
+      <p:grpSpPr>
+        <a:xfrm>
+          <a:off x="0" y="0"/>
+          <a:ext cx="0" cy="0"/>
+          <a:chOff x="0" y="0"/>
+          <a:chExt cx="0" cy="0"/>
+        </a:xfrm>
+      </p:grpSpPr>
+      <p:sp>
+        <p:nvSpPr>
+          <p:cNvPr id="2" name="Slide Image Placeholder 1"/>
+          <p:cNvSpPr>
+            <a:spLocks noGrp="1" noRot="1" noChangeAspect="1"/>
+          </p:cNvSpPr>
+          <p:nvPr>
+            <p:ph type="sldImg"/>
+          </p:nvPr>
+        </p:nvSpPr>
+        <p:spPr/>
+      </p:sp>
+      <p:sp>
+        <p:nvSpPr>
+          <p:cNvPr id="3" name="Notes Placeholder 2"/>
+          <p:cNvSpPr>
+            <a:spLocks noGrp="1"/>
+          </p:cNvSpPr>
+          <p:nvPr>
+            <p:ph type="body" idx="1"/>
+          </p:nvPr>
+        </p:nvSpPr>
+        <p:spPr/>
+        <p:txBody>
+          <a:bodyPr/>
+          <a:lstStyle/>
+          <a:p>
+            <a:r>
+              <a:rPr lang="en-US" baseline="0" dirty="0" smtClean="0"/>
+              <a:t>42 </a:t>
+            </a:r>
+            <a:r>
+              <a:rPr lang="en-US" baseline="0" dirty="0" smtClean="0"/>
+              <a:t>outliers </a:t>
+            </a:r>
+            <a:r>
+              <a:rPr lang="en-US" baseline="0" dirty="0" smtClean="0"/>
+              <a:t>removed</a:t>
+            </a:r>
+            <a:endParaRPr lang="en-US" dirty="0"/>
+          </a:p>
+        </p:txBody>
+      </p:sp>
+      <p:sp>
+        <p:nvSpPr>
+          <p:cNvPr id="4" name="Slide Number Placeholder 3"/>
+          <p:cNvSpPr>
+            <a:spLocks noGrp="1"/>
+          </p:cNvSpPr>
+          <p:nvPr>
+            <p:ph type="sldNum" sz="quarter" idx="10"/>
+          </p:nvPr>
+        </p:nvSpPr>
+        <p:spPr/>
+        <p:txBody>
+          <a:bodyPr/>
+          <a:lstStyle/>
+          <a:p>
+            <a:fld id="{0AC83BEF-6787-481E-AFCA-033D79C6C037}" type="slidenum">
+              <a:rPr lang="en-US" smtClean="0"/>
+              <a:t>9</a:t>
+            </a:fld>
+            <a:endParaRPr lang="en-US"/>
+          </a:p>
+        </p:txBody>
+      </p:sp>
+    </p:spTree>
+    <p:extLst>
+      <p:ext uri="{BB962C8B-B14F-4D97-AF65-F5344CB8AC3E}">
+        <p14:creationId xmlns:p14="http://schemas.microsoft.com/office/powerpoint/2010/main" val="1178951907"/>
+      </p:ext>
+    </p:extLst>
+  </p:cSld>
+  <p:clrMapOvr>
+    <a:masterClrMapping/>
+  </p:clrMapOvr>
+</p:notes>
+</file>
+
+<file path=ppt/notesSlides/notesSlide9.xml><?xml version="1.0" encoding="utf-8"?>
+<p:notes xmlns:a="http://schemas.openxmlformats.org/drawingml/2006/main" xmlns:r="http://schemas.openxmlformats.org/officeDocument/2006/relationships" xmlns:p="http://schemas.openxmlformats.org/presentationml/2006/main">
+  <p:cSld>
+    <p:spTree>
+      <p:nvGrpSpPr>
+        <p:cNvPr id="1" name=""/>
+        <p:cNvGrpSpPr/>
+        <p:nvPr/>
+      </p:nvGrpSpPr>
+      <p:grpSpPr>
+        <a:xfrm>
+          <a:off x="0" y="0"/>
+          <a:ext cx="0" cy="0"/>
+          <a:chOff x="0" y="0"/>
+          <a:chExt cx="0" cy="0"/>
+        </a:xfrm>
+      </p:grpSpPr>
+      <p:sp>
+        <p:nvSpPr>
+          <p:cNvPr id="2" name="Slide Image Placeholder 1"/>
+          <p:cNvSpPr>
+            <a:spLocks noGrp="1" noRot="1" noChangeAspect="1"/>
+          </p:cNvSpPr>
+          <p:nvPr>
+            <p:ph type="sldImg"/>
+          </p:nvPr>
+        </p:nvSpPr>
+        <p:spPr/>
+      </p:sp>
+      <p:sp>
+        <p:nvSpPr>
+          <p:cNvPr id="3" name="Notes Placeholder 2"/>
+          <p:cNvSpPr>
+            <a:spLocks noGrp="1"/>
+          </p:cNvSpPr>
+          <p:nvPr>
+            <p:ph type="body" idx="1"/>
+          </p:nvPr>
+        </p:nvSpPr>
+        <p:spPr/>
+        <p:txBody>
+          <a:bodyPr/>
+          <a:lstStyle/>
+          <a:p>
+            <a:r>
+              <a:rPr lang="en-US" dirty="0" smtClean="0"/>
+              <a:t>42 outliers removed</a:t>
+            </a:r>
+            <a:endParaRPr lang="en-US" dirty="0"/>
+          </a:p>
+        </p:txBody>
+      </p:sp>
+      <p:sp>
+        <p:nvSpPr>
+          <p:cNvPr id="4" name="Slide Number Placeholder 3"/>
+          <p:cNvSpPr>
+            <a:spLocks noGrp="1"/>
+          </p:cNvSpPr>
+          <p:nvPr>
+            <p:ph type="sldNum" sz="quarter" idx="10"/>
+          </p:nvPr>
+        </p:nvSpPr>
+        <p:spPr/>
+        <p:txBody>
+          <a:bodyPr/>
+          <a:lstStyle/>
+          <a:p>
+            <a:fld id="{0AC83BEF-6787-481E-AFCA-033D79C6C037}" type="slidenum">
+              <a:rPr lang="en-US" smtClean="0"/>
+              <a:t>10</a:t>
+            </a:fld>
+            <a:endParaRPr lang="en-US"/>
+          </a:p>
+        </p:txBody>
+      </p:sp>
+    </p:spTree>
+    <p:extLst>
+      <p:ext uri="{BB962C8B-B14F-4D97-AF65-F5344CB8AC3E}">
+        <p14:creationId xmlns:p14="http://schemas.microsoft.com/office/powerpoint/2010/main" val="2852839965"/>
       </p:ext>
     </p:extLst>
   </p:cSld>
@@ -1087,7 +1446,7 @@
           <a:p>
             <a:fld id="{BF30DF70-5848-4672-8949-A08F2F452BE1}" type="datetimeFigureOut">
               <a:rPr lang="en-US" smtClean="0"/>
-              <a:t>10/29/2018</a:t>
+              <a:t>10/30/2018</a:t>
             </a:fld>
             <a:endParaRPr lang="en-US"/>
           </a:p>
@@ -1257,7 +1616,7 @@
           <a:p>
             <a:fld id="{BF30DF70-5848-4672-8949-A08F2F452BE1}" type="datetimeFigureOut">
               <a:rPr lang="en-US" smtClean="0"/>
-              <a:t>10/29/2018</a:t>
+              <a:t>10/30/2018</a:t>
             </a:fld>
             <a:endParaRPr lang="en-US"/>
           </a:p>
@@ -1437,7 +1796,7 @@
           <a:p>
             <a:fld id="{BF30DF70-5848-4672-8949-A08F2F452BE1}" type="datetimeFigureOut">
               <a:rPr lang="en-US" smtClean="0"/>
-              <a:t>10/29/2018</a:t>
+              <a:t>10/30/2018</a:t>
             </a:fld>
             <a:endParaRPr lang="en-US"/>
           </a:p>
@@ -1607,7 +1966,7 @@
           <a:p>
             <a:fld id="{BF30DF70-5848-4672-8949-A08F2F452BE1}" type="datetimeFigureOut">
               <a:rPr lang="en-US" smtClean="0"/>
-              <a:t>10/29/2018</a:t>
+              <a:t>10/30/2018</a:t>
             </a:fld>
             <a:endParaRPr lang="en-US"/>
           </a:p>
@@ -1853,7 +2212,7 @@
           <a:p>
             <a:fld id="{BF30DF70-5848-4672-8949-A08F2F452BE1}" type="datetimeFigureOut">
               <a:rPr lang="en-US" smtClean="0"/>
-              <a:t>10/29/2018</a:t>
+              <a:t>10/30/2018</a:t>
             </a:fld>
             <a:endParaRPr lang="en-US"/>
           </a:p>
@@ -2141,7 +2500,7 @@
           <a:p>
             <a:fld id="{BF30DF70-5848-4672-8949-A08F2F452BE1}" type="datetimeFigureOut">
               <a:rPr lang="en-US" smtClean="0"/>
-              <a:t>10/29/2018</a:t>
+              <a:t>10/30/2018</a:t>
             </a:fld>
             <a:endParaRPr lang="en-US"/>
           </a:p>
@@ -2568,7 +2927,7 @@
           <a:p>
             <a:fld id="{BF30DF70-5848-4672-8949-A08F2F452BE1}" type="datetimeFigureOut">
               <a:rPr lang="en-US" smtClean="0"/>
-              <a:t>10/29/2018</a:t>
+              <a:t>10/30/2018</a:t>
             </a:fld>
             <a:endParaRPr lang="en-US"/>
           </a:p>
@@ -2686,7 +3045,7 @@
           <a:p>
             <a:fld id="{BF30DF70-5848-4672-8949-A08F2F452BE1}" type="datetimeFigureOut">
               <a:rPr lang="en-US" smtClean="0"/>
-              <a:t>10/29/2018</a:t>
+              <a:t>10/30/2018</a:t>
             </a:fld>
             <a:endParaRPr lang="en-US"/>
           </a:p>
@@ -2781,7 +3140,7 @@
           <a:p>
             <a:fld id="{BF30DF70-5848-4672-8949-A08F2F452BE1}" type="datetimeFigureOut">
               <a:rPr lang="en-US" smtClean="0"/>
-              <a:t>10/29/2018</a:t>
+              <a:t>10/30/2018</a:t>
             </a:fld>
             <a:endParaRPr lang="en-US"/>
           </a:p>
@@ -3058,7 +3417,7 @@
           <a:p>
             <a:fld id="{BF30DF70-5848-4672-8949-A08F2F452BE1}" type="datetimeFigureOut">
               <a:rPr lang="en-US" smtClean="0"/>
-              <a:t>10/29/2018</a:t>
+              <a:t>10/30/2018</a:t>
             </a:fld>
             <a:endParaRPr lang="en-US"/>
           </a:p>
@@ -3311,7 +3670,7 @@
           <a:p>
             <a:fld id="{BF30DF70-5848-4672-8949-A08F2F452BE1}" type="datetimeFigureOut">
               <a:rPr lang="en-US" smtClean="0"/>
-              <a:t>10/29/2018</a:t>
+              <a:t>10/30/2018</a:t>
             </a:fld>
             <a:endParaRPr lang="en-US"/>
           </a:p>
@@ -3524,7 +3883,7 @@
           <a:p>
             <a:fld id="{BF30DF70-5848-4672-8949-A08F2F452BE1}" type="datetimeFigureOut">
               <a:rPr lang="en-US" smtClean="0"/>
-              <a:t>10/29/2018</a:t>
+              <a:t>10/30/2018</a:t>
             </a:fld>
             <a:endParaRPr lang="en-US"/>
           </a:p>
@@ -4565,6 +4924,455 @@
   <p:clrMapOvr>
     <a:masterClrMapping/>
   </p:clrMapOvr>
+</p:sld>
+</file>
+
+<file path=ppt/slides/slide10.xml><?xml version="1.0" encoding="utf-8"?>
+<p:sld xmlns:a="http://schemas.openxmlformats.org/drawingml/2006/main" xmlns:r="http://schemas.openxmlformats.org/officeDocument/2006/relationships" xmlns:p="http://schemas.openxmlformats.org/presentationml/2006/main">
+  <p:cSld>
+    <p:spTree>
+      <p:nvGrpSpPr>
+        <p:cNvPr id="1" name=""/>
+        <p:cNvGrpSpPr/>
+        <p:nvPr/>
+      </p:nvGrpSpPr>
+      <p:grpSpPr>
+        <a:xfrm>
+          <a:off x="0" y="0"/>
+          <a:ext cx="0" cy="0"/>
+          <a:chOff x="0" y="0"/>
+          <a:chExt cx="0" cy="0"/>
+        </a:xfrm>
+      </p:grpSpPr>
+      <p:graphicFrame>
+        <p:nvGraphicFramePr>
+          <p:cNvPr id="2" name="Table 1"/>
+          <p:cNvGraphicFramePr>
+            <a:graphicFrameLocks noGrp="1"/>
+          </p:cNvGraphicFramePr>
+          <p:nvPr>
+            <p:extLst>
+              <p:ext uri="{D42A27DB-BD31-4B8C-83A1-F6EECF244321}">
+                <p14:modId xmlns:p14="http://schemas.microsoft.com/office/powerpoint/2010/main" val="3176934811"/>
+              </p:ext>
+            </p:extLst>
+          </p:nvPr>
+        </p:nvGraphicFramePr>
+        <p:xfrm>
+          <a:off x="76200" y="1452880"/>
+          <a:ext cx="8991600" cy="2595880"/>
+        </p:xfrm>
+        <a:graphic>
+          <a:graphicData uri="http://schemas.openxmlformats.org/drawingml/2006/table">
+            <a:tbl>
+              <a:tblPr firstRow="1" bandRow="1">
+                <a:tableStyleId>{5C22544A-7EE6-4342-B048-85BDC9FD1C3A}</a:tableStyleId>
+              </a:tblPr>
+              <a:tblGrid>
+                <a:gridCol w="1219200"/>
+                <a:gridCol w="1066800"/>
+                <a:gridCol w="1219200"/>
+                <a:gridCol w="2667000"/>
+                <a:gridCol w="1447800"/>
+                <a:gridCol w="1371600"/>
+              </a:tblGrid>
+              <a:tr h="370840">
+                <a:tc>
+                  <a:txBody>
+                    <a:bodyPr/>
+                    <a:lstStyle/>
+                    <a:p>
+                      <a:pPr algn="ctr"/>
+                      <a:endParaRPr lang="en-US" sz="1400" dirty="0"/>
+                    </a:p>
+                  </a:txBody>
+                  <a:tcPr/>
+                </a:tc>
+                <a:tc>
+                  <a:txBody>
+                    <a:bodyPr/>
+                    <a:lstStyle/>
+                    <a:p>
+                      <a:pPr algn="ctr"/>
+                      <a:r>
+                        <a:rPr lang="en-US" sz="1400" dirty="0" smtClean="0"/>
+                        <a:t>Total Assoc.</a:t>
+                      </a:r>
+                      <a:endParaRPr lang="en-US" sz="1400" dirty="0"/>
+                    </a:p>
+                  </a:txBody>
+                  <a:tcPr/>
+                </a:tc>
+                <a:tc>
+                  <a:txBody>
+                    <a:bodyPr/>
+                    <a:lstStyle/>
+                    <a:p>
+                      <a:pPr algn="ctr"/>
+                      <a:r>
+                        <a:rPr lang="en-US" sz="1400" dirty="0" smtClean="0"/>
+                        <a:t>Direct Effects</a:t>
+                      </a:r>
+                      <a:endParaRPr lang="en-US" sz="1400" dirty="0"/>
+                    </a:p>
+                  </a:txBody>
+                  <a:tcPr/>
+                </a:tc>
+                <a:tc>
+                  <a:txBody>
+                    <a:bodyPr/>
+                    <a:lstStyle/>
+                    <a:p>
+                      <a:pPr algn="ctr"/>
+                      <a:r>
+                        <a:rPr lang="en-US" sz="1400" dirty="0" smtClean="0"/>
+                        <a:t>Indirect Effects</a:t>
+                      </a:r>
+                      <a:endParaRPr lang="en-US" sz="1400" dirty="0"/>
+                    </a:p>
+                  </a:txBody>
+                  <a:tcPr/>
+                </a:tc>
+                <a:tc>
+                  <a:txBody>
+                    <a:bodyPr/>
+                    <a:lstStyle/>
+                    <a:p>
+                      <a:pPr algn="ctr"/>
+                      <a:r>
+                        <a:rPr lang="en-US" sz="1400" dirty="0" smtClean="0"/>
+                        <a:t>Total Effects</a:t>
+                      </a:r>
+                      <a:endParaRPr lang="en-US" sz="1400" dirty="0"/>
+                    </a:p>
+                  </a:txBody>
+                  <a:tcPr/>
+                </a:tc>
+                <a:tc>
+                  <a:txBody>
+                    <a:bodyPr/>
+                    <a:lstStyle/>
+                    <a:p>
+                      <a:pPr algn="ctr"/>
+                      <a:r>
+                        <a:rPr lang="en-US" sz="1400" dirty="0" smtClean="0"/>
+                        <a:t>Non-Causal</a:t>
+                      </a:r>
+                      <a:endParaRPr lang="en-US" sz="1400" dirty="0"/>
+                    </a:p>
+                  </a:txBody>
+                  <a:tcPr/>
+                </a:tc>
+              </a:tr>
+              <a:tr h="370840">
+                <a:tc>
+                  <a:txBody>
+                    <a:bodyPr/>
+                    <a:lstStyle/>
+                    <a:p>
+                      <a:pPr marL="0" marR="0" indent="0" algn="l" defTabSz="914400" rtl="0" eaLnBrk="1" fontAlgn="auto" latinLnBrk="0" hangingPunct="1">
+                        <a:lnSpc>
+                          <a:spcPct val="100000"/>
+                        </a:lnSpc>
+                        <a:spcBef>
+                          <a:spcPts val="0"/>
+                        </a:spcBef>
+                        <a:spcAft>
+                          <a:spcPts val="0"/>
+                        </a:spcAft>
+                        <a:buClrTx/>
+                        <a:buSzTx/>
+                        <a:buFontTx/>
+                        <a:buNone/>
+                        <a:tabLst/>
+                        <a:defRPr/>
+                      </a:pPr>
+                      <a:r>
+                        <a:rPr lang="en-US" sz="1400" baseline="0" dirty="0" smtClean="0"/>
+                        <a:t>N = 1,958</a:t>
+                      </a:r>
+                      <a:endParaRPr lang="en-US" sz="1400" dirty="0" smtClean="0"/>
+                    </a:p>
+                    <a:p>
+                      <a:endParaRPr lang="en-US" sz="1400" baseline="0" dirty="0" smtClean="0"/>
+                    </a:p>
+                    <a:p>
+                      <a:r>
+                        <a:rPr lang="en-US" sz="1400" baseline="0" dirty="0" smtClean="0"/>
+                        <a:t>42 outliers removed</a:t>
+                      </a:r>
+                    </a:p>
+                    <a:p>
+                      <a:endParaRPr lang="en-US" sz="1400" baseline="0" dirty="0" smtClean="0"/>
+                    </a:p>
+                  </a:txBody>
+                  <a:tcPr/>
+                </a:tc>
+                <a:tc>
+                  <a:txBody>
+                    <a:bodyPr/>
+                    <a:lstStyle/>
+                    <a:p>
+                      <a:pPr algn="r"/>
+                      <a:r>
+                        <a:rPr lang="en-US" sz="1400" dirty="0" smtClean="0"/>
+                        <a:t>ORIGINAL</a:t>
+                      </a:r>
+                    </a:p>
+                    <a:p>
+                      <a:pPr algn="r"/>
+                      <a:r>
+                        <a:rPr lang="en-US" sz="1400" dirty="0" smtClean="0"/>
+                        <a:t>0.019</a:t>
+                      </a:r>
+                      <a:endParaRPr lang="en-US" sz="1400" dirty="0"/>
+                    </a:p>
+                  </a:txBody>
+                  <a:tcPr/>
+                </a:tc>
+                <a:tc>
+                  <a:txBody>
+                    <a:bodyPr/>
+                    <a:lstStyle/>
+                    <a:p>
+                      <a:pPr algn="r"/>
+                      <a:r>
+                        <a:rPr lang="en-US" sz="1400" dirty="0" smtClean="0"/>
+                        <a:t>ORIGINAL</a:t>
+                      </a:r>
+                    </a:p>
+                    <a:p>
+                      <a:pPr algn="r"/>
+                      <a:r>
+                        <a:rPr lang="en-US" sz="1400" dirty="0" smtClean="0"/>
+                        <a:t>-0.085</a:t>
+                      </a:r>
+                    </a:p>
+                    <a:p>
+                      <a:pPr algn="r"/>
+                      <a:endParaRPr lang="en-US" sz="1400" dirty="0" smtClean="0"/>
+                    </a:p>
+                    <a:p>
+                      <a:pPr algn="r"/>
+                      <a:r>
+                        <a:rPr lang="en-US" sz="1400" dirty="0" smtClean="0"/>
+                        <a:t>GYEAR</a:t>
+                      </a:r>
+                    </a:p>
+                    <a:p>
+                      <a:pPr algn="r"/>
+                      <a:r>
+                        <a:rPr lang="en-US" sz="1400" dirty="0" smtClean="0"/>
+                        <a:t>-0.213</a:t>
+                      </a:r>
+                    </a:p>
+                    <a:p>
+                      <a:pPr algn="r"/>
+                      <a:endParaRPr lang="en-US" sz="1400" dirty="0" smtClean="0"/>
+                    </a:p>
+                    <a:p>
+                      <a:pPr algn="r"/>
+                      <a:r>
+                        <a:rPr lang="en-US" sz="1400" dirty="0" smtClean="0"/>
+                        <a:t>RATIOCIT</a:t>
+                      </a:r>
+                    </a:p>
+                    <a:p>
+                      <a:pPr algn="r"/>
+                      <a:r>
+                        <a:rPr lang="en-US" sz="1400" dirty="0" smtClean="0"/>
+                        <a:t>0.092</a:t>
+                      </a:r>
+                    </a:p>
+                    <a:p>
+                      <a:pPr algn="r"/>
+                      <a:endParaRPr lang="en-US" sz="1400" dirty="0" smtClean="0"/>
+                    </a:p>
+                    <a:p>
+                      <a:pPr algn="r"/>
+                      <a:r>
+                        <a:rPr lang="en-US" sz="1400" dirty="0" smtClean="0"/>
+                        <a:t>Total = -0.206</a:t>
+                      </a:r>
+                    </a:p>
+                  </a:txBody>
+                  <a:tcPr/>
+                </a:tc>
+                <a:tc>
+                  <a:txBody>
+                    <a:bodyPr/>
+                    <a:lstStyle/>
+                    <a:p>
+                      <a:pPr algn="r"/>
+                      <a:r>
+                        <a:rPr lang="it-IT" sz="1400" dirty="0" smtClean="0"/>
+                        <a:t>via GENERAL</a:t>
+                      </a:r>
+                    </a:p>
+                    <a:p>
+                      <a:pPr algn="r"/>
+                      <a:r>
+                        <a:rPr lang="it-IT" sz="1400" dirty="0" smtClean="0"/>
+                        <a:t>(0.169)(0.569) = 0.096  </a:t>
+                      </a:r>
+                    </a:p>
+                    <a:p>
+                      <a:pPr algn="r"/>
+                      <a:endParaRPr lang="it-IT" sz="1400" dirty="0" smtClean="0"/>
+                    </a:p>
+                    <a:p>
+                      <a:pPr algn="r"/>
+                      <a:r>
+                        <a:rPr lang="it-IT" sz="1400" dirty="0" smtClean="0"/>
+                        <a:t>via CLAIMS</a:t>
+                      </a:r>
+                    </a:p>
+                    <a:p>
+                      <a:pPr algn="r"/>
+                      <a:r>
+                        <a:rPr lang="it-IT" sz="1400" dirty="0" smtClean="0"/>
+                        <a:t>ORIGINAL</a:t>
+                      </a:r>
+                      <a:r>
+                        <a:rPr lang="it-IT" sz="1400" baseline="0" dirty="0" smtClean="0"/>
+                        <a:t> </a:t>
+                      </a:r>
+                      <a:r>
+                        <a:rPr lang="it-IT" sz="1400" dirty="0" smtClean="0"/>
+                        <a:t>(0.090)(0.063) = 0.006 </a:t>
+                      </a:r>
+                    </a:p>
+                    <a:p>
+                      <a:pPr algn="r"/>
+                      <a:r>
+                        <a:rPr lang="it-IT" sz="1400" dirty="0" smtClean="0"/>
+                        <a:t>GENERAL (0.050)(0.063) = 0.003 </a:t>
+                      </a:r>
+                    </a:p>
+                    <a:p>
+                      <a:pPr algn="r"/>
+                      <a:r>
+                        <a:rPr lang="it-IT" sz="1400" dirty="0" smtClean="0"/>
+                        <a:t>GYEAR (0.046)(0.063) = 0.003 </a:t>
+                      </a:r>
+                    </a:p>
+                    <a:p>
+                      <a:pPr algn="r"/>
+                      <a:endParaRPr lang="en-US" sz="1400" dirty="0" smtClean="0"/>
+                    </a:p>
+                    <a:p>
+                      <a:pPr algn="r"/>
+                      <a:r>
+                        <a:rPr lang="en-US" sz="1400" dirty="0" smtClean="0"/>
+                        <a:t>Total = </a:t>
+                      </a:r>
+                      <a:r>
+                        <a:rPr lang="en-US" sz="1400" dirty="0" smtClean="0"/>
+                        <a:t>0.108</a:t>
+                      </a:r>
+                      <a:endParaRPr lang="en-US" sz="1400" dirty="0" smtClean="0"/>
+                    </a:p>
+                    <a:p>
+                      <a:pPr algn="r"/>
+                      <a:endParaRPr lang="en-US" sz="1400" dirty="0"/>
+                    </a:p>
+                  </a:txBody>
+                  <a:tcPr/>
+                </a:tc>
+                <a:tc>
+                  <a:txBody>
+                    <a:bodyPr/>
+                    <a:lstStyle/>
+                    <a:p>
+                      <a:pPr algn="r"/>
+                      <a:r>
+                        <a:rPr lang="en-US" sz="1400" dirty="0" smtClean="0"/>
+                        <a:t>-0.206 + </a:t>
+                      </a:r>
+                      <a:r>
+                        <a:rPr lang="en-US" sz="1400" dirty="0" smtClean="0"/>
+                        <a:t>0.108 </a:t>
+                      </a:r>
+                      <a:r>
+                        <a:rPr lang="en-US" sz="1400" dirty="0" smtClean="0"/>
+                        <a:t>= </a:t>
+                      </a:r>
+                    </a:p>
+                    <a:p>
+                      <a:pPr algn="r"/>
+                      <a:r>
+                        <a:rPr lang="en-US" sz="1400" dirty="0" smtClean="0"/>
+                        <a:t>-</a:t>
+                      </a:r>
+                      <a:r>
+                        <a:rPr lang="en-US" sz="1400" dirty="0" smtClean="0"/>
+                        <a:t>0.098 </a:t>
+                      </a:r>
+                      <a:endParaRPr lang="en-US" sz="1400" dirty="0" smtClean="0"/>
+                    </a:p>
+                    <a:p>
+                      <a:pPr algn="r"/>
+                      <a:endParaRPr lang="en-US" sz="1400" dirty="0"/>
+                    </a:p>
+                  </a:txBody>
+                  <a:tcPr/>
+                </a:tc>
+                <a:tc>
+                  <a:txBody>
+                    <a:bodyPr/>
+                    <a:lstStyle/>
+                    <a:p>
+                      <a:pPr algn="r"/>
+                      <a:r>
+                        <a:rPr lang="en-US" sz="1400" dirty="0" smtClean="0"/>
+                        <a:t>0.019-(-</a:t>
+                      </a:r>
+                      <a:r>
+                        <a:rPr lang="en-US" sz="1400" dirty="0" smtClean="0"/>
+                        <a:t>0.098) </a:t>
+                      </a:r>
+                      <a:r>
+                        <a:rPr lang="en-US" sz="1400" dirty="0" smtClean="0"/>
+                        <a:t>= </a:t>
+                      </a:r>
+                      <a:br>
+                        <a:rPr lang="en-US" sz="1400" dirty="0" smtClean="0"/>
+                      </a:br>
+                      <a:r>
+                        <a:rPr lang="en-US" sz="1400" dirty="0" smtClean="0"/>
+                        <a:t>0.117</a:t>
+                      </a:r>
+                      <a:endParaRPr lang="en-US" sz="1400" dirty="0" smtClean="0"/>
+                    </a:p>
+                    <a:p>
+                      <a:pPr algn="r"/>
+                      <a:endParaRPr lang="en-US" sz="1400" dirty="0"/>
+                    </a:p>
+                  </a:txBody>
+                  <a:tcPr/>
+                </a:tc>
+              </a:tr>
+            </a:tbl>
+          </a:graphicData>
+        </a:graphic>
+      </p:graphicFrame>
+    </p:spTree>
+    <p:extLst>
+      <p:ext uri="{BB962C8B-B14F-4D97-AF65-F5344CB8AC3E}">
+        <p14:creationId xmlns:p14="http://schemas.microsoft.com/office/powerpoint/2010/main" val="4095713054"/>
+      </p:ext>
+    </p:extLst>
+  </p:cSld>
+  <p:clrMapOvr>
+    <a:masterClrMapping/>
+  </p:clrMapOvr>
+  <p:timing>
+    <p:tnLst>
+      <p:par>
+        <p:cTn id="1" dur="indefinite" restart="never" nodeType="tmRoot"/>
+      </p:par>
+    </p:tnLst>
+  </p:timing>
 </p:sld>
 </file>
 
@@ -9389,7 +10197,6 @@
               <a:rPr lang="en-US" sz="1100" dirty="0" smtClean="0"/>
               <a:t>e = 0.985</a:t>
             </a:r>
-            <a:endParaRPr lang="en-US" sz="1100" dirty="0" smtClean="0"/>
           </a:p>
         </p:txBody>
       </p:sp>
@@ -9419,7 +10226,6 @@
               <a:rPr lang="en-US" sz="1100" dirty="0" smtClean="0"/>
               <a:t>e = 0.992</a:t>
             </a:r>
-            <a:endParaRPr lang="en-US" sz="1100" dirty="0" smtClean="0"/>
           </a:p>
         </p:txBody>
       </p:sp>
@@ -9449,7 +10255,6 @@
               <a:rPr lang="en-US" sz="1100" dirty="0" smtClean="0"/>
               <a:t>e = 0.753</a:t>
             </a:r>
-            <a:endParaRPr lang="en-US" sz="1100" dirty="0" smtClean="0"/>
           </a:p>
         </p:txBody>
       </p:sp>
@@ -9474,6 +10279,1317 @@
 </file>
 
 <file path=ppt/slides/slide7.xml><?xml version="1.0" encoding="utf-8"?>
+<p:sld xmlns:a="http://schemas.openxmlformats.org/drawingml/2006/main" xmlns:r="http://schemas.openxmlformats.org/officeDocument/2006/relationships" xmlns:p="http://schemas.openxmlformats.org/presentationml/2006/main">
+  <p:cSld>
+    <p:spTree>
+      <p:nvGrpSpPr>
+        <p:cNvPr id="1" name=""/>
+        <p:cNvGrpSpPr/>
+        <p:nvPr/>
+      </p:nvGrpSpPr>
+      <p:grpSpPr>
+        <a:xfrm>
+          <a:off x="0" y="0"/>
+          <a:ext cx="0" cy="0"/>
+          <a:chOff x="0" y="0"/>
+          <a:chExt cx="0" cy="0"/>
+        </a:xfrm>
+      </p:grpSpPr>
+      <p:sp>
+        <p:nvSpPr>
+          <p:cNvPr id="4" name="Rounded Rectangle 3"/>
+          <p:cNvSpPr/>
+          <p:nvPr/>
+        </p:nvSpPr>
+        <p:spPr>
+          <a:xfrm>
+            <a:off x="6781800" y="2628900"/>
+            <a:ext cx="1371600" cy="457200"/>
+          </a:xfrm>
+          <a:prstGeom prst="roundRect">
+            <a:avLst/>
+          </a:prstGeom>
+        </p:spPr>
+        <p:style>
+          <a:lnRef idx="2">
+            <a:schemeClr val="accent1">
+              <a:shade val="50000"/>
+            </a:schemeClr>
+          </a:lnRef>
+          <a:fillRef idx="1">
+            <a:schemeClr val="accent1"/>
+          </a:fillRef>
+          <a:effectRef idx="0">
+            <a:schemeClr val="accent1"/>
+          </a:effectRef>
+          <a:fontRef idx="minor">
+            <a:schemeClr val="lt1"/>
+          </a:fontRef>
+        </p:style>
+        <p:txBody>
+          <a:bodyPr rtlCol="0" anchor="ctr"/>
+          <a:lstStyle/>
+          <a:p>
+            <a:pPr algn="ctr"/>
+            <a:r>
+              <a:rPr lang="en-US" dirty="0" err="1" smtClean="0"/>
+              <a:t>CRECEIVEln</a:t>
+            </a:r>
+            <a:endParaRPr lang="en-US" dirty="0"/>
+          </a:p>
+        </p:txBody>
+      </p:sp>
+      <p:sp>
+        <p:nvSpPr>
+          <p:cNvPr id="5" name="Rounded Rectangle 4"/>
+          <p:cNvSpPr/>
+          <p:nvPr/>
+        </p:nvSpPr>
+        <p:spPr>
+          <a:xfrm>
+            <a:off x="4343400" y="2628900"/>
+            <a:ext cx="1371600" cy="457200"/>
+          </a:xfrm>
+          <a:prstGeom prst="roundRect">
+            <a:avLst/>
+          </a:prstGeom>
+        </p:spPr>
+        <p:style>
+          <a:lnRef idx="2">
+            <a:schemeClr val="accent1">
+              <a:shade val="50000"/>
+            </a:schemeClr>
+          </a:lnRef>
+          <a:fillRef idx="1">
+            <a:schemeClr val="accent1"/>
+          </a:fillRef>
+          <a:effectRef idx="0">
+            <a:schemeClr val="accent1"/>
+          </a:effectRef>
+          <a:fontRef idx="minor">
+            <a:schemeClr val="lt1"/>
+          </a:fontRef>
+        </p:style>
+        <p:txBody>
+          <a:bodyPr rtlCol="0" anchor="ctr"/>
+          <a:lstStyle/>
+          <a:p>
+            <a:pPr algn="ctr"/>
+            <a:r>
+              <a:rPr lang="en-US" dirty="0" smtClean="0"/>
+              <a:t>CLAIMS</a:t>
+            </a:r>
+            <a:endParaRPr lang="en-US" dirty="0"/>
+          </a:p>
+        </p:txBody>
+      </p:sp>
+      <p:sp>
+        <p:nvSpPr>
+          <p:cNvPr id="6" name="Rounded Rectangle 5"/>
+          <p:cNvSpPr/>
+          <p:nvPr/>
+        </p:nvSpPr>
+        <p:spPr>
+          <a:xfrm>
+            <a:off x="685800" y="2628900"/>
+            <a:ext cx="1371600" cy="457200"/>
+          </a:xfrm>
+          <a:prstGeom prst="roundRect">
+            <a:avLst/>
+          </a:prstGeom>
+        </p:spPr>
+        <p:style>
+          <a:lnRef idx="2">
+            <a:schemeClr val="accent1">
+              <a:shade val="50000"/>
+            </a:schemeClr>
+          </a:lnRef>
+          <a:fillRef idx="1">
+            <a:schemeClr val="accent1"/>
+          </a:fillRef>
+          <a:effectRef idx="0">
+            <a:schemeClr val="accent1"/>
+          </a:effectRef>
+          <a:fontRef idx="minor">
+            <a:schemeClr val="lt1"/>
+          </a:fontRef>
+        </p:style>
+        <p:txBody>
+          <a:bodyPr rtlCol="0" anchor="ctr"/>
+          <a:lstStyle/>
+          <a:p>
+            <a:pPr algn="ctr"/>
+            <a:r>
+              <a:rPr lang="en-US" dirty="0" smtClean="0"/>
+              <a:t>ORIGINAL</a:t>
+            </a:r>
+            <a:endParaRPr lang="en-US" dirty="0"/>
+          </a:p>
+        </p:txBody>
+      </p:sp>
+      <p:sp>
+        <p:nvSpPr>
+          <p:cNvPr id="7" name="Rounded Rectangle 6"/>
+          <p:cNvSpPr/>
+          <p:nvPr/>
+        </p:nvSpPr>
+        <p:spPr>
+          <a:xfrm>
+            <a:off x="2057400" y="952500"/>
+            <a:ext cx="1371600" cy="457200"/>
+          </a:xfrm>
+          <a:prstGeom prst="roundRect">
+            <a:avLst/>
+          </a:prstGeom>
+        </p:spPr>
+        <p:style>
+          <a:lnRef idx="2">
+            <a:schemeClr val="accent1">
+              <a:shade val="50000"/>
+            </a:schemeClr>
+          </a:lnRef>
+          <a:fillRef idx="1">
+            <a:schemeClr val="accent1"/>
+          </a:fillRef>
+          <a:effectRef idx="0">
+            <a:schemeClr val="accent1"/>
+          </a:effectRef>
+          <a:fontRef idx="minor">
+            <a:schemeClr val="lt1"/>
+          </a:fontRef>
+        </p:style>
+        <p:txBody>
+          <a:bodyPr rtlCol="0" anchor="ctr"/>
+          <a:lstStyle/>
+          <a:p>
+            <a:pPr algn="ctr"/>
+            <a:r>
+              <a:rPr lang="en-US" dirty="0" smtClean="0"/>
+              <a:t>GENERAL</a:t>
+            </a:r>
+            <a:endParaRPr lang="en-US" dirty="0"/>
+          </a:p>
+        </p:txBody>
+      </p:sp>
+      <p:sp>
+        <p:nvSpPr>
+          <p:cNvPr id="8" name="Rounded Rectangle 7"/>
+          <p:cNvSpPr/>
+          <p:nvPr/>
+        </p:nvSpPr>
+        <p:spPr>
+          <a:xfrm>
+            <a:off x="4343400" y="1638300"/>
+            <a:ext cx="1371600" cy="457200"/>
+          </a:xfrm>
+          <a:prstGeom prst="roundRect">
+            <a:avLst/>
+          </a:prstGeom>
+        </p:spPr>
+        <p:style>
+          <a:lnRef idx="2">
+            <a:schemeClr val="accent1">
+              <a:shade val="50000"/>
+            </a:schemeClr>
+          </a:lnRef>
+          <a:fillRef idx="1">
+            <a:schemeClr val="accent1"/>
+          </a:fillRef>
+          <a:effectRef idx="0">
+            <a:schemeClr val="accent1"/>
+          </a:effectRef>
+          <a:fontRef idx="minor">
+            <a:schemeClr val="lt1"/>
+          </a:fontRef>
+        </p:style>
+        <p:txBody>
+          <a:bodyPr rtlCol="0" anchor="ctr"/>
+          <a:lstStyle/>
+          <a:p>
+            <a:pPr algn="ctr"/>
+            <a:r>
+              <a:rPr lang="en-US" dirty="0" smtClean="0"/>
+              <a:t>GYEAR</a:t>
+            </a:r>
+            <a:endParaRPr lang="en-US" dirty="0"/>
+          </a:p>
+        </p:txBody>
+      </p:sp>
+      <p:sp>
+        <p:nvSpPr>
+          <p:cNvPr id="9" name="Rounded Rectangle 8"/>
+          <p:cNvSpPr/>
+          <p:nvPr/>
+        </p:nvSpPr>
+        <p:spPr>
+          <a:xfrm>
+            <a:off x="4343400" y="3695700"/>
+            <a:ext cx="1371600" cy="457200"/>
+          </a:xfrm>
+          <a:prstGeom prst="roundRect">
+            <a:avLst/>
+          </a:prstGeom>
+        </p:spPr>
+        <p:style>
+          <a:lnRef idx="2">
+            <a:schemeClr val="accent1">
+              <a:shade val="50000"/>
+            </a:schemeClr>
+          </a:lnRef>
+          <a:fillRef idx="1">
+            <a:schemeClr val="accent1"/>
+          </a:fillRef>
+          <a:effectRef idx="0">
+            <a:schemeClr val="accent1"/>
+          </a:effectRef>
+          <a:fontRef idx="minor">
+            <a:schemeClr val="lt1"/>
+          </a:fontRef>
+        </p:style>
+        <p:txBody>
+          <a:bodyPr rtlCol="0" anchor="ctr"/>
+          <a:lstStyle/>
+          <a:p>
+            <a:pPr algn="ctr"/>
+            <a:r>
+              <a:rPr lang="en-US" dirty="0" smtClean="0"/>
+              <a:t>RATIOCIT</a:t>
+            </a:r>
+            <a:endParaRPr lang="en-US" dirty="0"/>
+          </a:p>
+        </p:txBody>
+      </p:sp>
+      <p:cxnSp>
+        <p:nvCxnSpPr>
+          <p:cNvPr id="11" name="Straight Arrow Connector 10"/>
+          <p:cNvCxnSpPr>
+            <a:stCxn id="5" idx="3"/>
+            <a:endCxn id="4" idx="1"/>
+          </p:cNvCxnSpPr>
+          <p:nvPr/>
+        </p:nvCxnSpPr>
+        <p:spPr>
+          <a:xfrm>
+            <a:off x="5715000" y="2857500"/>
+            <a:ext cx="1066800" cy="0"/>
+          </a:xfrm>
+          <a:prstGeom prst="straightConnector1">
+            <a:avLst/>
+          </a:prstGeom>
+          <a:ln w="25400">
+            <a:solidFill>
+              <a:schemeClr val="tx1"/>
+            </a:solidFill>
+            <a:tailEnd type="triangle" w="lg" len="lg"/>
+          </a:ln>
+        </p:spPr>
+        <p:style>
+          <a:lnRef idx="1">
+            <a:schemeClr val="accent1"/>
+          </a:lnRef>
+          <a:fillRef idx="0">
+            <a:schemeClr val="accent1"/>
+          </a:fillRef>
+          <a:effectRef idx="0">
+            <a:schemeClr val="accent1"/>
+          </a:effectRef>
+          <a:fontRef idx="minor">
+            <a:schemeClr val="tx1"/>
+          </a:fontRef>
+        </p:style>
+      </p:cxnSp>
+      <p:cxnSp>
+        <p:nvCxnSpPr>
+          <p:cNvPr id="21" name="Straight Arrow Connector 20"/>
+          <p:cNvCxnSpPr>
+            <a:stCxn id="9" idx="3"/>
+            <a:endCxn id="4" idx="1"/>
+          </p:cNvCxnSpPr>
+          <p:nvPr/>
+        </p:nvCxnSpPr>
+        <p:spPr>
+          <a:xfrm flipV="1">
+            <a:off x="5715000" y="2857500"/>
+            <a:ext cx="1066800" cy="1066800"/>
+          </a:xfrm>
+          <a:prstGeom prst="straightConnector1">
+            <a:avLst/>
+          </a:prstGeom>
+          <a:ln w="25400">
+            <a:solidFill>
+              <a:schemeClr val="tx1"/>
+            </a:solidFill>
+            <a:tailEnd type="triangle" w="lg" len="lg"/>
+          </a:ln>
+        </p:spPr>
+        <p:style>
+          <a:lnRef idx="1">
+            <a:schemeClr val="accent1"/>
+          </a:lnRef>
+          <a:fillRef idx="0">
+            <a:schemeClr val="accent1"/>
+          </a:fillRef>
+          <a:effectRef idx="0">
+            <a:schemeClr val="accent1"/>
+          </a:effectRef>
+          <a:fontRef idx="minor">
+            <a:schemeClr val="tx1"/>
+          </a:fontRef>
+        </p:style>
+      </p:cxnSp>
+      <p:cxnSp>
+        <p:nvCxnSpPr>
+          <p:cNvPr id="23" name="Straight Arrow Connector 22"/>
+          <p:cNvCxnSpPr>
+            <a:stCxn id="8" idx="3"/>
+            <a:endCxn id="4" idx="1"/>
+          </p:cNvCxnSpPr>
+          <p:nvPr/>
+        </p:nvCxnSpPr>
+        <p:spPr>
+          <a:xfrm>
+            <a:off x="5715000" y="1866900"/>
+            <a:ext cx="1066800" cy="990600"/>
+          </a:xfrm>
+          <a:prstGeom prst="straightConnector1">
+            <a:avLst/>
+          </a:prstGeom>
+          <a:ln w="25400">
+            <a:solidFill>
+              <a:schemeClr val="tx1"/>
+            </a:solidFill>
+            <a:tailEnd type="triangle" w="lg" len="lg"/>
+          </a:ln>
+        </p:spPr>
+        <p:style>
+          <a:lnRef idx="1">
+            <a:schemeClr val="accent1"/>
+          </a:lnRef>
+          <a:fillRef idx="0">
+            <a:schemeClr val="accent1"/>
+          </a:fillRef>
+          <a:effectRef idx="0">
+            <a:schemeClr val="accent1"/>
+          </a:effectRef>
+          <a:fontRef idx="minor">
+            <a:schemeClr val="tx1"/>
+          </a:fontRef>
+        </p:style>
+      </p:cxnSp>
+      <p:cxnSp>
+        <p:nvCxnSpPr>
+          <p:cNvPr id="25" name="Elbow Connector 24"/>
+          <p:cNvCxnSpPr>
+            <a:stCxn id="7" idx="3"/>
+            <a:endCxn id="4" idx="0"/>
+          </p:cNvCxnSpPr>
+          <p:nvPr/>
+        </p:nvCxnSpPr>
+        <p:spPr>
+          <a:xfrm>
+            <a:off x="3429000" y="1181100"/>
+            <a:ext cx="4038600" cy="1447800"/>
+          </a:xfrm>
+          <a:prstGeom prst="bentConnector2">
+            <a:avLst/>
+          </a:prstGeom>
+          <a:ln w="25400">
+            <a:solidFill>
+              <a:schemeClr val="tx1"/>
+            </a:solidFill>
+            <a:tailEnd type="triangle" w="lg" len="lg"/>
+          </a:ln>
+        </p:spPr>
+        <p:style>
+          <a:lnRef idx="1">
+            <a:schemeClr val="accent1"/>
+          </a:lnRef>
+          <a:fillRef idx="0">
+            <a:schemeClr val="accent1"/>
+          </a:fillRef>
+          <a:effectRef idx="0">
+            <a:schemeClr val="accent1"/>
+          </a:effectRef>
+          <a:fontRef idx="minor">
+            <a:schemeClr val="tx1"/>
+          </a:fontRef>
+        </p:style>
+      </p:cxnSp>
+      <p:cxnSp>
+        <p:nvCxnSpPr>
+          <p:cNvPr id="22" name="Straight Arrow Connector 21"/>
+          <p:cNvCxnSpPr>
+            <a:stCxn id="7" idx="2"/>
+            <a:endCxn id="5" idx="1"/>
+          </p:cNvCxnSpPr>
+          <p:nvPr/>
+        </p:nvCxnSpPr>
+        <p:spPr>
+          <a:xfrm>
+            <a:off x="2743200" y="1409700"/>
+            <a:ext cx="1600200" cy="1447800"/>
+          </a:xfrm>
+          <a:prstGeom prst="straightConnector1">
+            <a:avLst/>
+          </a:prstGeom>
+          <a:ln w="25400">
+            <a:solidFill>
+              <a:schemeClr val="tx1"/>
+            </a:solidFill>
+            <a:tailEnd type="triangle" w="lg" len="lg"/>
+          </a:ln>
+        </p:spPr>
+        <p:style>
+          <a:lnRef idx="1">
+            <a:schemeClr val="accent1"/>
+          </a:lnRef>
+          <a:fillRef idx="0">
+            <a:schemeClr val="accent1"/>
+          </a:fillRef>
+          <a:effectRef idx="0">
+            <a:schemeClr val="accent1"/>
+          </a:effectRef>
+          <a:fontRef idx="minor">
+            <a:schemeClr val="tx1"/>
+          </a:fontRef>
+        </p:style>
+      </p:cxnSp>
+      <p:cxnSp>
+        <p:nvCxnSpPr>
+          <p:cNvPr id="26" name="Straight Arrow Connector 25"/>
+          <p:cNvCxnSpPr>
+            <a:stCxn id="6" idx="3"/>
+            <a:endCxn id="5" idx="1"/>
+          </p:cNvCxnSpPr>
+          <p:nvPr/>
+        </p:nvCxnSpPr>
+        <p:spPr>
+          <a:xfrm>
+            <a:off x="2057400" y="2857500"/>
+            <a:ext cx="2286000" cy="0"/>
+          </a:xfrm>
+          <a:prstGeom prst="straightConnector1">
+            <a:avLst/>
+          </a:prstGeom>
+          <a:ln w="25400">
+            <a:solidFill>
+              <a:schemeClr val="tx1"/>
+            </a:solidFill>
+            <a:tailEnd type="triangle" w="lg" len="lg"/>
+          </a:ln>
+        </p:spPr>
+        <p:style>
+          <a:lnRef idx="1">
+            <a:schemeClr val="accent1"/>
+          </a:lnRef>
+          <a:fillRef idx="0">
+            <a:schemeClr val="accent1"/>
+          </a:fillRef>
+          <a:effectRef idx="0">
+            <a:schemeClr val="accent1"/>
+          </a:effectRef>
+          <a:fontRef idx="minor">
+            <a:schemeClr val="tx1"/>
+          </a:fontRef>
+        </p:style>
+      </p:cxnSp>
+      <p:cxnSp>
+        <p:nvCxnSpPr>
+          <p:cNvPr id="30" name="Straight Arrow Connector 29"/>
+          <p:cNvCxnSpPr>
+            <a:stCxn id="8" idx="2"/>
+            <a:endCxn id="5" idx="0"/>
+          </p:cNvCxnSpPr>
+          <p:nvPr/>
+        </p:nvCxnSpPr>
+        <p:spPr>
+          <a:xfrm>
+            <a:off x="5029200" y="2095500"/>
+            <a:ext cx="0" cy="533400"/>
+          </a:xfrm>
+          <a:prstGeom prst="straightConnector1">
+            <a:avLst/>
+          </a:prstGeom>
+          <a:ln w="25400">
+            <a:solidFill>
+              <a:schemeClr val="tx1"/>
+            </a:solidFill>
+            <a:tailEnd type="triangle" w="lg" len="lg"/>
+          </a:ln>
+        </p:spPr>
+        <p:style>
+          <a:lnRef idx="1">
+            <a:schemeClr val="accent1"/>
+          </a:lnRef>
+          <a:fillRef idx="0">
+            <a:schemeClr val="accent1"/>
+          </a:fillRef>
+          <a:effectRef idx="0">
+            <a:schemeClr val="accent1"/>
+          </a:effectRef>
+          <a:fontRef idx="minor">
+            <a:schemeClr val="tx1"/>
+          </a:fontRef>
+        </p:style>
+      </p:cxnSp>
+      <p:cxnSp>
+        <p:nvCxnSpPr>
+          <p:cNvPr id="32" name="Straight Arrow Connector 31"/>
+          <p:cNvCxnSpPr>
+            <a:stCxn id="9" idx="0"/>
+            <a:endCxn id="5" idx="2"/>
+          </p:cNvCxnSpPr>
+          <p:nvPr/>
+        </p:nvCxnSpPr>
+        <p:spPr>
+          <a:xfrm flipV="1">
+            <a:off x="5029200" y="3086100"/>
+            <a:ext cx="0" cy="609600"/>
+          </a:xfrm>
+          <a:prstGeom prst="straightConnector1">
+            <a:avLst/>
+          </a:prstGeom>
+          <a:ln w="25400">
+            <a:solidFill>
+              <a:schemeClr val="tx1"/>
+            </a:solidFill>
+            <a:tailEnd type="triangle" w="lg" len="lg"/>
+          </a:ln>
+        </p:spPr>
+        <p:style>
+          <a:lnRef idx="1">
+            <a:schemeClr val="accent1"/>
+          </a:lnRef>
+          <a:fillRef idx="0">
+            <a:schemeClr val="accent1"/>
+          </a:fillRef>
+          <a:effectRef idx="0">
+            <a:schemeClr val="accent1"/>
+          </a:effectRef>
+          <a:fontRef idx="minor">
+            <a:schemeClr val="tx1"/>
+          </a:fontRef>
+        </p:style>
+      </p:cxnSp>
+      <p:cxnSp>
+        <p:nvCxnSpPr>
+          <p:cNvPr id="18" name="Elbow Connector 17"/>
+          <p:cNvCxnSpPr>
+            <a:stCxn id="6" idx="2"/>
+            <a:endCxn id="4" idx="2"/>
+          </p:cNvCxnSpPr>
+          <p:nvPr/>
+        </p:nvCxnSpPr>
+        <p:spPr>
+          <a:xfrm rot="16200000" flipH="1">
+            <a:off x="4419600" y="38100"/>
+            <a:ext cx="12700" cy="6096000"/>
+          </a:xfrm>
+          <a:prstGeom prst="bentConnector3">
+            <a:avLst>
+              <a:gd name="adj1" fmla="val 11381953"/>
+            </a:avLst>
+          </a:prstGeom>
+          <a:ln w="25400">
+            <a:solidFill>
+              <a:schemeClr val="tx1"/>
+            </a:solidFill>
+            <a:tailEnd type="triangle" w="lg" len="lg"/>
+          </a:ln>
+        </p:spPr>
+        <p:style>
+          <a:lnRef idx="1">
+            <a:schemeClr val="accent1"/>
+          </a:lnRef>
+          <a:fillRef idx="0">
+            <a:schemeClr val="accent1"/>
+          </a:fillRef>
+          <a:effectRef idx="0">
+            <a:schemeClr val="accent1"/>
+          </a:effectRef>
+          <a:fontRef idx="minor">
+            <a:schemeClr val="tx1"/>
+          </a:fontRef>
+        </p:style>
+      </p:cxnSp>
+      <p:cxnSp>
+        <p:nvCxnSpPr>
+          <p:cNvPr id="24" name="Elbow Connector 23"/>
+          <p:cNvCxnSpPr>
+            <a:stCxn id="6" idx="0"/>
+            <a:endCxn id="7" idx="1"/>
+          </p:cNvCxnSpPr>
+          <p:nvPr/>
+        </p:nvCxnSpPr>
+        <p:spPr>
+          <a:xfrm rot="5400000" flipH="1" flipV="1">
+            <a:off x="990600" y="1562100"/>
+            <a:ext cx="1447800" cy="685800"/>
+          </a:xfrm>
+          <a:prstGeom prst="bentConnector2">
+            <a:avLst/>
+          </a:prstGeom>
+          <a:ln w="25400">
+            <a:solidFill>
+              <a:schemeClr val="tx1"/>
+            </a:solidFill>
+            <a:tailEnd type="triangle" w="lg" len="lg"/>
+          </a:ln>
+        </p:spPr>
+        <p:style>
+          <a:lnRef idx="1">
+            <a:schemeClr val="accent1"/>
+          </a:lnRef>
+          <a:fillRef idx="0">
+            <a:schemeClr val="accent1"/>
+          </a:fillRef>
+          <a:effectRef idx="0">
+            <a:schemeClr val="accent1"/>
+          </a:effectRef>
+          <a:fontRef idx="minor">
+            <a:schemeClr val="tx1"/>
+          </a:fontRef>
+        </p:style>
+      </p:cxnSp>
+      <p:sp>
+        <p:nvSpPr>
+          <p:cNvPr id="19" name="TextBox 18"/>
+          <p:cNvSpPr txBox="1"/>
+          <p:nvPr/>
+        </p:nvSpPr>
+        <p:spPr>
+          <a:xfrm>
+            <a:off x="685800" y="5242098"/>
+            <a:ext cx="3886201" cy="369332"/>
+          </a:xfrm>
+          <a:prstGeom prst="rect">
+            <a:avLst/>
+          </a:prstGeom>
+          <a:noFill/>
+        </p:spPr>
+        <p:txBody>
+          <a:bodyPr wrap="square" rtlCol="0">
+            <a:spAutoFit/>
+          </a:bodyPr>
+          <a:lstStyle/>
+          <a:p>
+            <a:r>
+              <a:rPr lang="en-US" dirty="0" smtClean="0"/>
+              <a:t>* p&lt;0.05, ** p&lt;0.01, *** p&lt;0.001</a:t>
+            </a:r>
+            <a:endParaRPr lang="en-US" dirty="0"/>
+          </a:p>
+        </p:txBody>
+      </p:sp>
+      <p:sp>
+        <p:nvSpPr>
+          <p:cNvPr id="20" name="TextBox 19"/>
+          <p:cNvSpPr txBox="1"/>
+          <p:nvPr/>
+        </p:nvSpPr>
+        <p:spPr>
+          <a:xfrm>
+            <a:off x="1371600" y="1834634"/>
+            <a:ext cx="1188720" cy="369332"/>
+          </a:xfrm>
+          <a:prstGeom prst="rect">
+            <a:avLst/>
+          </a:prstGeom>
+          <a:noFill/>
+        </p:spPr>
+        <p:txBody>
+          <a:bodyPr wrap="square" rtlCol="0">
+            <a:spAutoFit/>
+          </a:bodyPr>
+          <a:lstStyle/>
+          <a:p>
+            <a:r>
+              <a:rPr lang="en-US" dirty="0" smtClean="0"/>
+              <a:t>0.169***</a:t>
+            </a:r>
+            <a:endParaRPr lang="en-US" dirty="0"/>
+          </a:p>
+        </p:txBody>
+      </p:sp>
+      <p:sp>
+        <p:nvSpPr>
+          <p:cNvPr id="27" name="TextBox 26"/>
+          <p:cNvSpPr txBox="1"/>
+          <p:nvPr/>
+        </p:nvSpPr>
+        <p:spPr>
+          <a:xfrm>
+            <a:off x="7465881" y="1682234"/>
+            <a:ext cx="1188720" cy="369332"/>
+          </a:xfrm>
+          <a:prstGeom prst="rect">
+            <a:avLst/>
+          </a:prstGeom>
+          <a:noFill/>
+        </p:spPr>
+        <p:txBody>
+          <a:bodyPr wrap="square" rtlCol="0">
+            <a:spAutoFit/>
+          </a:bodyPr>
+          <a:lstStyle/>
+          <a:p>
+            <a:r>
+              <a:rPr lang="en-US" dirty="0" smtClean="0"/>
+              <a:t>0.569***</a:t>
+            </a:r>
+          </a:p>
+        </p:txBody>
+      </p:sp>
+      <p:sp>
+        <p:nvSpPr>
+          <p:cNvPr id="28" name="TextBox 27"/>
+          <p:cNvSpPr txBox="1"/>
+          <p:nvPr/>
+        </p:nvSpPr>
+        <p:spPr>
+          <a:xfrm>
+            <a:off x="3230880" y="1452890"/>
+            <a:ext cx="1188720" cy="369332"/>
+          </a:xfrm>
+          <a:prstGeom prst="rect">
+            <a:avLst/>
+          </a:prstGeom>
+          <a:noFill/>
+        </p:spPr>
+        <p:txBody>
+          <a:bodyPr wrap="square" rtlCol="0">
+            <a:spAutoFit/>
+          </a:bodyPr>
+          <a:lstStyle/>
+          <a:p>
+            <a:r>
+              <a:rPr lang="en-US" dirty="0" smtClean="0"/>
+              <a:t>0.050*</a:t>
+            </a:r>
+            <a:endParaRPr lang="en-US" dirty="0"/>
+          </a:p>
+        </p:txBody>
+      </p:sp>
+      <p:sp>
+        <p:nvSpPr>
+          <p:cNvPr id="29" name="TextBox 28"/>
+          <p:cNvSpPr txBox="1"/>
+          <p:nvPr/>
+        </p:nvSpPr>
+        <p:spPr>
+          <a:xfrm>
+            <a:off x="2514600" y="2497291"/>
+            <a:ext cx="1188720" cy="369332"/>
+          </a:xfrm>
+          <a:prstGeom prst="rect">
+            <a:avLst/>
+          </a:prstGeom>
+          <a:noFill/>
+        </p:spPr>
+        <p:txBody>
+          <a:bodyPr wrap="square" rtlCol="0">
+            <a:spAutoFit/>
+          </a:bodyPr>
+          <a:lstStyle/>
+          <a:p>
+            <a:r>
+              <a:rPr lang="en-US" dirty="0" smtClean="0"/>
+              <a:t>0.090***</a:t>
+            </a:r>
+            <a:endParaRPr lang="en-US" dirty="0"/>
+          </a:p>
+        </p:txBody>
+      </p:sp>
+      <p:sp>
+        <p:nvSpPr>
+          <p:cNvPr id="31" name="TextBox 30"/>
+          <p:cNvSpPr txBox="1"/>
+          <p:nvPr/>
+        </p:nvSpPr>
+        <p:spPr>
+          <a:xfrm>
+            <a:off x="5075274" y="2095500"/>
+            <a:ext cx="1188720" cy="369332"/>
+          </a:xfrm>
+          <a:prstGeom prst="rect">
+            <a:avLst/>
+          </a:prstGeom>
+          <a:noFill/>
+        </p:spPr>
+        <p:txBody>
+          <a:bodyPr wrap="square" rtlCol="0">
+            <a:spAutoFit/>
+          </a:bodyPr>
+          <a:lstStyle/>
+          <a:p>
+            <a:r>
+              <a:rPr lang="en-US" dirty="0" smtClean="0"/>
+              <a:t>0.046*</a:t>
+            </a:r>
+            <a:endParaRPr lang="en-US" dirty="0"/>
+          </a:p>
+        </p:txBody>
+      </p:sp>
+      <p:sp>
+        <p:nvSpPr>
+          <p:cNvPr id="33" name="TextBox 32"/>
+          <p:cNvSpPr txBox="1"/>
+          <p:nvPr/>
+        </p:nvSpPr>
+        <p:spPr>
+          <a:xfrm>
+            <a:off x="5078818" y="3162300"/>
+            <a:ext cx="1188720" cy="369332"/>
+          </a:xfrm>
+          <a:prstGeom prst="rect">
+            <a:avLst/>
+          </a:prstGeom>
+          <a:noFill/>
+        </p:spPr>
+        <p:txBody>
+          <a:bodyPr wrap="square" rtlCol="0">
+            <a:spAutoFit/>
+          </a:bodyPr>
+          <a:lstStyle/>
+          <a:p>
+            <a:r>
+              <a:rPr lang="en-US" dirty="0" smtClean="0"/>
+              <a:t>0.043</a:t>
+            </a:r>
+            <a:endParaRPr lang="en-US" dirty="0"/>
+          </a:p>
+        </p:txBody>
+      </p:sp>
+      <p:sp>
+        <p:nvSpPr>
+          <p:cNvPr id="34" name="TextBox 33"/>
+          <p:cNvSpPr txBox="1"/>
+          <p:nvPr/>
+        </p:nvSpPr>
+        <p:spPr>
+          <a:xfrm>
+            <a:off x="5745480" y="2552700"/>
+            <a:ext cx="1188720" cy="369332"/>
+          </a:xfrm>
+          <a:prstGeom prst="rect">
+            <a:avLst/>
+          </a:prstGeom>
+          <a:noFill/>
+        </p:spPr>
+        <p:txBody>
+          <a:bodyPr wrap="square" lIns="0" rIns="0" rtlCol="0">
+            <a:spAutoFit/>
+          </a:bodyPr>
+          <a:lstStyle/>
+          <a:p>
+            <a:r>
+              <a:rPr lang="en-US" dirty="0" smtClean="0"/>
+              <a:t>0.063***</a:t>
+            </a:r>
+            <a:endParaRPr lang="en-US" dirty="0"/>
+          </a:p>
+        </p:txBody>
+      </p:sp>
+      <p:sp>
+        <p:nvSpPr>
+          <p:cNvPr id="35" name="TextBox 34"/>
+          <p:cNvSpPr txBox="1"/>
+          <p:nvPr/>
+        </p:nvSpPr>
+        <p:spPr>
+          <a:xfrm>
+            <a:off x="6172200" y="1943100"/>
+            <a:ext cx="1188720" cy="369332"/>
+          </a:xfrm>
+          <a:prstGeom prst="rect">
+            <a:avLst/>
+          </a:prstGeom>
+          <a:noFill/>
+        </p:spPr>
+        <p:txBody>
+          <a:bodyPr wrap="square" rtlCol="0">
+            <a:spAutoFit/>
+          </a:bodyPr>
+          <a:lstStyle/>
+          <a:p>
+            <a:r>
+              <a:rPr lang="en-US" dirty="0" smtClean="0"/>
+              <a:t>-0.213***</a:t>
+            </a:r>
+            <a:endParaRPr lang="en-US" dirty="0"/>
+          </a:p>
+        </p:txBody>
+      </p:sp>
+      <p:sp>
+        <p:nvSpPr>
+          <p:cNvPr id="36" name="TextBox 35"/>
+          <p:cNvSpPr txBox="1"/>
+          <p:nvPr/>
+        </p:nvSpPr>
+        <p:spPr>
+          <a:xfrm>
+            <a:off x="6172200" y="3445467"/>
+            <a:ext cx="1188720" cy="369332"/>
+          </a:xfrm>
+          <a:prstGeom prst="rect">
+            <a:avLst/>
+          </a:prstGeom>
+          <a:noFill/>
+        </p:spPr>
+        <p:txBody>
+          <a:bodyPr wrap="square" rtlCol="0">
+            <a:spAutoFit/>
+          </a:bodyPr>
+          <a:lstStyle/>
+          <a:p>
+            <a:r>
+              <a:rPr lang="en-US" dirty="0" smtClean="0"/>
+              <a:t>0.092***</a:t>
+            </a:r>
+          </a:p>
+        </p:txBody>
+      </p:sp>
+      <p:sp>
+        <p:nvSpPr>
+          <p:cNvPr id="37" name="TextBox 36"/>
+          <p:cNvSpPr txBox="1"/>
+          <p:nvPr/>
+        </p:nvSpPr>
+        <p:spPr>
+          <a:xfrm>
+            <a:off x="7507180" y="3739634"/>
+            <a:ext cx="1188720" cy="369332"/>
+          </a:xfrm>
+          <a:prstGeom prst="rect">
+            <a:avLst/>
+          </a:prstGeom>
+          <a:noFill/>
+        </p:spPr>
+        <p:txBody>
+          <a:bodyPr wrap="square" rtlCol="0">
+            <a:spAutoFit/>
+          </a:bodyPr>
+          <a:lstStyle/>
+          <a:p>
+            <a:r>
+              <a:rPr lang="en-US" dirty="0" smtClean="0"/>
+              <a:t>-0.085***</a:t>
+            </a:r>
+          </a:p>
+        </p:txBody>
+      </p:sp>
+      <p:sp>
+        <p:nvSpPr>
+          <p:cNvPr id="38" name="TextBox 37"/>
+          <p:cNvSpPr txBox="1"/>
+          <p:nvPr/>
+        </p:nvSpPr>
+        <p:spPr>
+          <a:xfrm>
+            <a:off x="5105400" y="2325795"/>
+            <a:ext cx="914400" cy="261610"/>
+          </a:xfrm>
+          <a:prstGeom prst="rect">
+            <a:avLst/>
+          </a:prstGeom>
+          <a:noFill/>
+        </p:spPr>
+        <p:txBody>
+          <a:bodyPr wrap="square" rtlCol="0">
+            <a:spAutoFit/>
+          </a:bodyPr>
+          <a:lstStyle/>
+          <a:p>
+            <a:r>
+              <a:rPr lang="en-US" sz="1100" dirty="0"/>
+              <a:t>p</a:t>
+            </a:r>
+            <a:r>
+              <a:rPr lang="en-US" sz="1100" dirty="0" smtClean="0"/>
+              <a:t> = 0.049</a:t>
+            </a:r>
+          </a:p>
+        </p:txBody>
+      </p:sp>
+      <p:sp>
+        <p:nvSpPr>
+          <p:cNvPr id="39" name="TextBox 38"/>
+          <p:cNvSpPr txBox="1"/>
+          <p:nvPr/>
+        </p:nvSpPr>
+        <p:spPr>
+          <a:xfrm>
+            <a:off x="5105400" y="3390900"/>
+            <a:ext cx="914400" cy="261610"/>
+          </a:xfrm>
+          <a:prstGeom prst="rect">
+            <a:avLst/>
+          </a:prstGeom>
+          <a:noFill/>
+        </p:spPr>
+        <p:txBody>
+          <a:bodyPr wrap="square" rtlCol="0">
+            <a:spAutoFit/>
+          </a:bodyPr>
+          <a:lstStyle/>
+          <a:p>
+            <a:r>
+              <a:rPr lang="en-US" sz="1100" dirty="0"/>
+              <a:t>p</a:t>
+            </a:r>
+            <a:r>
+              <a:rPr lang="en-US" sz="1100" dirty="0" smtClean="0"/>
+              <a:t> = 0.055</a:t>
+            </a:r>
+          </a:p>
+        </p:txBody>
+      </p:sp>
+      <p:sp>
+        <p:nvSpPr>
+          <p:cNvPr id="10" name="TextBox 9"/>
+          <p:cNvSpPr txBox="1"/>
+          <p:nvPr/>
+        </p:nvSpPr>
+        <p:spPr>
+          <a:xfrm>
+            <a:off x="685800" y="4838700"/>
+            <a:ext cx="5562600" cy="369332"/>
+          </a:xfrm>
+          <a:prstGeom prst="rect">
+            <a:avLst/>
+          </a:prstGeom>
+          <a:noFill/>
+        </p:spPr>
+        <p:txBody>
+          <a:bodyPr wrap="square" rtlCol="0">
+            <a:spAutoFit/>
+          </a:bodyPr>
+          <a:lstStyle/>
+          <a:p>
+            <a:r>
+              <a:rPr lang="en-US" dirty="0" smtClean="0"/>
+              <a:t>Pearson Correlation (</a:t>
+            </a:r>
+            <a:r>
+              <a:rPr lang="en-US" dirty="0" err="1" smtClean="0"/>
+              <a:t>CRECEIVEln</a:t>
+            </a:r>
+            <a:r>
+              <a:rPr lang="en-US" dirty="0" smtClean="0"/>
+              <a:t>, ORIGINAL) = 0.019</a:t>
+            </a:r>
+            <a:endParaRPr lang="en-US" dirty="0"/>
+          </a:p>
+        </p:txBody>
+      </p:sp>
+      <p:sp>
+        <p:nvSpPr>
+          <p:cNvPr id="41" name="TextBox 40"/>
+          <p:cNvSpPr txBox="1"/>
+          <p:nvPr/>
+        </p:nvSpPr>
+        <p:spPr>
+          <a:xfrm>
+            <a:off x="3251499" y="1681490"/>
+            <a:ext cx="914400" cy="261610"/>
+          </a:xfrm>
+          <a:prstGeom prst="rect">
+            <a:avLst/>
+          </a:prstGeom>
+          <a:noFill/>
+        </p:spPr>
+        <p:txBody>
+          <a:bodyPr wrap="square" rtlCol="0">
+            <a:spAutoFit/>
+          </a:bodyPr>
+          <a:lstStyle/>
+          <a:p>
+            <a:r>
+              <a:rPr lang="en-US" sz="1100" dirty="0"/>
+              <a:t>p</a:t>
+            </a:r>
+            <a:r>
+              <a:rPr lang="en-US" sz="1100" dirty="0" smtClean="0"/>
+              <a:t> = 0.032</a:t>
+            </a:r>
+          </a:p>
+        </p:txBody>
+      </p:sp>
+      <p:sp>
+        <p:nvSpPr>
+          <p:cNvPr id="40" name="TextBox 39"/>
+          <p:cNvSpPr txBox="1"/>
+          <p:nvPr/>
+        </p:nvSpPr>
+        <p:spPr>
+          <a:xfrm>
+            <a:off x="2057400" y="1409700"/>
+            <a:ext cx="914400" cy="261610"/>
+          </a:xfrm>
+          <a:prstGeom prst="rect">
+            <a:avLst/>
+          </a:prstGeom>
+          <a:noFill/>
+        </p:spPr>
+        <p:txBody>
+          <a:bodyPr wrap="square" rtlCol="0">
+            <a:spAutoFit/>
+          </a:bodyPr>
+          <a:lstStyle/>
+          <a:p>
+            <a:r>
+              <a:rPr lang="en-US" sz="1100" dirty="0" smtClean="0"/>
+              <a:t>R</a:t>
+            </a:r>
+            <a:r>
+              <a:rPr lang="en-US" sz="1100" baseline="30000" dirty="0" smtClean="0"/>
+              <a:t>2</a:t>
+            </a:r>
+            <a:r>
+              <a:rPr lang="en-US" sz="1100" dirty="0" smtClean="0"/>
+              <a:t> </a:t>
+            </a:r>
+            <a:r>
+              <a:rPr lang="en-US" sz="1100" dirty="0" smtClean="0"/>
+              <a:t>= </a:t>
+            </a:r>
+            <a:r>
+              <a:rPr lang="en-US" sz="1100" dirty="0" smtClean="0"/>
+              <a:t>0.029</a:t>
+            </a:r>
+            <a:endParaRPr lang="en-US" sz="1100" dirty="0" smtClean="0"/>
+          </a:p>
+        </p:txBody>
+      </p:sp>
+      <p:sp>
+        <p:nvSpPr>
+          <p:cNvPr id="42" name="TextBox 41"/>
+          <p:cNvSpPr txBox="1"/>
+          <p:nvPr/>
+        </p:nvSpPr>
+        <p:spPr>
+          <a:xfrm>
+            <a:off x="4267200" y="3086100"/>
+            <a:ext cx="914400" cy="261610"/>
+          </a:xfrm>
+          <a:prstGeom prst="rect">
+            <a:avLst/>
+          </a:prstGeom>
+          <a:noFill/>
+        </p:spPr>
+        <p:txBody>
+          <a:bodyPr wrap="square" rtlCol="0">
+            <a:spAutoFit/>
+          </a:bodyPr>
+          <a:lstStyle/>
+          <a:p>
+            <a:r>
+              <a:rPr lang="en-US" sz="1100" dirty="0">
+                <a:solidFill>
+                  <a:prstClr val="black"/>
+                </a:solidFill>
+              </a:rPr>
+              <a:t>R</a:t>
+            </a:r>
+            <a:r>
+              <a:rPr lang="en-US" sz="1100" baseline="30000" dirty="0">
+                <a:solidFill>
+                  <a:prstClr val="black"/>
+                </a:solidFill>
+              </a:rPr>
+              <a:t>2</a:t>
+            </a:r>
+            <a:r>
+              <a:rPr lang="en-US" sz="1100" dirty="0" smtClean="0"/>
+              <a:t> </a:t>
+            </a:r>
+            <a:r>
+              <a:rPr lang="en-US" sz="1100" dirty="0" smtClean="0"/>
+              <a:t>= </a:t>
+            </a:r>
+            <a:r>
+              <a:rPr lang="en-US" sz="1100" dirty="0" smtClean="0"/>
+              <a:t>0.016</a:t>
+            </a:r>
+            <a:endParaRPr lang="en-US" sz="1100" dirty="0" smtClean="0"/>
+          </a:p>
+        </p:txBody>
+      </p:sp>
+      <p:sp>
+        <p:nvSpPr>
+          <p:cNvPr id="43" name="TextBox 42"/>
+          <p:cNvSpPr txBox="1"/>
+          <p:nvPr/>
+        </p:nvSpPr>
+        <p:spPr>
+          <a:xfrm>
+            <a:off x="7543800" y="3086100"/>
+            <a:ext cx="914400" cy="261610"/>
+          </a:xfrm>
+          <a:prstGeom prst="rect">
+            <a:avLst/>
+          </a:prstGeom>
+          <a:noFill/>
+        </p:spPr>
+        <p:txBody>
+          <a:bodyPr wrap="square" rtlCol="0">
+            <a:spAutoFit/>
+          </a:bodyPr>
+          <a:lstStyle/>
+          <a:p>
+            <a:r>
+              <a:rPr lang="en-US" sz="1100" dirty="0">
+                <a:solidFill>
+                  <a:prstClr val="black"/>
+                </a:solidFill>
+              </a:rPr>
+              <a:t>R</a:t>
+            </a:r>
+            <a:r>
+              <a:rPr lang="en-US" sz="1100" baseline="30000" dirty="0">
+                <a:solidFill>
+                  <a:prstClr val="black"/>
+                </a:solidFill>
+              </a:rPr>
+              <a:t>2</a:t>
+            </a:r>
+            <a:r>
+              <a:rPr lang="en-US" sz="1100" dirty="0" smtClean="0"/>
+              <a:t> </a:t>
+            </a:r>
+            <a:r>
+              <a:rPr lang="en-US" sz="1100" dirty="0" smtClean="0"/>
+              <a:t>= </a:t>
+            </a:r>
+            <a:r>
+              <a:rPr lang="en-US" sz="1100" dirty="0" smtClean="0"/>
+              <a:t>0.432</a:t>
+            </a:r>
+            <a:endParaRPr lang="en-US" sz="1100" dirty="0" smtClean="0"/>
+          </a:p>
+        </p:txBody>
+      </p:sp>
+    </p:spTree>
+    <p:extLst>
+      <p:ext uri="{BB962C8B-B14F-4D97-AF65-F5344CB8AC3E}">
+        <p14:creationId xmlns:p14="http://schemas.microsoft.com/office/powerpoint/2010/main" val="56667218"/>
+      </p:ext>
+    </p:extLst>
+  </p:cSld>
+  <p:clrMapOvr>
+    <a:masterClrMapping/>
+  </p:clrMapOvr>
+  <p:timing>
+    <p:tnLst>
+      <p:par>
+        <p:cTn id="1" dur="indefinite" restart="never" nodeType="tmRoot"/>
+      </p:par>
+    </p:tnLst>
+  </p:timing>
+</p:sld>
+</file>
+
+<file path=ppt/slides/slide8.xml><?xml version="1.0" encoding="utf-8"?>
 <p:sld xmlns:a="http://schemas.openxmlformats.org/drawingml/2006/main" xmlns:r="http://schemas.openxmlformats.org/officeDocument/2006/relationships" xmlns:p="http://schemas.openxmlformats.org/presentationml/2006/main">
   <p:cSld>
     <p:spTree>
@@ -9886,6 +12002,1207 @@
     <p:extLst>
       <p:ext uri="{BB962C8B-B14F-4D97-AF65-F5344CB8AC3E}">
         <p14:creationId xmlns:p14="http://schemas.microsoft.com/office/powerpoint/2010/main" val="1000046910"/>
+      </p:ext>
+    </p:extLst>
+  </p:cSld>
+  <p:clrMapOvr>
+    <a:masterClrMapping/>
+  </p:clrMapOvr>
+  <p:timing>
+    <p:tnLst>
+      <p:par>
+        <p:cTn id="1" dur="indefinite" restart="never" nodeType="tmRoot"/>
+      </p:par>
+    </p:tnLst>
+  </p:timing>
+</p:sld>
+</file>
+
+<file path=ppt/slides/slide9.xml><?xml version="1.0" encoding="utf-8"?>
+<p:sld xmlns:a="http://schemas.openxmlformats.org/drawingml/2006/main" xmlns:r="http://schemas.openxmlformats.org/officeDocument/2006/relationships" xmlns:p="http://schemas.openxmlformats.org/presentationml/2006/main">
+  <p:cSld>
+    <p:spTree>
+      <p:nvGrpSpPr>
+        <p:cNvPr id="1" name=""/>
+        <p:cNvGrpSpPr/>
+        <p:nvPr/>
+      </p:nvGrpSpPr>
+      <p:grpSpPr>
+        <a:xfrm>
+          <a:off x="0" y="0"/>
+          <a:ext cx="0" cy="0"/>
+          <a:chOff x="0" y="0"/>
+          <a:chExt cx="0" cy="0"/>
+        </a:xfrm>
+      </p:grpSpPr>
+      <p:sp>
+        <p:nvSpPr>
+          <p:cNvPr id="4" name="Rounded Rectangle 3"/>
+          <p:cNvSpPr/>
+          <p:nvPr/>
+        </p:nvSpPr>
+        <p:spPr>
+          <a:xfrm>
+            <a:off x="6781800" y="2628900"/>
+            <a:ext cx="1371600" cy="457200"/>
+          </a:xfrm>
+          <a:prstGeom prst="roundRect">
+            <a:avLst/>
+          </a:prstGeom>
+        </p:spPr>
+        <p:style>
+          <a:lnRef idx="2">
+            <a:schemeClr val="accent1">
+              <a:shade val="50000"/>
+            </a:schemeClr>
+          </a:lnRef>
+          <a:fillRef idx="1">
+            <a:schemeClr val="accent1"/>
+          </a:fillRef>
+          <a:effectRef idx="0">
+            <a:schemeClr val="accent1"/>
+          </a:effectRef>
+          <a:fontRef idx="minor">
+            <a:schemeClr val="lt1"/>
+          </a:fontRef>
+        </p:style>
+        <p:txBody>
+          <a:bodyPr rtlCol="0" anchor="ctr"/>
+          <a:lstStyle/>
+          <a:p>
+            <a:pPr algn="ctr"/>
+            <a:r>
+              <a:rPr lang="en-US" dirty="0" err="1" smtClean="0"/>
+              <a:t>CRECEIVEln</a:t>
+            </a:r>
+            <a:endParaRPr lang="en-US" dirty="0"/>
+          </a:p>
+        </p:txBody>
+      </p:sp>
+      <p:sp>
+        <p:nvSpPr>
+          <p:cNvPr id="5" name="Rounded Rectangle 4"/>
+          <p:cNvSpPr/>
+          <p:nvPr/>
+        </p:nvSpPr>
+        <p:spPr>
+          <a:xfrm>
+            <a:off x="4343400" y="2628900"/>
+            <a:ext cx="1371600" cy="457200"/>
+          </a:xfrm>
+          <a:prstGeom prst="roundRect">
+            <a:avLst/>
+          </a:prstGeom>
+        </p:spPr>
+        <p:style>
+          <a:lnRef idx="2">
+            <a:schemeClr val="accent1">
+              <a:shade val="50000"/>
+            </a:schemeClr>
+          </a:lnRef>
+          <a:fillRef idx="1">
+            <a:schemeClr val="accent1"/>
+          </a:fillRef>
+          <a:effectRef idx="0">
+            <a:schemeClr val="accent1"/>
+          </a:effectRef>
+          <a:fontRef idx="minor">
+            <a:schemeClr val="lt1"/>
+          </a:fontRef>
+        </p:style>
+        <p:txBody>
+          <a:bodyPr rtlCol="0" anchor="ctr"/>
+          <a:lstStyle/>
+          <a:p>
+            <a:pPr algn="ctr"/>
+            <a:r>
+              <a:rPr lang="en-US" dirty="0" smtClean="0"/>
+              <a:t>CLAIMS</a:t>
+            </a:r>
+            <a:endParaRPr lang="en-US" dirty="0"/>
+          </a:p>
+        </p:txBody>
+      </p:sp>
+      <p:sp>
+        <p:nvSpPr>
+          <p:cNvPr id="6" name="Rounded Rectangle 5"/>
+          <p:cNvSpPr/>
+          <p:nvPr/>
+        </p:nvSpPr>
+        <p:spPr>
+          <a:xfrm>
+            <a:off x="685800" y="2628900"/>
+            <a:ext cx="1371600" cy="457200"/>
+          </a:xfrm>
+          <a:prstGeom prst="roundRect">
+            <a:avLst/>
+          </a:prstGeom>
+        </p:spPr>
+        <p:style>
+          <a:lnRef idx="2">
+            <a:schemeClr val="accent1">
+              <a:shade val="50000"/>
+            </a:schemeClr>
+          </a:lnRef>
+          <a:fillRef idx="1">
+            <a:schemeClr val="accent1"/>
+          </a:fillRef>
+          <a:effectRef idx="0">
+            <a:schemeClr val="accent1"/>
+          </a:effectRef>
+          <a:fontRef idx="minor">
+            <a:schemeClr val="lt1"/>
+          </a:fontRef>
+        </p:style>
+        <p:txBody>
+          <a:bodyPr rtlCol="0" anchor="ctr"/>
+          <a:lstStyle/>
+          <a:p>
+            <a:pPr algn="ctr"/>
+            <a:r>
+              <a:rPr lang="en-US" dirty="0" smtClean="0"/>
+              <a:t>ORIGINAL</a:t>
+            </a:r>
+            <a:endParaRPr lang="en-US" dirty="0"/>
+          </a:p>
+        </p:txBody>
+      </p:sp>
+      <p:sp>
+        <p:nvSpPr>
+          <p:cNvPr id="7" name="Rounded Rectangle 6"/>
+          <p:cNvSpPr/>
+          <p:nvPr/>
+        </p:nvSpPr>
+        <p:spPr>
+          <a:xfrm>
+            <a:off x="2057400" y="952500"/>
+            <a:ext cx="1371600" cy="457200"/>
+          </a:xfrm>
+          <a:prstGeom prst="roundRect">
+            <a:avLst/>
+          </a:prstGeom>
+        </p:spPr>
+        <p:style>
+          <a:lnRef idx="2">
+            <a:schemeClr val="accent1">
+              <a:shade val="50000"/>
+            </a:schemeClr>
+          </a:lnRef>
+          <a:fillRef idx="1">
+            <a:schemeClr val="accent1"/>
+          </a:fillRef>
+          <a:effectRef idx="0">
+            <a:schemeClr val="accent1"/>
+          </a:effectRef>
+          <a:fontRef idx="minor">
+            <a:schemeClr val="lt1"/>
+          </a:fontRef>
+        </p:style>
+        <p:txBody>
+          <a:bodyPr rtlCol="0" anchor="ctr"/>
+          <a:lstStyle/>
+          <a:p>
+            <a:pPr algn="ctr"/>
+            <a:r>
+              <a:rPr lang="en-US" dirty="0" smtClean="0"/>
+              <a:t>GENERAL</a:t>
+            </a:r>
+            <a:endParaRPr lang="en-US" dirty="0"/>
+          </a:p>
+        </p:txBody>
+      </p:sp>
+      <p:sp>
+        <p:nvSpPr>
+          <p:cNvPr id="8" name="Rounded Rectangle 7"/>
+          <p:cNvSpPr/>
+          <p:nvPr/>
+        </p:nvSpPr>
+        <p:spPr>
+          <a:xfrm>
+            <a:off x="4343400" y="1638300"/>
+            <a:ext cx="1371600" cy="457200"/>
+          </a:xfrm>
+          <a:prstGeom prst="roundRect">
+            <a:avLst/>
+          </a:prstGeom>
+        </p:spPr>
+        <p:style>
+          <a:lnRef idx="2">
+            <a:schemeClr val="accent1">
+              <a:shade val="50000"/>
+            </a:schemeClr>
+          </a:lnRef>
+          <a:fillRef idx="1">
+            <a:schemeClr val="accent1"/>
+          </a:fillRef>
+          <a:effectRef idx="0">
+            <a:schemeClr val="accent1"/>
+          </a:effectRef>
+          <a:fontRef idx="minor">
+            <a:schemeClr val="lt1"/>
+          </a:fontRef>
+        </p:style>
+        <p:txBody>
+          <a:bodyPr rtlCol="0" anchor="ctr"/>
+          <a:lstStyle/>
+          <a:p>
+            <a:pPr algn="ctr"/>
+            <a:r>
+              <a:rPr lang="en-US" dirty="0" smtClean="0"/>
+              <a:t>GYEAR</a:t>
+            </a:r>
+            <a:endParaRPr lang="en-US" dirty="0"/>
+          </a:p>
+        </p:txBody>
+      </p:sp>
+      <p:sp>
+        <p:nvSpPr>
+          <p:cNvPr id="9" name="Rounded Rectangle 8"/>
+          <p:cNvSpPr/>
+          <p:nvPr/>
+        </p:nvSpPr>
+        <p:spPr>
+          <a:xfrm>
+            <a:off x="4343400" y="3695700"/>
+            <a:ext cx="1371600" cy="457200"/>
+          </a:xfrm>
+          <a:prstGeom prst="roundRect">
+            <a:avLst/>
+          </a:prstGeom>
+        </p:spPr>
+        <p:style>
+          <a:lnRef idx="2">
+            <a:schemeClr val="accent1">
+              <a:shade val="50000"/>
+            </a:schemeClr>
+          </a:lnRef>
+          <a:fillRef idx="1">
+            <a:schemeClr val="accent1"/>
+          </a:fillRef>
+          <a:effectRef idx="0">
+            <a:schemeClr val="accent1"/>
+          </a:effectRef>
+          <a:fontRef idx="minor">
+            <a:schemeClr val="lt1"/>
+          </a:fontRef>
+        </p:style>
+        <p:txBody>
+          <a:bodyPr rtlCol="0" anchor="ctr"/>
+          <a:lstStyle/>
+          <a:p>
+            <a:pPr algn="ctr"/>
+            <a:r>
+              <a:rPr lang="en-US" dirty="0" smtClean="0"/>
+              <a:t>RATIOCIT</a:t>
+            </a:r>
+            <a:endParaRPr lang="en-US" dirty="0"/>
+          </a:p>
+        </p:txBody>
+      </p:sp>
+      <p:cxnSp>
+        <p:nvCxnSpPr>
+          <p:cNvPr id="11" name="Straight Arrow Connector 10"/>
+          <p:cNvCxnSpPr>
+            <a:stCxn id="5" idx="3"/>
+            <a:endCxn id="4" idx="1"/>
+          </p:cNvCxnSpPr>
+          <p:nvPr/>
+        </p:nvCxnSpPr>
+        <p:spPr>
+          <a:xfrm>
+            <a:off x="5715000" y="2857500"/>
+            <a:ext cx="1066800" cy="0"/>
+          </a:xfrm>
+          <a:prstGeom prst="straightConnector1">
+            <a:avLst/>
+          </a:prstGeom>
+          <a:ln w="25400">
+            <a:solidFill>
+              <a:schemeClr val="tx1"/>
+            </a:solidFill>
+            <a:tailEnd type="triangle" w="lg" len="lg"/>
+          </a:ln>
+        </p:spPr>
+        <p:style>
+          <a:lnRef idx="1">
+            <a:schemeClr val="accent1"/>
+          </a:lnRef>
+          <a:fillRef idx="0">
+            <a:schemeClr val="accent1"/>
+          </a:fillRef>
+          <a:effectRef idx="0">
+            <a:schemeClr val="accent1"/>
+          </a:effectRef>
+          <a:fontRef idx="minor">
+            <a:schemeClr val="tx1"/>
+          </a:fontRef>
+        </p:style>
+      </p:cxnSp>
+      <p:cxnSp>
+        <p:nvCxnSpPr>
+          <p:cNvPr id="21" name="Straight Arrow Connector 20"/>
+          <p:cNvCxnSpPr>
+            <a:stCxn id="9" idx="3"/>
+            <a:endCxn id="4" idx="1"/>
+          </p:cNvCxnSpPr>
+          <p:nvPr/>
+        </p:nvCxnSpPr>
+        <p:spPr>
+          <a:xfrm flipV="1">
+            <a:off x="5715000" y="2857500"/>
+            <a:ext cx="1066800" cy="1066800"/>
+          </a:xfrm>
+          <a:prstGeom prst="straightConnector1">
+            <a:avLst/>
+          </a:prstGeom>
+          <a:ln w="25400">
+            <a:solidFill>
+              <a:schemeClr val="tx1"/>
+            </a:solidFill>
+            <a:tailEnd type="triangle" w="lg" len="lg"/>
+          </a:ln>
+        </p:spPr>
+        <p:style>
+          <a:lnRef idx="1">
+            <a:schemeClr val="accent1"/>
+          </a:lnRef>
+          <a:fillRef idx="0">
+            <a:schemeClr val="accent1"/>
+          </a:fillRef>
+          <a:effectRef idx="0">
+            <a:schemeClr val="accent1"/>
+          </a:effectRef>
+          <a:fontRef idx="minor">
+            <a:schemeClr val="tx1"/>
+          </a:fontRef>
+        </p:style>
+      </p:cxnSp>
+      <p:cxnSp>
+        <p:nvCxnSpPr>
+          <p:cNvPr id="23" name="Straight Arrow Connector 22"/>
+          <p:cNvCxnSpPr>
+            <a:stCxn id="8" idx="3"/>
+            <a:endCxn id="4" idx="1"/>
+          </p:cNvCxnSpPr>
+          <p:nvPr/>
+        </p:nvCxnSpPr>
+        <p:spPr>
+          <a:xfrm>
+            <a:off x="5715000" y="1866900"/>
+            <a:ext cx="1066800" cy="990600"/>
+          </a:xfrm>
+          <a:prstGeom prst="straightConnector1">
+            <a:avLst/>
+          </a:prstGeom>
+          <a:ln w="25400">
+            <a:solidFill>
+              <a:schemeClr val="tx1"/>
+            </a:solidFill>
+            <a:tailEnd type="triangle" w="lg" len="lg"/>
+          </a:ln>
+        </p:spPr>
+        <p:style>
+          <a:lnRef idx="1">
+            <a:schemeClr val="accent1"/>
+          </a:lnRef>
+          <a:fillRef idx="0">
+            <a:schemeClr val="accent1"/>
+          </a:fillRef>
+          <a:effectRef idx="0">
+            <a:schemeClr val="accent1"/>
+          </a:effectRef>
+          <a:fontRef idx="minor">
+            <a:schemeClr val="tx1"/>
+          </a:fontRef>
+        </p:style>
+      </p:cxnSp>
+      <p:cxnSp>
+        <p:nvCxnSpPr>
+          <p:cNvPr id="25" name="Elbow Connector 24"/>
+          <p:cNvCxnSpPr>
+            <a:stCxn id="7" idx="3"/>
+            <a:endCxn id="4" idx="0"/>
+          </p:cNvCxnSpPr>
+          <p:nvPr/>
+        </p:nvCxnSpPr>
+        <p:spPr>
+          <a:xfrm>
+            <a:off x="3429000" y="1181100"/>
+            <a:ext cx="4038600" cy="1447800"/>
+          </a:xfrm>
+          <a:prstGeom prst="bentConnector2">
+            <a:avLst/>
+          </a:prstGeom>
+          <a:ln w="25400">
+            <a:solidFill>
+              <a:schemeClr val="tx1"/>
+            </a:solidFill>
+            <a:tailEnd type="triangle" w="lg" len="lg"/>
+          </a:ln>
+        </p:spPr>
+        <p:style>
+          <a:lnRef idx="1">
+            <a:schemeClr val="accent1"/>
+          </a:lnRef>
+          <a:fillRef idx="0">
+            <a:schemeClr val="accent1"/>
+          </a:fillRef>
+          <a:effectRef idx="0">
+            <a:schemeClr val="accent1"/>
+          </a:effectRef>
+          <a:fontRef idx="minor">
+            <a:schemeClr val="tx1"/>
+          </a:fontRef>
+        </p:style>
+      </p:cxnSp>
+      <p:cxnSp>
+        <p:nvCxnSpPr>
+          <p:cNvPr id="22" name="Straight Arrow Connector 21"/>
+          <p:cNvCxnSpPr>
+            <a:stCxn id="7" idx="2"/>
+            <a:endCxn id="5" idx="1"/>
+          </p:cNvCxnSpPr>
+          <p:nvPr/>
+        </p:nvCxnSpPr>
+        <p:spPr>
+          <a:xfrm>
+            <a:off x="2743200" y="1409700"/>
+            <a:ext cx="1600200" cy="1447800"/>
+          </a:xfrm>
+          <a:prstGeom prst="straightConnector1">
+            <a:avLst/>
+          </a:prstGeom>
+          <a:ln w="25400">
+            <a:solidFill>
+              <a:schemeClr val="tx1"/>
+            </a:solidFill>
+            <a:tailEnd type="triangle" w="lg" len="lg"/>
+          </a:ln>
+        </p:spPr>
+        <p:style>
+          <a:lnRef idx="1">
+            <a:schemeClr val="accent1"/>
+          </a:lnRef>
+          <a:fillRef idx="0">
+            <a:schemeClr val="accent1"/>
+          </a:fillRef>
+          <a:effectRef idx="0">
+            <a:schemeClr val="accent1"/>
+          </a:effectRef>
+          <a:fontRef idx="minor">
+            <a:schemeClr val="tx1"/>
+          </a:fontRef>
+        </p:style>
+      </p:cxnSp>
+      <p:cxnSp>
+        <p:nvCxnSpPr>
+          <p:cNvPr id="26" name="Straight Arrow Connector 25"/>
+          <p:cNvCxnSpPr>
+            <a:stCxn id="6" idx="3"/>
+            <a:endCxn id="5" idx="1"/>
+          </p:cNvCxnSpPr>
+          <p:nvPr/>
+        </p:nvCxnSpPr>
+        <p:spPr>
+          <a:xfrm>
+            <a:off x="2057400" y="2857500"/>
+            <a:ext cx="2286000" cy="0"/>
+          </a:xfrm>
+          <a:prstGeom prst="straightConnector1">
+            <a:avLst/>
+          </a:prstGeom>
+          <a:ln w="25400">
+            <a:solidFill>
+              <a:schemeClr val="tx1"/>
+            </a:solidFill>
+            <a:tailEnd type="triangle" w="lg" len="lg"/>
+          </a:ln>
+        </p:spPr>
+        <p:style>
+          <a:lnRef idx="1">
+            <a:schemeClr val="accent1"/>
+          </a:lnRef>
+          <a:fillRef idx="0">
+            <a:schemeClr val="accent1"/>
+          </a:fillRef>
+          <a:effectRef idx="0">
+            <a:schemeClr val="accent1"/>
+          </a:effectRef>
+          <a:fontRef idx="minor">
+            <a:schemeClr val="tx1"/>
+          </a:fontRef>
+        </p:style>
+      </p:cxnSp>
+      <p:cxnSp>
+        <p:nvCxnSpPr>
+          <p:cNvPr id="30" name="Straight Arrow Connector 29"/>
+          <p:cNvCxnSpPr>
+            <a:stCxn id="8" idx="2"/>
+            <a:endCxn id="5" idx="0"/>
+          </p:cNvCxnSpPr>
+          <p:nvPr/>
+        </p:nvCxnSpPr>
+        <p:spPr>
+          <a:xfrm>
+            <a:off x="5029200" y="2095500"/>
+            <a:ext cx="0" cy="533400"/>
+          </a:xfrm>
+          <a:prstGeom prst="straightConnector1">
+            <a:avLst/>
+          </a:prstGeom>
+          <a:ln w="25400">
+            <a:solidFill>
+              <a:schemeClr val="tx1"/>
+            </a:solidFill>
+            <a:tailEnd type="triangle" w="lg" len="lg"/>
+          </a:ln>
+        </p:spPr>
+        <p:style>
+          <a:lnRef idx="1">
+            <a:schemeClr val="accent1"/>
+          </a:lnRef>
+          <a:fillRef idx="0">
+            <a:schemeClr val="accent1"/>
+          </a:fillRef>
+          <a:effectRef idx="0">
+            <a:schemeClr val="accent1"/>
+          </a:effectRef>
+          <a:fontRef idx="minor">
+            <a:schemeClr val="tx1"/>
+          </a:fontRef>
+        </p:style>
+      </p:cxnSp>
+      <p:cxnSp>
+        <p:nvCxnSpPr>
+          <p:cNvPr id="18" name="Elbow Connector 17"/>
+          <p:cNvCxnSpPr>
+            <a:stCxn id="6" idx="2"/>
+            <a:endCxn id="4" idx="2"/>
+          </p:cNvCxnSpPr>
+          <p:nvPr/>
+        </p:nvCxnSpPr>
+        <p:spPr>
+          <a:xfrm rot="16200000" flipH="1">
+            <a:off x="4419600" y="38100"/>
+            <a:ext cx="12700" cy="6096000"/>
+          </a:xfrm>
+          <a:prstGeom prst="bentConnector3">
+            <a:avLst>
+              <a:gd name="adj1" fmla="val 11381953"/>
+            </a:avLst>
+          </a:prstGeom>
+          <a:ln w="25400">
+            <a:solidFill>
+              <a:schemeClr val="tx1"/>
+            </a:solidFill>
+            <a:tailEnd type="triangle" w="lg" len="lg"/>
+          </a:ln>
+        </p:spPr>
+        <p:style>
+          <a:lnRef idx="1">
+            <a:schemeClr val="accent1"/>
+          </a:lnRef>
+          <a:fillRef idx="0">
+            <a:schemeClr val="accent1"/>
+          </a:fillRef>
+          <a:effectRef idx="0">
+            <a:schemeClr val="accent1"/>
+          </a:effectRef>
+          <a:fontRef idx="minor">
+            <a:schemeClr val="tx1"/>
+          </a:fontRef>
+        </p:style>
+      </p:cxnSp>
+      <p:cxnSp>
+        <p:nvCxnSpPr>
+          <p:cNvPr id="24" name="Elbow Connector 23"/>
+          <p:cNvCxnSpPr>
+            <a:stCxn id="6" idx="0"/>
+            <a:endCxn id="7" idx="1"/>
+          </p:cNvCxnSpPr>
+          <p:nvPr/>
+        </p:nvCxnSpPr>
+        <p:spPr>
+          <a:xfrm rot="5400000" flipH="1" flipV="1">
+            <a:off x="990600" y="1562100"/>
+            <a:ext cx="1447800" cy="685800"/>
+          </a:xfrm>
+          <a:prstGeom prst="bentConnector2">
+            <a:avLst/>
+          </a:prstGeom>
+          <a:ln w="25400">
+            <a:solidFill>
+              <a:schemeClr val="tx1"/>
+            </a:solidFill>
+            <a:tailEnd type="triangle" w="lg" len="lg"/>
+          </a:ln>
+        </p:spPr>
+        <p:style>
+          <a:lnRef idx="1">
+            <a:schemeClr val="accent1"/>
+          </a:lnRef>
+          <a:fillRef idx="0">
+            <a:schemeClr val="accent1"/>
+          </a:fillRef>
+          <a:effectRef idx="0">
+            <a:schemeClr val="accent1"/>
+          </a:effectRef>
+          <a:fontRef idx="minor">
+            <a:schemeClr val="tx1"/>
+          </a:fontRef>
+        </p:style>
+      </p:cxnSp>
+      <p:sp>
+        <p:nvSpPr>
+          <p:cNvPr id="19" name="TextBox 18"/>
+          <p:cNvSpPr txBox="1"/>
+          <p:nvPr/>
+        </p:nvSpPr>
+        <p:spPr>
+          <a:xfrm>
+            <a:off x="685800" y="5242098"/>
+            <a:ext cx="3886201" cy="369332"/>
+          </a:xfrm>
+          <a:prstGeom prst="rect">
+            <a:avLst/>
+          </a:prstGeom>
+          <a:noFill/>
+        </p:spPr>
+        <p:txBody>
+          <a:bodyPr wrap="square" rtlCol="0">
+            <a:spAutoFit/>
+          </a:bodyPr>
+          <a:lstStyle/>
+          <a:p>
+            <a:r>
+              <a:rPr lang="en-US" dirty="0" smtClean="0"/>
+              <a:t>* p&lt;0.05, ** p&lt;0.01, *** p&lt;0.001</a:t>
+            </a:r>
+            <a:endParaRPr lang="en-US" dirty="0"/>
+          </a:p>
+        </p:txBody>
+      </p:sp>
+      <p:sp>
+        <p:nvSpPr>
+          <p:cNvPr id="20" name="TextBox 19"/>
+          <p:cNvSpPr txBox="1"/>
+          <p:nvPr/>
+        </p:nvSpPr>
+        <p:spPr>
+          <a:xfrm>
+            <a:off x="1371600" y="1834634"/>
+            <a:ext cx="1188720" cy="369332"/>
+          </a:xfrm>
+          <a:prstGeom prst="rect">
+            <a:avLst/>
+          </a:prstGeom>
+          <a:noFill/>
+        </p:spPr>
+        <p:txBody>
+          <a:bodyPr wrap="square" rtlCol="0">
+            <a:spAutoFit/>
+          </a:bodyPr>
+          <a:lstStyle/>
+          <a:p>
+            <a:r>
+              <a:rPr lang="en-US" dirty="0" smtClean="0"/>
+              <a:t>0.169***</a:t>
+            </a:r>
+            <a:endParaRPr lang="en-US" dirty="0"/>
+          </a:p>
+        </p:txBody>
+      </p:sp>
+      <p:sp>
+        <p:nvSpPr>
+          <p:cNvPr id="27" name="TextBox 26"/>
+          <p:cNvSpPr txBox="1"/>
+          <p:nvPr/>
+        </p:nvSpPr>
+        <p:spPr>
+          <a:xfrm>
+            <a:off x="7465881" y="1682234"/>
+            <a:ext cx="1188720" cy="369332"/>
+          </a:xfrm>
+          <a:prstGeom prst="rect">
+            <a:avLst/>
+          </a:prstGeom>
+          <a:noFill/>
+        </p:spPr>
+        <p:txBody>
+          <a:bodyPr wrap="square" rtlCol="0">
+            <a:spAutoFit/>
+          </a:bodyPr>
+          <a:lstStyle/>
+          <a:p>
+            <a:r>
+              <a:rPr lang="en-US" dirty="0" smtClean="0"/>
+              <a:t>0.569***</a:t>
+            </a:r>
+          </a:p>
+        </p:txBody>
+      </p:sp>
+      <p:sp>
+        <p:nvSpPr>
+          <p:cNvPr id="28" name="TextBox 27"/>
+          <p:cNvSpPr txBox="1"/>
+          <p:nvPr/>
+        </p:nvSpPr>
+        <p:spPr>
+          <a:xfrm>
+            <a:off x="3230880" y="1452890"/>
+            <a:ext cx="1188720" cy="369332"/>
+          </a:xfrm>
+          <a:prstGeom prst="rect">
+            <a:avLst/>
+          </a:prstGeom>
+          <a:noFill/>
+        </p:spPr>
+        <p:txBody>
+          <a:bodyPr wrap="square" rtlCol="0">
+            <a:spAutoFit/>
+          </a:bodyPr>
+          <a:lstStyle/>
+          <a:p>
+            <a:r>
+              <a:rPr lang="en-US" dirty="0" smtClean="0"/>
+              <a:t>0.050*</a:t>
+            </a:r>
+            <a:endParaRPr lang="en-US" dirty="0"/>
+          </a:p>
+        </p:txBody>
+      </p:sp>
+      <p:sp>
+        <p:nvSpPr>
+          <p:cNvPr id="29" name="TextBox 28"/>
+          <p:cNvSpPr txBox="1"/>
+          <p:nvPr/>
+        </p:nvSpPr>
+        <p:spPr>
+          <a:xfrm>
+            <a:off x="2514600" y="2497291"/>
+            <a:ext cx="1188720" cy="369332"/>
+          </a:xfrm>
+          <a:prstGeom prst="rect">
+            <a:avLst/>
+          </a:prstGeom>
+          <a:noFill/>
+        </p:spPr>
+        <p:txBody>
+          <a:bodyPr wrap="square" rtlCol="0">
+            <a:spAutoFit/>
+          </a:bodyPr>
+          <a:lstStyle/>
+          <a:p>
+            <a:r>
+              <a:rPr lang="en-US" dirty="0" smtClean="0"/>
+              <a:t>0.090***</a:t>
+            </a:r>
+            <a:endParaRPr lang="en-US" dirty="0"/>
+          </a:p>
+        </p:txBody>
+      </p:sp>
+      <p:sp>
+        <p:nvSpPr>
+          <p:cNvPr id="31" name="TextBox 30"/>
+          <p:cNvSpPr txBox="1"/>
+          <p:nvPr/>
+        </p:nvSpPr>
+        <p:spPr>
+          <a:xfrm>
+            <a:off x="5075274" y="2095500"/>
+            <a:ext cx="1188720" cy="369332"/>
+          </a:xfrm>
+          <a:prstGeom prst="rect">
+            <a:avLst/>
+          </a:prstGeom>
+          <a:noFill/>
+        </p:spPr>
+        <p:txBody>
+          <a:bodyPr wrap="square" rtlCol="0">
+            <a:spAutoFit/>
+          </a:bodyPr>
+          <a:lstStyle/>
+          <a:p>
+            <a:r>
+              <a:rPr lang="en-US" dirty="0" smtClean="0"/>
+              <a:t>0.046*</a:t>
+            </a:r>
+            <a:endParaRPr lang="en-US" dirty="0"/>
+          </a:p>
+        </p:txBody>
+      </p:sp>
+      <p:sp>
+        <p:nvSpPr>
+          <p:cNvPr id="34" name="TextBox 33"/>
+          <p:cNvSpPr txBox="1"/>
+          <p:nvPr/>
+        </p:nvSpPr>
+        <p:spPr>
+          <a:xfrm>
+            <a:off x="5745480" y="2552700"/>
+            <a:ext cx="1188720" cy="369332"/>
+          </a:xfrm>
+          <a:prstGeom prst="rect">
+            <a:avLst/>
+          </a:prstGeom>
+          <a:noFill/>
+        </p:spPr>
+        <p:txBody>
+          <a:bodyPr wrap="square" lIns="0" rIns="0" rtlCol="0">
+            <a:spAutoFit/>
+          </a:bodyPr>
+          <a:lstStyle/>
+          <a:p>
+            <a:r>
+              <a:rPr lang="en-US" dirty="0" smtClean="0"/>
+              <a:t>0.063***</a:t>
+            </a:r>
+            <a:endParaRPr lang="en-US" dirty="0"/>
+          </a:p>
+        </p:txBody>
+      </p:sp>
+      <p:sp>
+        <p:nvSpPr>
+          <p:cNvPr id="35" name="TextBox 34"/>
+          <p:cNvSpPr txBox="1"/>
+          <p:nvPr/>
+        </p:nvSpPr>
+        <p:spPr>
+          <a:xfrm>
+            <a:off x="6172200" y="1943100"/>
+            <a:ext cx="1188720" cy="369332"/>
+          </a:xfrm>
+          <a:prstGeom prst="rect">
+            <a:avLst/>
+          </a:prstGeom>
+          <a:noFill/>
+        </p:spPr>
+        <p:txBody>
+          <a:bodyPr wrap="square" rtlCol="0">
+            <a:spAutoFit/>
+          </a:bodyPr>
+          <a:lstStyle/>
+          <a:p>
+            <a:r>
+              <a:rPr lang="en-US" dirty="0" smtClean="0"/>
+              <a:t>-0.213***</a:t>
+            </a:r>
+            <a:endParaRPr lang="en-US" dirty="0"/>
+          </a:p>
+        </p:txBody>
+      </p:sp>
+      <p:sp>
+        <p:nvSpPr>
+          <p:cNvPr id="36" name="TextBox 35"/>
+          <p:cNvSpPr txBox="1"/>
+          <p:nvPr/>
+        </p:nvSpPr>
+        <p:spPr>
+          <a:xfrm>
+            <a:off x="6172200" y="3445467"/>
+            <a:ext cx="1188720" cy="369332"/>
+          </a:xfrm>
+          <a:prstGeom prst="rect">
+            <a:avLst/>
+          </a:prstGeom>
+          <a:noFill/>
+        </p:spPr>
+        <p:txBody>
+          <a:bodyPr wrap="square" rtlCol="0">
+            <a:spAutoFit/>
+          </a:bodyPr>
+          <a:lstStyle/>
+          <a:p>
+            <a:r>
+              <a:rPr lang="en-US" dirty="0" smtClean="0"/>
+              <a:t>0.092***</a:t>
+            </a:r>
+          </a:p>
+        </p:txBody>
+      </p:sp>
+      <p:sp>
+        <p:nvSpPr>
+          <p:cNvPr id="37" name="TextBox 36"/>
+          <p:cNvSpPr txBox="1"/>
+          <p:nvPr/>
+        </p:nvSpPr>
+        <p:spPr>
+          <a:xfrm>
+            <a:off x="7507180" y="3739634"/>
+            <a:ext cx="1188720" cy="369332"/>
+          </a:xfrm>
+          <a:prstGeom prst="rect">
+            <a:avLst/>
+          </a:prstGeom>
+          <a:noFill/>
+        </p:spPr>
+        <p:txBody>
+          <a:bodyPr wrap="square" rtlCol="0">
+            <a:spAutoFit/>
+          </a:bodyPr>
+          <a:lstStyle/>
+          <a:p>
+            <a:r>
+              <a:rPr lang="en-US" dirty="0" smtClean="0"/>
+              <a:t>-0.085***</a:t>
+            </a:r>
+          </a:p>
+        </p:txBody>
+      </p:sp>
+      <p:sp>
+        <p:nvSpPr>
+          <p:cNvPr id="38" name="TextBox 37"/>
+          <p:cNvSpPr txBox="1"/>
+          <p:nvPr/>
+        </p:nvSpPr>
+        <p:spPr>
+          <a:xfrm>
+            <a:off x="5105400" y="2325795"/>
+            <a:ext cx="914400" cy="261610"/>
+          </a:xfrm>
+          <a:prstGeom prst="rect">
+            <a:avLst/>
+          </a:prstGeom>
+          <a:noFill/>
+        </p:spPr>
+        <p:txBody>
+          <a:bodyPr wrap="square" rtlCol="0">
+            <a:spAutoFit/>
+          </a:bodyPr>
+          <a:lstStyle/>
+          <a:p>
+            <a:r>
+              <a:rPr lang="en-US" sz="1100" dirty="0"/>
+              <a:t>p</a:t>
+            </a:r>
+            <a:r>
+              <a:rPr lang="en-US" sz="1100" dirty="0" smtClean="0"/>
+              <a:t> = 0.049</a:t>
+            </a:r>
+          </a:p>
+        </p:txBody>
+      </p:sp>
+      <p:sp>
+        <p:nvSpPr>
+          <p:cNvPr id="10" name="TextBox 9"/>
+          <p:cNvSpPr txBox="1"/>
+          <p:nvPr/>
+        </p:nvSpPr>
+        <p:spPr>
+          <a:xfrm>
+            <a:off x="685800" y="4838700"/>
+            <a:ext cx="5562600" cy="369332"/>
+          </a:xfrm>
+          <a:prstGeom prst="rect">
+            <a:avLst/>
+          </a:prstGeom>
+          <a:noFill/>
+        </p:spPr>
+        <p:txBody>
+          <a:bodyPr wrap="square" rtlCol="0">
+            <a:spAutoFit/>
+          </a:bodyPr>
+          <a:lstStyle/>
+          <a:p>
+            <a:r>
+              <a:rPr lang="en-US" dirty="0" smtClean="0"/>
+              <a:t>Pearson Correlation (</a:t>
+            </a:r>
+            <a:r>
+              <a:rPr lang="en-US" dirty="0" err="1" smtClean="0"/>
+              <a:t>CRECEIVEln</a:t>
+            </a:r>
+            <a:r>
+              <a:rPr lang="en-US" dirty="0" smtClean="0"/>
+              <a:t>, ORIGINAL) = 0.019</a:t>
+            </a:r>
+            <a:endParaRPr lang="en-US" dirty="0"/>
+          </a:p>
+        </p:txBody>
+      </p:sp>
+      <p:sp>
+        <p:nvSpPr>
+          <p:cNvPr id="41" name="TextBox 40"/>
+          <p:cNvSpPr txBox="1"/>
+          <p:nvPr/>
+        </p:nvSpPr>
+        <p:spPr>
+          <a:xfrm>
+            <a:off x="3251499" y="1681490"/>
+            <a:ext cx="914400" cy="261610"/>
+          </a:xfrm>
+          <a:prstGeom prst="rect">
+            <a:avLst/>
+          </a:prstGeom>
+          <a:noFill/>
+        </p:spPr>
+        <p:txBody>
+          <a:bodyPr wrap="square" rtlCol="0">
+            <a:spAutoFit/>
+          </a:bodyPr>
+          <a:lstStyle/>
+          <a:p>
+            <a:r>
+              <a:rPr lang="en-US" sz="1100" dirty="0"/>
+              <a:t>p</a:t>
+            </a:r>
+            <a:r>
+              <a:rPr lang="en-US" sz="1100" dirty="0" smtClean="0"/>
+              <a:t> = 0.032</a:t>
+            </a:r>
+          </a:p>
+        </p:txBody>
+      </p:sp>
+      <p:sp>
+        <p:nvSpPr>
+          <p:cNvPr id="40" name="TextBox 39"/>
+          <p:cNvSpPr txBox="1"/>
+          <p:nvPr/>
+        </p:nvSpPr>
+        <p:spPr>
+          <a:xfrm>
+            <a:off x="2057400" y="1409700"/>
+            <a:ext cx="914400" cy="261610"/>
+          </a:xfrm>
+          <a:prstGeom prst="rect">
+            <a:avLst/>
+          </a:prstGeom>
+          <a:noFill/>
+        </p:spPr>
+        <p:txBody>
+          <a:bodyPr wrap="square" rtlCol="0">
+            <a:spAutoFit/>
+          </a:bodyPr>
+          <a:lstStyle/>
+          <a:p>
+            <a:r>
+              <a:rPr lang="en-US" sz="1100" dirty="0" smtClean="0"/>
+              <a:t>R</a:t>
+            </a:r>
+            <a:r>
+              <a:rPr lang="en-US" sz="1100" baseline="30000" dirty="0" smtClean="0"/>
+              <a:t>2</a:t>
+            </a:r>
+            <a:r>
+              <a:rPr lang="en-US" sz="1100" dirty="0" smtClean="0"/>
+              <a:t> </a:t>
+            </a:r>
+            <a:r>
+              <a:rPr lang="en-US" sz="1100" dirty="0" smtClean="0"/>
+              <a:t>= </a:t>
+            </a:r>
+            <a:r>
+              <a:rPr lang="en-US" sz="1100" dirty="0" smtClean="0"/>
+              <a:t>0.029</a:t>
+            </a:r>
+            <a:endParaRPr lang="en-US" sz="1100" dirty="0" smtClean="0"/>
+          </a:p>
+        </p:txBody>
+      </p:sp>
+      <p:sp>
+        <p:nvSpPr>
+          <p:cNvPr id="42" name="TextBox 41"/>
+          <p:cNvSpPr txBox="1"/>
+          <p:nvPr/>
+        </p:nvSpPr>
+        <p:spPr>
+          <a:xfrm>
+            <a:off x="4267200" y="3086100"/>
+            <a:ext cx="914400" cy="261610"/>
+          </a:xfrm>
+          <a:prstGeom prst="rect">
+            <a:avLst/>
+          </a:prstGeom>
+          <a:noFill/>
+        </p:spPr>
+        <p:txBody>
+          <a:bodyPr wrap="square" rtlCol="0">
+            <a:spAutoFit/>
+          </a:bodyPr>
+          <a:lstStyle/>
+          <a:p>
+            <a:r>
+              <a:rPr lang="en-US" sz="1100" dirty="0">
+                <a:solidFill>
+                  <a:prstClr val="black"/>
+                </a:solidFill>
+              </a:rPr>
+              <a:t>R</a:t>
+            </a:r>
+            <a:r>
+              <a:rPr lang="en-US" sz="1100" baseline="30000" dirty="0">
+                <a:solidFill>
+                  <a:prstClr val="black"/>
+                </a:solidFill>
+              </a:rPr>
+              <a:t>2</a:t>
+            </a:r>
+            <a:r>
+              <a:rPr lang="en-US" sz="1100" dirty="0" smtClean="0"/>
+              <a:t> = 0.016 </a:t>
+            </a:r>
+            <a:endParaRPr lang="en-US" sz="1100" dirty="0" smtClean="0"/>
+          </a:p>
+        </p:txBody>
+      </p:sp>
+      <p:sp>
+        <p:nvSpPr>
+          <p:cNvPr id="43" name="TextBox 42"/>
+          <p:cNvSpPr txBox="1"/>
+          <p:nvPr/>
+        </p:nvSpPr>
+        <p:spPr>
+          <a:xfrm>
+            <a:off x="7543800" y="3086100"/>
+            <a:ext cx="914400" cy="261610"/>
+          </a:xfrm>
+          <a:prstGeom prst="rect">
+            <a:avLst/>
+          </a:prstGeom>
+          <a:noFill/>
+        </p:spPr>
+        <p:txBody>
+          <a:bodyPr wrap="square" rtlCol="0">
+            <a:spAutoFit/>
+          </a:bodyPr>
+          <a:lstStyle/>
+          <a:p>
+            <a:r>
+              <a:rPr lang="en-US" sz="1100" dirty="0">
+                <a:solidFill>
+                  <a:prstClr val="black"/>
+                </a:solidFill>
+              </a:rPr>
+              <a:t>R</a:t>
+            </a:r>
+            <a:r>
+              <a:rPr lang="en-US" sz="1100" baseline="30000" dirty="0">
+                <a:solidFill>
+                  <a:prstClr val="black"/>
+                </a:solidFill>
+              </a:rPr>
+              <a:t>2</a:t>
+            </a:r>
+            <a:r>
+              <a:rPr lang="en-US" sz="1100" dirty="0" smtClean="0"/>
+              <a:t> </a:t>
+            </a:r>
+            <a:r>
+              <a:rPr lang="en-US" sz="1100" dirty="0" smtClean="0"/>
+              <a:t>= </a:t>
+            </a:r>
+            <a:r>
+              <a:rPr lang="en-US" sz="1100" dirty="0" smtClean="0"/>
+              <a:t>0.432</a:t>
+            </a:r>
+            <a:endParaRPr lang="en-US" sz="1100" dirty="0" smtClean="0"/>
+          </a:p>
+        </p:txBody>
+      </p:sp>
+    </p:spTree>
+    <p:extLst>
+      <p:ext uri="{BB962C8B-B14F-4D97-AF65-F5344CB8AC3E}">
+        <p14:creationId xmlns:p14="http://schemas.microsoft.com/office/powerpoint/2010/main" val="966122257"/>
       </p:ext>
     </p:extLst>
   </p:cSld>

</xml_diff>

<commit_message>
Modified paper for Assignment 03 and updated analysis output
</commit_message>
<xml_diff>
--- a/Assignments/Assignment03/Results/Townes_SOC6100_Assignment03_PathAnalysisModel_Diagram_v00.pptx
+++ b/Assignments/Assignment03/Results/Townes_SOC6100_Assignment03_PathAnalysisModel_Diagram_v00.pptx
@@ -1127,15 +1127,7 @@
           <a:p>
             <a:r>
               <a:rPr lang="en-US" baseline="0" dirty="0" smtClean="0"/>
-              <a:t>42 </a:t>
-            </a:r>
-            <a:r>
-              <a:rPr lang="en-US" baseline="0" dirty="0" smtClean="0"/>
-              <a:t>outliers </a:t>
-            </a:r>
-            <a:r>
-              <a:rPr lang="en-US" baseline="0" dirty="0" smtClean="0"/>
-              <a:t>removed</a:t>
+              <a:t>42 outliers removed</a:t>
             </a:r>
             <a:endParaRPr lang="en-US" dirty="0"/>
           </a:p>
@@ -4953,7 +4945,7 @@
           <p:nvPr>
             <p:extLst>
               <p:ext uri="{D42A27DB-BD31-4B8C-83A1-F6EECF244321}">
-                <p14:modId xmlns:p14="http://schemas.microsoft.com/office/powerpoint/2010/main" val="3176934811"/>
+                <p14:modId xmlns:p14="http://schemas.microsoft.com/office/powerpoint/2010/main" val="1064735930"/>
               </p:ext>
             </p:extLst>
           </p:nvPr>
@@ -5125,6 +5117,35 @@
                         <a:rPr lang="en-US" sz="1400" dirty="0" smtClean="0"/>
                         <a:t>0.019</a:t>
                       </a:r>
+                    </a:p>
+                    <a:p>
+                      <a:pPr algn="r"/>
+                      <a:endParaRPr lang="en-US" sz="1400" dirty="0" smtClean="0"/>
+                    </a:p>
+                    <a:p>
+                      <a:pPr algn="r"/>
+                      <a:r>
+                        <a:rPr lang="en-US" sz="1400" dirty="0" smtClean="0"/>
+                        <a:t>RATIOCIT</a:t>
+                      </a:r>
+                    </a:p>
+                    <a:p>
+                      <a:pPr algn="r"/>
+                      <a:r>
+                        <a:rPr lang="en-US" sz="1400" dirty="0" smtClean="0"/>
+                        <a:t>0.098</a:t>
+                      </a:r>
+                    </a:p>
+                    <a:p>
+                      <a:pPr algn="r"/>
+                      <a:endParaRPr lang="en-US" sz="1400" dirty="0" smtClean="0"/>
+                    </a:p>
+                    <a:p>
+                      <a:pPr algn="r"/>
+                      <a:r>
+                        <a:rPr lang="en-US" sz="1400" dirty="0" smtClean="0"/>
+                        <a:t>Total=0.117</a:t>
+                      </a:r>
                       <a:endParaRPr lang="en-US" sz="1400" dirty="0"/>
                     </a:p>
                   </a:txBody>
@@ -5239,21 +5260,45 @@
                       </a:r>
                       <a:r>
                         <a:rPr lang="it-IT" sz="1400" dirty="0" smtClean="0"/>
-                        <a:t>(0.090)(0.063) = 0.006 </a:t>
+                        <a:t>(</a:t>
+                      </a:r>
+                      <a:r>
+                        <a:rPr lang="it-IT" sz="1400" dirty="0" smtClean="0"/>
+                        <a:t>0.091)(</a:t>
+                      </a:r>
+                      <a:r>
+                        <a:rPr lang="it-IT" sz="1400" dirty="0" smtClean="0"/>
+                        <a:t>0.063) = 0.006 </a:t>
                       </a:r>
                     </a:p>
                     <a:p>
                       <a:pPr algn="r"/>
                       <a:r>
                         <a:rPr lang="it-IT" sz="1400" dirty="0" smtClean="0"/>
-                        <a:t>GENERAL (0.050)(0.063) = 0.003 </a:t>
+                        <a:t>GENERAL (</a:t>
+                      </a:r>
+                      <a:r>
+                        <a:rPr lang="it-IT" sz="1400" dirty="0" smtClean="0"/>
+                        <a:t>0.053)(</a:t>
+                      </a:r>
+                      <a:r>
+                        <a:rPr lang="it-IT" sz="1400" dirty="0" smtClean="0"/>
+                        <a:t>0.063) = 0.003 </a:t>
                       </a:r>
                     </a:p>
                     <a:p>
                       <a:pPr algn="r"/>
                       <a:r>
                         <a:rPr lang="it-IT" sz="1400" dirty="0" smtClean="0"/>
-                        <a:t>GYEAR (0.046)(0.063) = 0.003 </a:t>
+                        <a:t>GYEAR (</a:t>
+                      </a:r>
+                      <a:r>
+                        <a:rPr lang="it-IT" sz="1400" dirty="0" smtClean="0"/>
+                        <a:t>0.050)(</a:t>
+                      </a:r>
+                      <a:r>
+                        <a:rPr lang="it-IT" sz="1400" dirty="0" smtClean="0"/>
+                        <a:t>0.063) = 0.003 </a:t>
                       </a:r>
                     </a:p>
                     <a:p>
@@ -5264,13 +5309,8 @@
                       <a:pPr algn="r"/>
                       <a:r>
                         <a:rPr lang="en-US" sz="1400" dirty="0" smtClean="0"/>
-                        <a:t>Total = </a:t>
+                        <a:t>Total = 0.108</a:t>
                       </a:r>
-                      <a:r>
-                        <a:rPr lang="en-US" sz="1400" dirty="0" smtClean="0"/>
-                        <a:t>0.108</a:t>
-                      </a:r>
-                      <a:endParaRPr lang="en-US" sz="1400" dirty="0" smtClean="0"/>
                     </a:p>
                     <a:p>
                       <a:pPr algn="r"/>
@@ -5287,28 +5327,15 @@
                       <a:pPr algn="r"/>
                       <a:r>
                         <a:rPr lang="en-US" sz="1400" dirty="0" smtClean="0"/>
-                        <a:t>-0.206 + </a:t>
-                      </a:r>
-                      <a:r>
-                        <a:rPr lang="en-US" sz="1400" dirty="0" smtClean="0"/>
-                        <a:t>0.108 </a:t>
-                      </a:r>
-                      <a:r>
-                        <a:rPr lang="en-US" sz="1400" dirty="0" smtClean="0"/>
-                        <a:t>= </a:t>
+                        <a:t>-0.206 + 0.108 = </a:t>
                       </a:r>
                     </a:p>
                     <a:p>
                       <a:pPr algn="r"/>
                       <a:r>
                         <a:rPr lang="en-US" sz="1400" dirty="0" smtClean="0"/>
-                        <a:t>-</a:t>
+                        <a:t>-0.098 </a:t>
                       </a:r>
-                      <a:r>
-                        <a:rPr lang="en-US" sz="1400" dirty="0" smtClean="0"/>
-                        <a:t>0.098 </a:t>
-                      </a:r>
-                      <a:endParaRPr lang="en-US" sz="1400" dirty="0" smtClean="0"/>
                     </a:p>
                     <a:p>
                       <a:pPr algn="r"/>
@@ -5325,27 +5352,19 @@
                       <a:pPr algn="r"/>
                       <a:r>
                         <a:rPr lang="en-US" sz="1400" dirty="0" smtClean="0"/>
-                        <a:t>0.019-(-</a:t>
+                        <a:t>0.117-(-</a:t>
                       </a:r>
                       <a:r>
                         <a:rPr lang="en-US" sz="1400" dirty="0" smtClean="0"/>
-                        <a:t>0.098) </a:t>
-                      </a:r>
-                      <a:r>
-                        <a:rPr lang="en-US" sz="1400" dirty="0" smtClean="0"/>
-                        <a:t>= </a:t>
+                        <a:t>0.098) = </a:t>
                       </a:r>
                       <a:br>
                         <a:rPr lang="en-US" sz="1400" dirty="0" smtClean="0"/>
                       </a:br>
                       <a:r>
                         <a:rPr lang="en-US" sz="1400" dirty="0" smtClean="0"/>
-                        <a:t>0.117</a:t>
+                        <a:t>0.215</a:t>
                       </a:r>
-                      <a:endParaRPr lang="en-US" sz="1400" dirty="0" smtClean="0"/>
-                    </a:p>
-                    <a:p>
-                      <a:pPr algn="r"/>
                       <a:endParaRPr lang="en-US" sz="1400" dirty="0"/>
                     </a:p>
                   </a:txBody>
@@ -11447,17 +11466,8 @@
             </a:r>
             <a:r>
               <a:rPr lang="en-US" sz="1100" dirty="0" smtClean="0"/>
-              <a:t> </a:t>
-            </a:r>
-            <a:r>
-              <a:rPr lang="en-US" sz="1100" dirty="0" smtClean="0"/>
-              <a:t>= </a:t>
-            </a:r>
-            <a:r>
-              <a:rPr lang="en-US" sz="1100" dirty="0" smtClean="0"/>
-              <a:t>0.029</a:t>
-            </a:r>
-            <a:endParaRPr lang="en-US" sz="1100" dirty="0" smtClean="0"/>
+              <a:t> = 0.029</a:t>
+            </a:r>
           </a:p>
         </p:txBody>
       </p:sp>
@@ -11501,17 +11511,8 @@
             </a:r>
             <a:r>
               <a:rPr lang="en-US" sz="1100" dirty="0" smtClean="0"/>
-              <a:t> </a:t>
-            </a:r>
-            <a:r>
-              <a:rPr lang="en-US" sz="1100" dirty="0" smtClean="0"/>
-              <a:t>= </a:t>
-            </a:r>
-            <a:r>
-              <a:rPr lang="en-US" sz="1100" dirty="0" smtClean="0"/>
-              <a:t>0.016</a:t>
-            </a:r>
-            <a:endParaRPr lang="en-US" sz="1100" dirty="0" smtClean="0"/>
+              <a:t> = 0.016</a:t>
+            </a:r>
           </a:p>
         </p:txBody>
       </p:sp>
@@ -11555,17 +11556,8 @@
             </a:r>
             <a:r>
               <a:rPr lang="en-US" sz="1100" dirty="0" smtClean="0"/>
-              <a:t> </a:t>
-            </a:r>
-            <a:r>
-              <a:rPr lang="en-US" sz="1100" dirty="0" smtClean="0"/>
-              <a:t>= </a:t>
-            </a:r>
-            <a:r>
-              <a:rPr lang="en-US" sz="1100" dirty="0" smtClean="0"/>
-              <a:t>0.432</a:t>
-            </a:r>
-            <a:endParaRPr lang="en-US" sz="1100" dirty="0" smtClean="0"/>
+              <a:t> = 0.432</a:t>
+            </a:r>
           </a:p>
         </p:txBody>
       </p:sp>
@@ -12765,7 +12757,7 @@
           <a:p>
             <a:r>
               <a:rPr lang="en-US" dirty="0" smtClean="0"/>
-              <a:t>0.050*</a:t>
+              <a:t>0.053*</a:t>
             </a:r>
             <a:endParaRPr lang="en-US" dirty="0"/>
           </a:p>
@@ -12795,7 +12787,7 @@
           <a:p>
             <a:r>
               <a:rPr lang="en-US" dirty="0" smtClean="0"/>
-              <a:t>0.090***</a:t>
+              <a:t>0.091***</a:t>
             </a:r>
             <a:endParaRPr lang="en-US" dirty="0"/>
           </a:p>
@@ -12825,7 +12817,7 @@
           <a:p>
             <a:r>
               <a:rPr lang="en-US" dirty="0" smtClean="0"/>
-              <a:t>0.046*</a:t>
+              <a:t>0.050*</a:t>
             </a:r>
             <a:endParaRPr lang="en-US" dirty="0"/>
           </a:p>
@@ -12977,8 +12969,13 @@
             </a:r>
             <a:r>
               <a:rPr lang="en-US" sz="1100" dirty="0" smtClean="0"/>
-              <a:t> = 0.049</a:t>
-            </a:r>
+              <a:t> = </a:t>
+            </a:r>
+            <a:r>
+              <a:rPr lang="en-US" sz="1100" dirty="0" smtClean="0"/>
+              <a:t>0.031</a:t>
+            </a:r>
+            <a:endParaRPr lang="en-US" sz="1100" dirty="0" smtClean="0"/>
           </a:p>
         </p:txBody>
       </p:sp>
@@ -12990,7 +12987,7 @@
         </p:nvSpPr>
         <p:spPr>
           <a:xfrm>
-            <a:off x="685800" y="4838700"/>
+            <a:off x="685800" y="4610100"/>
             <a:ext cx="5562600" cy="369332"/>
           </a:xfrm>
           <a:prstGeom prst="rect">
@@ -13048,8 +13045,13 @@
             </a:r>
             <a:r>
               <a:rPr lang="en-US" sz="1100" dirty="0" smtClean="0"/>
-              <a:t> = 0.032</a:t>
-            </a:r>
+              <a:t> = </a:t>
+            </a:r>
+            <a:r>
+              <a:rPr lang="en-US" sz="1100" dirty="0" smtClean="0"/>
+              <a:t>0.024</a:t>
+            </a:r>
+            <a:endParaRPr lang="en-US" sz="1100" dirty="0" smtClean="0"/>
           </a:p>
         </p:txBody>
       </p:sp>
@@ -13085,17 +13087,8 @@
             </a:r>
             <a:r>
               <a:rPr lang="en-US" sz="1100" dirty="0" smtClean="0"/>
-              <a:t> </a:t>
-            </a:r>
-            <a:r>
-              <a:rPr lang="en-US" sz="1100" dirty="0" smtClean="0"/>
-              <a:t>= </a:t>
-            </a:r>
-            <a:r>
-              <a:rPr lang="en-US" sz="1100" dirty="0" smtClean="0"/>
-              <a:t>0.029</a:t>
-            </a:r>
-            <a:endParaRPr lang="en-US" sz="1100" dirty="0" smtClean="0"/>
+              <a:t> = 0.029</a:t>
+            </a:r>
           </a:p>
         </p:txBody>
       </p:sp>
@@ -13139,7 +13132,11 @@
             </a:r>
             <a:r>
               <a:rPr lang="en-US" sz="1100" dirty="0" smtClean="0"/>
-              <a:t> = 0.016 </a:t>
+              <a:t> = </a:t>
+            </a:r>
+            <a:r>
+              <a:rPr lang="en-US" sz="1100" dirty="0" smtClean="0"/>
+              <a:t>0.014 </a:t>
             </a:r>
             <a:endParaRPr lang="en-US" sz="1100" dirty="0" smtClean="0"/>
           </a:p>
@@ -13185,17 +13182,62 @@
             </a:r>
             <a:r>
               <a:rPr lang="en-US" sz="1100" dirty="0" smtClean="0"/>
-              <a:t> </a:t>
-            </a:r>
-            <a:r>
-              <a:rPr lang="en-US" sz="1100" dirty="0" smtClean="0"/>
+              <a:t> = 0.432</a:t>
+            </a:r>
+          </a:p>
+        </p:txBody>
+      </p:sp>
+      <p:sp>
+        <p:nvSpPr>
+          <p:cNvPr id="33" name="TextBox 32"/>
+          <p:cNvSpPr txBox="1"/>
+          <p:nvPr/>
+        </p:nvSpPr>
+        <p:spPr>
+          <a:xfrm>
+            <a:off x="685800" y="4896522"/>
+            <a:ext cx="5562600" cy="369332"/>
+          </a:xfrm>
+          <a:prstGeom prst="rect">
+            <a:avLst/>
+          </a:prstGeom>
+          <a:noFill/>
+        </p:spPr>
+        <p:txBody>
+          <a:bodyPr wrap="square" rtlCol="0">
+            <a:spAutoFit/>
+          </a:bodyPr>
+          <a:lstStyle/>
+          <a:p>
+            <a:r>
+              <a:rPr lang="en-US" dirty="0" smtClean="0"/>
+              <a:t>Pearson Correlation (</a:t>
+            </a:r>
+            <a:r>
+              <a:rPr lang="en-US" dirty="0" err="1" smtClean="0"/>
+              <a:t>CRECEIVEln</a:t>
+            </a:r>
+            <a:r>
+              <a:rPr lang="en-US" dirty="0" smtClean="0"/>
+              <a:t>, </a:t>
+            </a:r>
+            <a:r>
+              <a:rPr lang="en-US" dirty="0" smtClean="0"/>
+              <a:t>RATIOCIT</a:t>
+            </a:r>
+            <a:r>
+              <a:rPr lang="en-US" dirty="0" smtClean="0"/>
+              <a:t>) </a:t>
+            </a:r>
+            <a:r>
+              <a:rPr lang="en-US" dirty="0" smtClean="0"/>
               <a:t>= </a:t>
             </a:r>
             <a:r>
-              <a:rPr lang="en-US" sz="1100" dirty="0" smtClean="0"/>
-              <a:t>0.432</a:t>
-            </a:r>
-            <a:endParaRPr lang="en-US" sz="1100" dirty="0" smtClean="0"/>
+              <a:rPr lang="en-US" dirty="0" smtClean="0"/>
+              <a:t>0.098</a:t>
+            </a:r>
+            <a:endParaRPr lang="en-US" dirty="0"/>
           </a:p>
         </p:txBody>
       </p:sp>

</xml_diff>

<commit_message>
Modified paper for Assignment 03
</commit_message>
<xml_diff>
--- a/Assignments/Assignment03/Results/Townes_SOC6100_Assignment03_PathAnalysisModel_Diagram_v00.pptx
+++ b/Assignments/Assignment03/Results/Townes_SOC6100_Assignment03_PathAnalysisModel_Diagram_v00.pptx
@@ -5,7 +5,7 @@
     <p:sldMasterId id="2147483648" r:id="rId1"/>
   </p:sldMasterIdLst>
   <p:notesMasterIdLst>
-    <p:notesMasterId r:id="rId12"/>
+    <p:notesMasterId r:id="rId13"/>
   </p:notesMasterIdLst>
   <p:sldIdLst>
     <p:sldId id="256" r:id="rId2"/>
@@ -18,6 +18,7 @@
     <p:sldId id="263" r:id="rId9"/>
     <p:sldId id="265" r:id="rId10"/>
     <p:sldId id="266" r:id="rId11"/>
+    <p:sldId id="267" r:id="rId12"/>
   </p:sldIdLst>
   <p:sldSz cx="9144000" cy="5715000" type="screen16x10"/>
   <p:notesSz cx="7010400" cy="9296400"/>
@@ -201,7 +202,7 @@
           <a:p>
             <a:fld id="{F9983AA4-ADB7-4D78-BC0B-61D53AF05290}" type="datetimeFigureOut">
               <a:rPr lang="en-US" smtClean="0"/>
-              <a:t>10/30/2018</a:t>
+              <a:t>10/31/2018</a:t>
             </a:fld>
             <a:endParaRPr lang="en-US"/>
           </a:p>
@@ -553,6 +554,94 @@
 </p:notes>
 </file>
 
+<file path=ppt/notesSlides/notesSlide10.xml><?xml version="1.0" encoding="utf-8"?>
+<p:notes xmlns:a="http://schemas.openxmlformats.org/drawingml/2006/main" xmlns:r="http://schemas.openxmlformats.org/officeDocument/2006/relationships" xmlns:p="http://schemas.openxmlformats.org/presentationml/2006/main">
+  <p:cSld>
+    <p:spTree>
+      <p:nvGrpSpPr>
+        <p:cNvPr id="1" name=""/>
+        <p:cNvGrpSpPr/>
+        <p:nvPr/>
+      </p:nvGrpSpPr>
+      <p:grpSpPr>
+        <a:xfrm>
+          <a:off x="0" y="0"/>
+          <a:ext cx="0" cy="0"/>
+          <a:chOff x="0" y="0"/>
+          <a:chExt cx="0" cy="0"/>
+        </a:xfrm>
+      </p:grpSpPr>
+      <p:sp>
+        <p:nvSpPr>
+          <p:cNvPr id="2" name="Slide Image Placeholder 1"/>
+          <p:cNvSpPr>
+            <a:spLocks noGrp="1" noRot="1" noChangeAspect="1"/>
+          </p:cNvSpPr>
+          <p:nvPr>
+            <p:ph type="sldImg"/>
+          </p:nvPr>
+        </p:nvSpPr>
+        <p:spPr/>
+      </p:sp>
+      <p:sp>
+        <p:nvSpPr>
+          <p:cNvPr id="3" name="Notes Placeholder 2"/>
+          <p:cNvSpPr>
+            <a:spLocks noGrp="1"/>
+          </p:cNvSpPr>
+          <p:nvPr>
+            <p:ph type="body" idx="1"/>
+          </p:nvPr>
+        </p:nvSpPr>
+        <p:spPr/>
+        <p:txBody>
+          <a:bodyPr/>
+          <a:lstStyle/>
+          <a:p>
+            <a:r>
+              <a:rPr lang="en-US" dirty="0" smtClean="0"/>
+              <a:t>42 outliers removed</a:t>
+            </a:r>
+            <a:endParaRPr lang="en-US" dirty="0"/>
+          </a:p>
+        </p:txBody>
+      </p:sp>
+      <p:sp>
+        <p:nvSpPr>
+          <p:cNvPr id="4" name="Slide Number Placeholder 3"/>
+          <p:cNvSpPr>
+            <a:spLocks noGrp="1"/>
+          </p:cNvSpPr>
+          <p:nvPr>
+            <p:ph type="sldNum" sz="quarter" idx="10"/>
+          </p:nvPr>
+        </p:nvSpPr>
+        <p:spPr/>
+        <p:txBody>
+          <a:bodyPr/>
+          <a:lstStyle/>
+          <a:p>
+            <a:fld id="{0AC83BEF-6787-481E-AFCA-033D79C6C037}" type="slidenum">
+              <a:rPr lang="en-US" smtClean="0"/>
+              <a:t>11</a:t>
+            </a:fld>
+            <a:endParaRPr lang="en-US"/>
+          </a:p>
+        </p:txBody>
+      </p:sp>
+    </p:spTree>
+    <p:extLst>
+      <p:ext uri="{BB962C8B-B14F-4D97-AF65-F5344CB8AC3E}">
+        <p14:creationId xmlns:p14="http://schemas.microsoft.com/office/powerpoint/2010/main" val="2852839965"/>
+      </p:ext>
+    </p:extLst>
+  </p:cSld>
+  <p:clrMapOvr>
+    <a:masterClrMapping/>
+  </p:clrMapOvr>
+</p:notes>
+</file>
+
 <file path=ppt/notesSlides/notesSlide2.xml><?xml version="1.0" encoding="utf-8"?>
 <p:notes xmlns:a="http://schemas.openxmlformats.org/drawingml/2006/main" xmlns:r="http://schemas.openxmlformats.org/officeDocument/2006/relationships" xmlns:p="http://schemas.openxmlformats.org/presentationml/2006/main">
   <p:cSld>
@@ -1438,7 +1527,7 @@
           <a:p>
             <a:fld id="{BF30DF70-5848-4672-8949-A08F2F452BE1}" type="datetimeFigureOut">
               <a:rPr lang="en-US" smtClean="0"/>
-              <a:t>10/30/2018</a:t>
+              <a:t>10/31/2018</a:t>
             </a:fld>
             <a:endParaRPr lang="en-US"/>
           </a:p>
@@ -1608,7 +1697,7 @@
           <a:p>
             <a:fld id="{BF30DF70-5848-4672-8949-A08F2F452BE1}" type="datetimeFigureOut">
               <a:rPr lang="en-US" smtClean="0"/>
-              <a:t>10/30/2018</a:t>
+              <a:t>10/31/2018</a:t>
             </a:fld>
             <a:endParaRPr lang="en-US"/>
           </a:p>
@@ -1788,7 +1877,7 @@
           <a:p>
             <a:fld id="{BF30DF70-5848-4672-8949-A08F2F452BE1}" type="datetimeFigureOut">
               <a:rPr lang="en-US" smtClean="0"/>
-              <a:t>10/30/2018</a:t>
+              <a:t>10/31/2018</a:t>
             </a:fld>
             <a:endParaRPr lang="en-US"/>
           </a:p>
@@ -1958,7 +2047,7 @@
           <a:p>
             <a:fld id="{BF30DF70-5848-4672-8949-A08F2F452BE1}" type="datetimeFigureOut">
               <a:rPr lang="en-US" smtClean="0"/>
-              <a:t>10/30/2018</a:t>
+              <a:t>10/31/2018</a:t>
             </a:fld>
             <a:endParaRPr lang="en-US"/>
           </a:p>
@@ -2204,7 +2293,7 @@
           <a:p>
             <a:fld id="{BF30DF70-5848-4672-8949-A08F2F452BE1}" type="datetimeFigureOut">
               <a:rPr lang="en-US" smtClean="0"/>
-              <a:t>10/30/2018</a:t>
+              <a:t>10/31/2018</a:t>
             </a:fld>
             <a:endParaRPr lang="en-US"/>
           </a:p>
@@ -2492,7 +2581,7 @@
           <a:p>
             <a:fld id="{BF30DF70-5848-4672-8949-A08F2F452BE1}" type="datetimeFigureOut">
               <a:rPr lang="en-US" smtClean="0"/>
-              <a:t>10/30/2018</a:t>
+              <a:t>10/31/2018</a:t>
             </a:fld>
             <a:endParaRPr lang="en-US"/>
           </a:p>
@@ -2919,7 +3008,7 @@
           <a:p>
             <a:fld id="{BF30DF70-5848-4672-8949-A08F2F452BE1}" type="datetimeFigureOut">
               <a:rPr lang="en-US" smtClean="0"/>
-              <a:t>10/30/2018</a:t>
+              <a:t>10/31/2018</a:t>
             </a:fld>
             <a:endParaRPr lang="en-US"/>
           </a:p>
@@ -3037,7 +3126,7 @@
           <a:p>
             <a:fld id="{BF30DF70-5848-4672-8949-A08F2F452BE1}" type="datetimeFigureOut">
               <a:rPr lang="en-US" smtClean="0"/>
-              <a:t>10/30/2018</a:t>
+              <a:t>10/31/2018</a:t>
             </a:fld>
             <a:endParaRPr lang="en-US"/>
           </a:p>
@@ -3132,7 +3221,7 @@
           <a:p>
             <a:fld id="{BF30DF70-5848-4672-8949-A08F2F452BE1}" type="datetimeFigureOut">
               <a:rPr lang="en-US" smtClean="0"/>
-              <a:t>10/30/2018</a:t>
+              <a:t>10/31/2018</a:t>
             </a:fld>
             <a:endParaRPr lang="en-US"/>
           </a:p>
@@ -3409,7 +3498,7 @@
           <a:p>
             <a:fld id="{BF30DF70-5848-4672-8949-A08F2F452BE1}" type="datetimeFigureOut">
               <a:rPr lang="en-US" smtClean="0"/>
-              <a:t>10/30/2018</a:t>
+              <a:t>10/31/2018</a:t>
             </a:fld>
             <a:endParaRPr lang="en-US"/>
           </a:p>
@@ -3662,7 +3751,7 @@
           <a:p>
             <a:fld id="{BF30DF70-5848-4672-8949-A08F2F452BE1}" type="datetimeFigureOut">
               <a:rPr lang="en-US" smtClean="0"/>
-              <a:t>10/30/2018</a:t>
+              <a:t>10/31/2018</a:t>
             </a:fld>
             <a:endParaRPr lang="en-US"/>
           </a:p>
@@ -3875,7 +3964,7 @@
           <a:p>
             <a:fld id="{BF30DF70-5848-4672-8949-A08F2F452BE1}" type="datetimeFigureOut">
               <a:rPr lang="en-US" smtClean="0"/>
-              <a:t>10/30/2018</a:t>
+              <a:t>10/31/2018</a:t>
             </a:fld>
             <a:endParaRPr lang="en-US"/>
           </a:p>
@@ -4945,13 +5034,495 @@
           <p:nvPr>
             <p:extLst>
               <p:ext uri="{D42A27DB-BD31-4B8C-83A1-F6EECF244321}">
-                <p14:modId xmlns:p14="http://schemas.microsoft.com/office/powerpoint/2010/main" val="1064735930"/>
+                <p14:modId xmlns:p14="http://schemas.microsoft.com/office/powerpoint/2010/main" val="184623088"/>
               </p:ext>
             </p:extLst>
           </p:nvPr>
         </p:nvGraphicFramePr>
         <p:xfrm>
-          <a:off x="76200" y="1452880"/>
+          <a:off x="76200" y="1239520"/>
+          <a:ext cx="8991600" cy="3235960"/>
+        </p:xfrm>
+        <a:graphic>
+          <a:graphicData uri="http://schemas.openxmlformats.org/drawingml/2006/table">
+            <a:tbl>
+              <a:tblPr firstRow="1" bandRow="1">
+                <a:tableStyleId>{5C22544A-7EE6-4342-B048-85BDC9FD1C3A}</a:tableStyleId>
+              </a:tblPr>
+              <a:tblGrid>
+                <a:gridCol w="1219200"/>
+                <a:gridCol w="1066800"/>
+                <a:gridCol w="1219200"/>
+                <a:gridCol w="2667000"/>
+                <a:gridCol w="1447800"/>
+                <a:gridCol w="1371600"/>
+              </a:tblGrid>
+              <a:tr h="370840">
+                <a:tc>
+                  <a:txBody>
+                    <a:bodyPr/>
+                    <a:lstStyle/>
+                    <a:p>
+                      <a:pPr algn="ctr"/>
+                      <a:endParaRPr lang="en-US" sz="1400" dirty="0"/>
+                    </a:p>
+                  </a:txBody>
+                  <a:tcPr/>
+                </a:tc>
+                <a:tc>
+                  <a:txBody>
+                    <a:bodyPr/>
+                    <a:lstStyle/>
+                    <a:p>
+                      <a:pPr algn="ctr"/>
+                      <a:r>
+                        <a:rPr lang="en-US" sz="1400" dirty="0" smtClean="0"/>
+                        <a:t>Total Assoc.</a:t>
+                      </a:r>
+                      <a:endParaRPr lang="en-US" sz="1400" dirty="0"/>
+                    </a:p>
+                  </a:txBody>
+                  <a:tcPr/>
+                </a:tc>
+                <a:tc>
+                  <a:txBody>
+                    <a:bodyPr/>
+                    <a:lstStyle/>
+                    <a:p>
+                      <a:pPr algn="ctr"/>
+                      <a:r>
+                        <a:rPr lang="en-US" sz="1400" dirty="0" smtClean="0"/>
+                        <a:t>Direct Effects</a:t>
+                      </a:r>
+                      <a:endParaRPr lang="en-US" sz="1400" dirty="0"/>
+                    </a:p>
+                  </a:txBody>
+                  <a:tcPr/>
+                </a:tc>
+                <a:tc>
+                  <a:txBody>
+                    <a:bodyPr/>
+                    <a:lstStyle/>
+                    <a:p>
+                      <a:pPr algn="ctr"/>
+                      <a:r>
+                        <a:rPr lang="en-US" sz="1400" dirty="0" smtClean="0"/>
+                        <a:t>Indirect Effects</a:t>
+                      </a:r>
+                      <a:endParaRPr lang="en-US" sz="1400" dirty="0"/>
+                    </a:p>
+                  </a:txBody>
+                  <a:tcPr/>
+                </a:tc>
+                <a:tc>
+                  <a:txBody>
+                    <a:bodyPr/>
+                    <a:lstStyle/>
+                    <a:p>
+                      <a:pPr algn="ctr"/>
+                      <a:r>
+                        <a:rPr lang="en-US" sz="1400" dirty="0" smtClean="0"/>
+                        <a:t>Total Effects</a:t>
+                      </a:r>
+                      <a:endParaRPr lang="en-US" sz="1400" dirty="0"/>
+                    </a:p>
+                  </a:txBody>
+                  <a:tcPr/>
+                </a:tc>
+                <a:tc>
+                  <a:txBody>
+                    <a:bodyPr/>
+                    <a:lstStyle/>
+                    <a:p>
+                      <a:pPr algn="ctr"/>
+                      <a:r>
+                        <a:rPr lang="en-US" sz="1400" dirty="0" smtClean="0"/>
+                        <a:t>Non-Causal</a:t>
+                      </a:r>
+                      <a:endParaRPr lang="en-US" sz="1400" dirty="0"/>
+                    </a:p>
+                  </a:txBody>
+                  <a:tcPr/>
+                </a:tc>
+              </a:tr>
+              <a:tr h="370840">
+                <a:tc>
+                  <a:txBody>
+                    <a:bodyPr/>
+                    <a:lstStyle/>
+                    <a:p>
+                      <a:pPr marL="0" marR="0" indent="0" algn="l" defTabSz="914400" rtl="0" eaLnBrk="1" fontAlgn="auto" latinLnBrk="0" hangingPunct="1">
+                        <a:lnSpc>
+                          <a:spcPct val="100000"/>
+                        </a:lnSpc>
+                        <a:spcBef>
+                          <a:spcPts val="0"/>
+                        </a:spcBef>
+                        <a:spcAft>
+                          <a:spcPts val="0"/>
+                        </a:spcAft>
+                        <a:buClrTx/>
+                        <a:buSzTx/>
+                        <a:buFontTx/>
+                        <a:buNone/>
+                        <a:tabLst/>
+                        <a:defRPr/>
+                      </a:pPr>
+                      <a:r>
+                        <a:rPr lang="en-US" sz="1400" baseline="0" dirty="0" smtClean="0"/>
+                        <a:t>N = 1,958</a:t>
+                      </a:r>
+                      <a:endParaRPr lang="en-US" sz="1400" dirty="0" smtClean="0"/>
+                    </a:p>
+                    <a:p>
+                      <a:endParaRPr lang="en-US" sz="1400" baseline="0" dirty="0" smtClean="0"/>
+                    </a:p>
+                    <a:p>
+                      <a:r>
+                        <a:rPr lang="en-US" sz="1400" baseline="0" dirty="0" smtClean="0"/>
+                        <a:t>42 outliers removed</a:t>
+                      </a:r>
+                    </a:p>
+                    <a:p>
+                      <a:endParaRPr lang="en-US" sz="1400" baseline="0" dirty="0" smtClean="0"/>
+                    </a:p>
+                  </a:txBody>
+                  <a:tcPr/>
+                </a:tc>
+                <a:tc>
+                  <a:txBody>
+                    <a:bodyPr/>
+                    <a:lstStyle/>
+                    <a:p>
+                      <a:pPr algn="r"/>
+                      <a:r>
+                        <a:rPr lang="en-US" sz="1400" dirty="0" smtClean="0"/>
+                        <a:t>ORIGINAL</a:t>
+                      </a:r>
+                    </a:p>
+                    <a:p>
+                      <a:pPr algn="r"/>
+                      <a:r>
+                        <a:rPr lang="en-US" sz="1400" dirty="0" smtClean="0"/>
+                        <a:t>0.019</a:t>
+                      </a:r>
+                    </a:p>
+                    <a:p>
+                      <a:pPr algn="r"/>
+                      <a:endParaRPr lang="en-US" sz="1400" dirty="0" smtClean="0"/>
+                    </a:p>
+                    <a:p>
+                      <a:pPr algn="r"/>
+                      <a:r>
+                        <a:rPr lang="en-US" sz="1400" dirty="0" smtClean="0"/>
+                        <a:t>RATIOCIT</a:t>
+                      </a:r>
+                    </a:p>
+                    <a:p>
+                      <a:pPr algn="r"/>
+                      <a:r>
+                        <a:rPr lang="en-US" sz="1400" dirty="0" smtClean="0"/>
+                        <a:t>0.098</a:t>
+                      </a:r>
+                    </a:p>
+                    <a:p>
+                      <a:pPr algn="r"/>
+                      <a:endParaRPr lang="en-US" sz="1400" dirty="0" smtClean="0"/>
+                    </a:p>
+                    <a:p>
+                      <a:pPr algn="r"/>
+                      <a:r>
+                        <a:rPr lang="en-US" sz="1400" dirty="0" smtClean="0"/>
+                        <a:t>Total=0.117</a:t>
+                      </a:r>
+                      <a:endParaRPr lang="en-US" sz="1400" dirty="0"/>
+                    </a:p>
+                  </a:txBody>
+                  <a:tcPr/>
+                </a:tc>
+                <a:tc>
+                  <a:txBody>
+                    <a:bodyPr/>
+                    <a:lstStyle/>
+                    <a:p>
+                      <a:pPr algn="r"/>
+                      <a:r>
+                        <a:rPr lang="en-US" sz="1400" dirty="0" smtClean="0"/>
+                        <a:t>ORIGINAL</a:t>
+                      </a:r>
+                    </a:p>
+                    <a:p>
+                      <a:pPr algn="r"/>
+                      <a:r>
+                        <a:rPr lang="en-US" sz="1400" dirty="0" smtClean="0"/>
+                        <a:t>-0.085</a:t>
+                      </a:r>
+                    </a:p>
+                    <a:p>
+                      <a:pPr algn="r"/>
+                      <a:endParaRPr lang="en-US" sz="1400" dirty="0" smtClean="0"/>
+                    </a:p>
+                    <a:p>
+                      <a:pPr algn="r"/>
+                      <a:r>
+                        <a:rPr lang="en-US" sz="1400" dirty="0" smtClean="0"/>
+                        <a:t>GENERAL</a:t>
+                      </a:r>
+                      <a:endParaRPr lang="en-US" sz="1400" dirty="0" smtClean="0"/>
+                    </a:p>
+                    <a:p>
+                      <a:pPr algn="r"/>
+                      <a:r>
+                        <a:rPr lang="en-US" sz="1400" dirty="0" smtClean="0"/>
+                        <a:t>0.569</a:t>
+                      </a:r>
+                      <a:endParaRPr lang="en-US" sz="1400" dirty="0" smtClean="0"/>
+                    </a:p>
+                    <a:p>
+                      <a:pPr algn="r"/>
+                      <a:endParaRPr lang="en-US" sz="1400" dirty="0" smtClean="0"/>
+                    </a:p>
+                    <a:p>
+                      <a:pPr algn="r"/>
+                      <a:r>
+                        <a:rPr lang="en-US" sz="1400" dirty="0" smtClean="0"/>
+                        <a:t>GYEAR</a:t>
+                      </a:r>
+                    </a:p>
+                    <a:p>
+                      <a:pPr algn="r"/>
+                      <a:r>
+                        <a:rPr lang="en-US" sz="1400" dirty="0" smtClean="0"/>
+                        <a:t>-0.213</a:t>
+                      </a:r>
+                    </a:p>
+                    <a:p>
+                      <a:pPr algn="r"/>
+                      <a:endParaRPr lang="en-US" sz="1400" dirty="0" smtClean="0"/>
+                    </a:p>
+                    <a:p>
+                      <a:pPr algn="r"/>
+                      <a:r>
+                        <a:rPr lang="en-US" sz="1400" dirty="0" smtClean="0"/>
+                        <a:t>RATIOCIT</a:t>
+                      </a:r>
+                    </a:p>
+                    <a:p>
+                      <a:pPr algn="r"/>
+                      <a:r>
+                        <a:rPr lang="en-US" sz="1400" dirty="0" smtClean="0"/>
+                        <a:t>0.092</a:t>
+                      </a:r>
+                    </a:p>
+                    <a:p>
+                      <a:pPr algn="r"/>
+                      <a:endParaRPr lang="en-US" sz="1400" dirty="0" smtClean="0"/>
+                    </a:p>
+                    <a:p>
+                      <a:pPr algn="r"/>
+                      <a:r>
+                        <a:rPr lang="en-US" sz="1400" dirty="0" smtClean="0"/>
+                        <a:t>Total = </a:t>
+                      </a:r>
+                      <a:r>
+                        <a:rPr lang="en-US" sz="1400" dirty="0" smtClean="0"/>
+                        <a:t>0.363</a:t>
+                      </a:r>
+                      <a:endParaRPr lang="en-US" sz="1400" dirty="0" smtClean="0"/>
+                    </a:p>
+                  </a:txBody>
+                  <a:tcPr/>
+                </a:tc>
+                <a:tc>
+                  <a:txBody>
+                    <a:bodyPr/>
+                    <a:lstStyle/>
+                    <a:p>
+                      <a:pPr algn="r"/>
+                      <a:r>
+                        <a:rPr lang="it-IT" sz="1400" dirty="0" smtClean="0"/>
+                        <a:t>via GENERAL</a:t>
+                      </a:r>
+                    </a:p>
+                    <a:p>
+                      <a:pPr algn="r"/>
+                      <a:r>
+                        <a:rPr lang="it-IT" sz="1400" dirty="0" smtClean="0"/>
+                        <a:t>(0.169)(0.569) = 0.096  </a:t>
+                      </a:r>
+                    </a:p>
+                    <a:p>
+                      <a:pPr algn="r"/>
+                      <a:endParaRPr lang="it-IT" sz="1400" dirty="0" smtClean="0"/>
+                    </a:p>
+                    <a:p>
+                      <a:pPr algn="r"/>
+                      <a:r>
+                        <a:rPr lang="it-IT" sz="1400" dirty="0" smtClean="0"/>
+                        <a:t>via CLAIMS</a:t>
+                      </a:r>
+                    </a:p>
+                    <a:p>
+                      <a:pPr algn="r"/>
+                      <a:r>
+                        <a:rPr lang="it-IT" sz="1400" dirty="0" smtClean="0"/>
+                        <a:t>ORIGINAL</a:t>
+                      </a:r>
+                      <a:r>
+                        <a:rPr lang="it-IT" sz="1400" baseline="0" dirty="0" smtClean="0"/>
+                        <a:t> </a:t>
+                      </a:r>
+                      <a:r>
+                        <a:rPr lang="it-IT" sz="1400" dirty="0" smtClean="0"/>
+                        <a:t>(0.091)(0.063) = 0.006 </a:t>
+                      </a:r>
+                    </a:p>
+                    <a:p>
+                      <a:pPr algn="r"/>
+                      <a:r>
+                        <a:rPr lang="it-IT" sz="1400" dirty="0" smtClean="0"/>
+                        <a:t>GENERAL (0.053)(0.063) = 0.003 </a:t>
+                      </a:r>
+                    </a:p>
+                    <a:p>
+                      <a:pPr algn="r"/>
+                      <a:r>
+                        <a:rPr lang="it-IT" sz="1400" dirty="0" smtClean="0"/>
+                        <a:t>GYEAR (0.050)(0.063) = 0.003 </a:t>
+                      </a:r>
+                    </a:p>
+                    <a:p>
+                      <a:pPr algn="r"/>
+                      <a:endParaRPr lang="en-US" sz="1400" dirty="0" smtClean="0"/>
+                    </a:p>
+                    <a:p>
+                      <a:pPr algn="r"/>
+                      <a:r>
+                        <a:rPr lang="en-US" sz="1400" dirty="0" smtClean="0"/>
+                        <a:t>Total = 0.108</a:t>
+                      </a:r>
+                    </a:p>
+                    <a:p>
+                      <a:pPr algn="r"/>
+                      <a:endParaRPr lang="en-US" sz="1400" dirty="0"/>
+                    </a:p>
+                  </a:txBody>
+                  <a:tcPr/>
+                </a:tc>
+                <a:tc>
+                  <a:txBody>
+                    <a:bodyPr/>
+                    <a:lstStyle/>
+                    <a:p>
+                      <a:pPr algn="r"/>
+                      <a:r>
+                        <a:rPr lang="en-US" sz="1400" dirty="0" smtClean="0"/>
+                        <a:t>0.363 </a:t>
+                      </a:r>
+                      <a:r>
+                        <a:rPr lang="en-US" sz="1400" dirty="0" smtClean="0"/>
+                        <a:t>+ 0.108 = </a:t>
+                      </a:r>
+                    </a:p>
+                    <a:p>
+                      <a:pPr algn="r"/>
+                      <a:r>
+                        <a:rPr lang="en-US" sz="1400" dirty="0" smtClean="0"/>
+                        <a:t>0.471 </a:t>
+                      </a:r>
+                      <a:endParaRPr lang="en-US" sz="1400" dirty="0" smtClean="0"/>
+                    </a:p>
+                    <a:p>
+                      <a:pPr algn="r"/>
+                      <a:endParaRPr lang="en-US" sz="1400" dirty="0"/>
+                    </a:p>
+                  </a:txBody>
+                  <a:tcPr/>
+                </a:tc>
+                <a:tc>
+                  <a:txBody>
+                    <a:bodyPr/>
+                    <a:lstStyle/>
+                    <a:p>
+                      <a:pPr algn="r"/>
+                      <a:r>
+                        <a:rPr lang="en-US" sz="1400" dirty="0" smtClean="0"/>
+                        <a:t>0.117-0.471 </a:t>
+                      </a:r>
+                      <a:r>
+                        <a:rPr lang="en-US" sz="1400" dirty="0" smtClean="0"/>
+                        <a:t>= </a:t>
+                      </a:r>
+                      <a:br>
+                        <a:rPr lang="en-US" sz="1400" dirty="0" smtClean="0"/>
+                      </a:br>
+                      <a:r>
+                        <a:rPr lang="en-US" sz="1400" dirty="0" smtClean="0"/>
+                        <a:t>-0.354</a:t>
+                      </a:r>
+                      <a:endParaRPr lang="en-US" sz="1400" dirty="0"/>
+                    </a:p>
+                  </a:txBody>
+                  <a:tcPr/>
+                </a:tc>
+              </a:tr>
+            </a:tbl>
+          </a:graphicData>
+        </a:graphic>
+      </p:graphicFrame>
+    </p:spTree>
+    <p:extLst>
+      <p:ext uri="{BB962C8B-B14F-4D97-AF65-F5344CB8AC3E}">
+        <p14:creationId xmlns:p14="http://schemas.microsoft.com/office/powerpoint/2010/main" val="4095713054"/>
+      </p:ext>
+    </p:extLst>
+  </p:cSld>
+  <p:clrMapOvr>
+    <a:masterClrMapping/>
+  </p:clrMapOvr>
+  <p:timing>
+    <p:tnLst>
+      <p:par>
+        <p:cTn id="1" dur="indefinite" restart="never" nodeType="tmRoot"/>
+      </p:par>
+    </p:tnLst>
+  </p:timing>
+</p:sld>
+</file>
+
+<file path=ppt/slides/slide11.xml><?xml version="1.0" encoding="utf-8"?>
+<p:sld xmlns:a="http://schemas.openxmlformats.org/drawingml/2006/main" xmlns:r="http://schemas.openxmlformats.org/officeDocument/2006/relationships" xmlns:p="http://schemas.openxmlformats.org/presentationml/2006/main">
+  <p:cSld>
+    <p:spTree>
+      <p:nvGrpSpPr>
+        <p:cNvPr id="1" name=""/>
+        <p:cNvGrpSpPr/>
+        <p:nvPr/>
+      </p:nvGrpSpPr>
+      <p:grpSpPr>
+        <a:xfrm>
+          <a:off x="0" y="0"/>
+          <a:ext cx="0" cy="0"/>
+          <a:chOff x="0" y="0"/>
+          <a:chExt cx="0" cy="0"/>
+        </a:xfrm>
+      </p:grpSpPr>
+      <p:graphicFrame>
+        <p:nvGraphicFramePr>
+          <p:cNvPr id="2" name="Table 1"/>
+          <p:cNvGraphicFramePr>
+            <a:graphicFrameLocks noGrp="1"/>
+          </p:cNvGraphicFramePr>
+          <p:nvPr>
+            <p:extLst>
+              <p:ext uri="{D42A27DB-BD31-4B8C-83A1-F6EECF244321}">
+                <p14:modId xmlns:p14="http://schemas.microsoft.com/office/powerpoint/2010/main" val="3745049536"/>
+              </p:ext>
+            </p:extLst>
+          </p:nvPr>
+        </p:nvGraphicFramePr>
+        <p:xfrm>
+          <a:off x="76200" y="1559560"/>
           <a:ext cx="8991600" cy="2595880"/>
         </p:xfrm>
         <a:graphic>
@@ -5126,25 +5697,7 @@
                       <a:pPr algn="r"/>
                       <a:r>
                         <a:rPr lang="en-US" sz="1400" dirty="0" smtClean="0"/>
-                        <a:t>RATIOCIT</a:t>
-                      </a:r>
-                    </a:p>
-                    <a:p>
-                      <a:pPr algn="r"/>
-                      <a:r>
-                        <a:rPr lang="en-US" sz="1400" dirty="0" smtClean="0"/>
-                        <a:t>0.098</a:t>
-                      </a:r>
-                    </a:p>
-                    <a:p>
-                      <a:pPr algn="r"/>
-                      <a:endParaRPr lang="en-US" sz="1400" dirty="0" smtClean="0"/>
-                    </a:p>
-                    <a:p>
-                      <a:pPr algn="r"/>
-                      <a:r>
-                        <a:rPr lang="en-US" sz="1400" dirty="0" smtClean="0"/>
-                        <a:t>Total=0.117</a:t>
+                        <a:t>Total=0.019</a:t>
                       </a:r>
                       <a:endParaRPr lang="en-US" sz="1400" dirty="0"/>
                     </a:p>
@@ -5159,14 +5712,15 @@
                       <a:pPr algn="r"/>
                       <a:r>
                         <a:rPr lang="en-US" sz="1400" dirty="0" smtClean="0"/>
-                        <a:t>ORIGINAL</a:t>
-                      </a:r>
+                        <a:t>RATIOCIT</a:t>
+                      </a:r>
+                      <a:endParaRPr lang="en-US" sz="1400" dirty="0" smtClean="0"/>
                     </a:p>
                     <a:p>
                       <a:pPr algn="r"/>
                       <a:r>
                         <a:rPr lang="en-US" sz="1400" dirty="0" smtClean="0"/>
-                        <a:t>-0.085</a:t>
+                        <a:t>0.092</a:t>
                       </a:r>
                     </a:p>
                     <a:p>
@@ -5177,44 +5731,13 @@
                       <a:pPr algn="r"/>
                       <a:r>
                         <a:rPr lang="en-US" sz="1400" dirty="0" smtClean="0"/>
-                        <a:t>GYEAR</a:t>
-                      </a:r>
-                    </a:p>
-                    <a:p>
-                      <a:pPr algn="r"/>
-                      <a:r>
-                        <a:rPr lang="en-US" sz="1400" dirty="0" smtClean="0"/>
-                        <a:t>-0.213</a:t>
-                      </a:r>
-                    </a:p>
-                    <a:p>
-                      <a:pPr algn="r"/>
-                      <a:endParaRPr lang="en-US" sz="1400" dirty="0" smtClean="0"/>
-                    </a:p>
-                    <a:p>
-                      <a:pPr algn="r"/>
-                      <a:r>
-                        <a:rPr lang="en-US" sz="1400" dirty="0" smtClean="0"/>
-                        <a:t>RATIOCIT</a:t>
-                      </a:r>
-                    </a:p>
-                    <a:p>
-                      <a:pPr algn="r"/>
+                        <a:t>Total = </a:t>
+                      </a:r>
                       <a:r>
                         <a:rPr lang="en-US" sz="1400" dirty="0" smtClean="0"/>
                         <a:t>0.092</a:t>
                       </a:r>
-                    </a:p>
-                    <a:p>
-                      <a:pPr algn="r"/>
                       <a:endParaRPr lang="en-US" sz="1400" dirty="0" smtClean="0"/>
-                    </a:p>
-                    <a:p>
-                      <a:pPr algn="r"/>
-                      <a:r>
-                        <a:rPr lang="en-US" sz="1400" dirty="0" smtClean="0"/>
-                        <a:t>Total = -0.206</a:t>
-                      </a:r>
                     </a:p>
                   </a:txBody>
                   <a:tcPr/>
@@ -5260,45 +5783,21 @@
                       </a:r>
                       <a:r>
                         <a:rPr lang="it-IT" sz="1400" dirty="0" smtClean="0"/>
-                        <a:t>(</a:t>
-                      </a:r>
+                        <a:t>(0.091)(0.063) = 0.006 </a:t>
+                      </a:r>
+                    </a:p>
+                    <a:p>
+                      <a:pPr algn="r"/>
                       <a:r>
                         <a:rPr lang="it-IT" sz="1400" dirty="0" smtClean="0"/>
-                        <a:t>0.091)(</a:t>
-                      </a:r>
+                        <a:t>GENERAL (0.053)(0.063) = 0.003 </a:t>
+                      </a:r>
+                    </a:p>
+                    <a:p>
+                      <a:pPr algn="r"/>
                       <a:r>
                         <a:rPr lang="it-IT" sz="1400" dirty="0" smtClean="0"/>
-                        <a:t>0.063) = 0.006 </a:t>
-                      </a:r>
-                    </a:p>
-                    <a:p>
-                      <a:pPr algn="r"/>
-                      <a:r>
-                        <a:rPr lang="it-IT" sz="1400" dirty="0" smtClean="0"/>
-                        <a:t>GENERAL (</a:t>
-                      </a:r>
-                      <a:r>
-                        <a:rPr lang="it-IT" sz="1400" dirty="0" smtClean="0"/>
-                        <a:t>0.053)(</a:t>
-                      </a:r>
-                      <a:r>
-                        <a:rPr lang="it-IT" sz="1400" dirty="0" smtClean="0"/>
-                        <a:t>0.063) = 0.003 </a:t>
-                      </a:r>
-                    </a:p>
-                    <a:p>
-                      <a:pPr algn="r"/>
-                      <a:r>
-                        <a:rPr lang="it-IT" sz="1400" dirty="0" smtClean="0"/>
-                        <a:t>GYEAR (</a:t>
-                      </a:r>
-                      <a:r>
-                        <a:rPr lang="it-IT" sz="1400" dirty="0" smtClean="0"/>
-                        <a:t>0.050)(</a:t>
-                      </a:r>
-                      <a:r>
-                        <a:rPr lang="it-IT" sz="1400" dirty="0" smtClean="0"/>
-                        <a:t>0.063) = 0.003 </a:t>
+                        <a:t>GYEAR (0.050)(0.063) = 0.003 </a:t>
                       </a:r>
                     </a:p>
                     <a:p>
@@ -5327,15 +5826,20 @@
                       <a:pPr algn="r"/>
                       <a:r>
                         <a:rPr lang="en-US" sz="1400" dirty="0" smtClean="0"/>
-                        <a:t>-0.206 + 0.108 = </a:t>
+                        <a:t>0.092 </a:t>
+                      </a:r>
+                      <a:r>
+                        <a:rPr lang="en-US" sz="1400" dirty="0" smtClean="0"/>
+                        <a:t>+ 0.108 = </a:t>
                       </a:r>
                     </a:p>
                     <a:p>
                       <a:pPr algn="r"/>
                       <a:r>
                         <a:rPr lang="en-US" sz="1400" dirty="0" smtClean="0"/>
-                        <a:t>-0.098 </a:t>
-                      </a:r>
+                        <a:t>0.200 </a:t>
+                      </a:r>
+                      <a:endParaRPr lang="en-US" sz="1400" dirty="0" smtClean="0"/>
                     </a:p>
                     <a:p>
                       <a:pPr algn="r"/>
@@ -5352,18 +5856,18 @@
                       <a:pPr algn="r"/>
                       <a:r>
                         <a:rPr lang="en-US" sz="1400" dirty="0" smtClean="0"/>
-                        <a:t>0.117-(-</a:t>
+                        <a:t>0.019-0.200 </a:t>
                       </a:r>
                       <a:r>
                         <a:rPr lang="en-US" sz="1400" dirty="0" smtClean="0"/>
-                        <a:t>0.098) = </a:t>
+                        <a:t>= </a:t>
                       </a:r>
                       <a:br>
                         <a:rPr lang="en-US" sz="1400" dirty="0" smtClean="0"/>
                       </a:br>
                       <a:r>
                         <a:rPr lang="en-US" sz="1400" dirty="0" smtClean="0"/>
-                        <a:t>0.215</a:t>
+                        <a:t>-0.181</a:t>
                       </a:r>
                       <a:endParaRPr lang="en-US" sz="1400" dirty="0"/>
                     </a:p>
@@ -5378,7 +5882,7 @@
     </p:spTree>
     <p:extLst>
       <p:ext uri="{BB962C8B-B14F-4D97-AF65-F5344CB8AC3E}">
-        <p14:creationId xmlns:p14="http://schemas.microsoft.com/office/powerpoint/2010/main" val="4095713054"/>
+        <p14:creationId xmlns:p14="http://schemas.microsoft.com/office/powerpoint/2010/main" val="477832764"/>
       </p:ext>
     </p:extLst>
   </p:cSld>
@@ -11371,7 +11875,7 @@
         </p:nvSpPr>
         <p:spPr>
           <a:xfrm>
-            <a:off x="685800" y="4838700"/>
+            <a:off x="685800" y="4846320"/>
             <a:ext cx="5562600" cy="369332"/>
           </a:xfrm>
           <a:prstGeom prst="rect">
@@ -12969,13 +13473,8 @@
             </a:r>
             <a:r>
               <a:rPr lang="en-US" sz="1100" dirty="0" smtClean="0"/>
-              <a:t> = </a:t>
-            </a:r>
-            <a:r>
-              <a:rPr lang="en-US" sz="1100" dirty="0" smtClean="0"/>
-              <a:t>0.031</a:t>
-            </a:r>
-            <a:endParaRPr lang="en-US" sz="1100" dirty="0" smtClean="0"/>
+              <a:t> = 0.031</a:t>
+            </a:r>
           </a:p>
         </p:txBody>
       </p:sp>
@@ -12987,7 +13486,7 @@
         </p:nvSpPr>
         <p:spPr>
           <a:xfrm>
-            <a:off x="685800" y="4610100"/>
+            <a:off x="685800" y="4850368"/>
             <a:ext cx="5562600" cy="369332"/>
           </a:xfrm>
           <a:prstGeom prst="rect">
@@ -13045,13 +13544,8 @@
             </a:r>
             <a:r>
               <a:rPr lang="en-US" sz="1100" dirty="0" smtClean="0"/>
-              <a:t> = </a:t>
-            </a:r>
-            <a:r>
-              <a:rPr lang="en-US" sz="1100" dirty="0" smtClean="0"/>
-              <a:t>0.024</a:t>
-            </a:r>
-            <a:endParaRPr lang="en-US" sz="1100" dirty="0" smtClean="0"/>
+              <a:t> = 0.024</a:t>
+            </a:r>
           </a:p>
         </p:txBody>
       </p:sp>
@@ -13132,13 +13626,8 @@
             </a:r>
             <a:r>
               <a:rPr lang="en-US" sz="1100" dirty="0" smtClean="0"/>
-              <a:t> = </a:t>
-            </a:r>
-            <a:r>
-              <a:rPr lang="en-US" sz="1100" dirty="0" smtClean="0"/>
-              <a:t>0.014 </a:t>
-            </a:r>
-            <a:endParaRPr lang="en-US" sz="1100" dirty="0" smtClean="0"/>
+              <a:t> = 0.014 </a:t>
+            </a:r>
           </a:p>
         </p:txBody>
       </p:sp>
@@ -13184,60 +13673,6 @@
               <a:rPr lang="en-US" sz="1100" dirty="0" smtClean="0"/>
               <a:t> = 0.432</a:t>
             </a:r>
-          </a:p>
-        </p:txBody>
-      </p:sp>
-      <p:sp>
-        <p:nvSpPr>
-          <p:cNvPr id="33" name="TextBox 32"/>
-          <p:cNvSpPr txBox="1"/>
-          <p:nvPr/>
-        </p:nvSpPr>
-        <p:spPr>
-          <a:xfrm>
-            <a:off x="685800" y="4896522"/>
-            <a:ext cx="5562600" cy="369332"/>
-          </a:xfrm>
-          <a:prstGeom prst="rect">
-            <a:avLst/>
-          </a:prstGeom>
-          <a:noFill/>
-        </p:spPr>
-        <p:txBody>
-          <a:bodyPr wrap="square" rtlCol="0">
-            <a:spAutoFit/>
-          </a:bodyPr>
-          <a:lstStyle/>
-          <a:p>
-            <a:r>
-              <a:rPr lang="en-US" dirty="0" smtClean="0"/>
-              <a:t>Pearson Correlation (</a:t>
-            </a:r>
-            <a:r>
-              <a:rPr lang="en-US" dirty="0" err="1" smtClean="0"/>
-              <a:t>CRECEIVEln</a:t>
-            </a:r>
-            <a:r>
-              <a:rPr lang="en-US" dirty="0" smtClean="0"/>
-              <a:t>, </a:t>
-            </a:r>
-            <a:r>
-              <a:rPr lang="en-US" dirty="0" smtClean="0"/>
-              <a:t>RATIOCIT</a:t>
-            </a:r>
-            <a:r>
-              <a:rPr lang="en-US" dirty="0" smtClean="0"/>
-              <a:t>) </a:t>
-            </a:r>
-            <a:r>
-              <a:rPr lang="en-US" dirty="0" smtClean="0"/>
-              <a:t>= </a:t>
-            </a:r>
-            <a:r>
-              <a:rPr lang="en-US" dirty="0" smtClean="0"/>
-              <a:t>0.098</a:t>
-            </a:r>
-            <a:endParaRPr lang="en-US" dirty="0"/>
           </a:p>
         </p:txBody>
       </p:sp>

</xml_diff>